<commit_message>
First few code slides
</commit_message>
<xml_diff>
--- a/Slides/So You Think You Know Javascript.pptx
+++ b/Slides/So You Think You Know Javascript.pptx
@@ -237,7 +237,7 @@
           <a:p>
             <a:fld id="{1A072DB4-5734-40B7-9405-EBC05FE61D64}" type="datetimeFigureOut">
               <a:rPr lang="en-GB" smtClean="0"/>
-              <a:t>03/04/2011</a:t>
+              <a:t>04/04/2011</a:t>
             </a:fld>
             <a:endParaRPr lang="en-GB"/>
           </a:p>
@@ -555,11 +555,7 @@
             </a:r>
             <a:r>
               <a:rPr lang="en-GB" baseline="0" dirty="0" smtClean="0"/>
-              <a:t> is to modern software what the electric guitar is to modern music. Versatile, accessible, purists hate it, beginners love it, and it’s absolutely bloody everywhere – for better or for worse</a:t>
-            </a:r>
-            <a:r>
-              <a:rPr lang="en-GB" baseline="0" dirty="0" smtClean="0"/>
-              <a:t>.</a:t>
+              <a:t> is to modern software what the electric guitar is to modern music. Versatile, accessible, purists hate it, beginners love it, and it’s absolutely bloody everywhere – for better or for worse.</a:t>
             </a:r>
           </a:p>
           <a:p>
@@ -574,7 +570,6 @@
               <a:rPr lang="en-GB" baseline="0" dirty="0" smtClean="0"/>
               <a:t> has been called the “world’s most misunderstood programming language”, and tonight I’m hoping to clear up some of that misunderstanding, to explore how – and why – JS has ended up being so misunderstood, and to show you some of the amazing work that people are doing with this remarkable language.</a:t>
             </a:r>
-            <a:endParaRPr lang="en-GB" baseline="0" dirty="0" smtClean="0"/>
           </a:p>
           <a:p>
             <a:endParaRPr lang="en-GB" baseline="0" dirty="0" smtClean="0"/>
@@ -1770,11 +1765,7 @@
             </a:pPr>
             <a:r>
               <a:rPr lang="en-GB" dirty="0" smtClean="0"/>
-              <a:t>JSON </a:t>
-            </a:r>
-            <a:r>
-              <a:rPr lang="en-GB" dirty="0" smtClean="0"/>
-              <a:t>– originally</a:t>
+              <a:t>JSON – originally</a:t>
             </a:r>
             <a:r>
               <a:rPr lang="en-GB" baseline="0" dirty="0" smtClean="0"/>
@@ -1792,11 +1783,7 @@
           <a:p>
             <a:r>
               <a:rPr lang="en-GB" baseline="0" dirty="0" smtClean="0"/>
-              <a:t>- </a:t>
-            </a:r>
-            <a:r>
-              <a:rPr lang="en-GB" baseline="0" dirty="0" smtClean="0"/>
-              <a:t>but there was already the Java Speech </a:t>
+              <a:t>- but there was already the Java Speech </a:t>
             </a:r>
             <a:r>
               <a:rPr lang="en-GB" baseline="0" dirty="0" err="1" smtClean="0"/>
@@ -1810,15 +1797,7 @@
           <a:p>
             <a:r>
               <a:rPr lang="en-GB" baseline="0" dirty="0" smtClean="0"/>
-              <a:t>- </a:t>
-            </a:r>
-            <a:r>
-              <a:rPr lang="en-GB" baseline="0" dirty="0" smtClean="0"/>
-              <a:t>so they renamed it </a:t>
-            </a:r>
-            <a:r>
-              <a:rPr lang="en-GB" baseline="0" dirty="0" smtClean="0"/>
-              <a:t>JSON</a:t>
+              <a:t>- so they renamed it JSON</a:t>
             </a:r>
           </a:p>
           <a:p>
@@ -2423,11 +2402,7 @@
             </a:r>
             <a:r>
               <a:rPr lang="en-GB" baseline="0" dirty="0" smtClean="0"/>
-              <a:t> else from </a:t>
-            </a:r>
-            <a:r>
-              <a:rPr lang="en-GB" baseline="0" dirty="0" smtClean="0"/>
-              <a:t>Scheme</a:t>
+              <a:t> else from Scheme</a:t>
             </a:r>
           </a:p>
           <a:p>
@@ -2521,6 +2496,90 @@
           <a:bodyPr/>
           <a:lstStyle/>
           <a:p>
+            <a:endParaRPr lang="en-GB" dirty="0"/>
+          </a:p>
+        </p:txBody>
+      </p:sp>
+      <p:sp>
+        <p:nvSpPr>
+          <p:cNvPr id="4" name="Slide Number Placeholder 3"/>
+          <p:cNvSpPr>
+            <a:spLocks noGrp="1"/>
+          </p:cNvSpPr>
+          <p:nvPr>
+            <p:ph type="sldNum" sz="quarter" idx="10"/>
+          </p:nvPr>
+        </p:nvSpPr>
+        <p:spPr/>
+        <p:txBody>
+          <a:bodyPr/>
+          <a:lstStyle/>
+          <a:p>
+            <a:fld id="{680E7421-152F-4C5F-A339-C37B49386B6D}" type="slidenum">
+              <a:rPr lang="en-GB" smtClean="0"/>
+              <a:t>19</a:t>
+            </a:fld>
+            <a:endParaRPr lang="en-GB"/>
+          </a:p>
+        </p:txBody>
+      </p:sp>
+    </p:spTree>
+    <p:extLst>
+      <p:ext uri="{BB962C8B-B14F-4D97-AF65-F5344CB8AC3E}">
+        <p14:creationId xmlns:p14="http://schemas.microsoft.com/office/powerpoint/2010/main" val="130714547"/>
+      </p:ext>
+    </p:extLst>
+  </p:cSld>
+  <p:clrMapOvr>
+    <a:masterClrMapping/>
+  </p:clrMapOvr>
+</p:notes>
+</file>
+
+<file path=ppt/notesSlides/notesSlide19.xml><?xml version="1.0" encoding="utf-8"?>
+<p:notes xmlns:a="http://schemas.openxmlformats.org/drawingml/2006/main" xmlns:r="http://schemas.openxmlformats.org/officeDocument/2006/relationships" xmlns:p="http://schemas.openxmlformats.org/presentationml/2006/main">
+  <p:cSld>
+    <p:spTree>
+      <p:nvGrpSpPr>
+        <p:cNvPr id="1" name=""/>
+        <p:cNvGrpSpPr/>
+        <p:nvPr/>
+      </p:nvGrpSpPr>
+      <p:grpSpPr>
+        <a:xfrm>
+          <a:off x="0" y="0"/>
+          <a:ext cx="0" cy="0"/>
+          <a:chOff x="0" y="0"/>
+          <a:chExt cx="0" cy="0"/>
+        </a:xfrm>
+      </p:grpSpPr>
+      <p:sp>
+        <p:nvSpPr>
+          <p:cNvPr id="2" name="Slide Image Placeholder 1"/>
+          <p:cNvSpPr>
+            <a:spLocks noGrp="1" noRot="1" noChangeAspect="1"/>
+          </p:cNvSpPr>
+          <p:nvPr>
+            <p:ph type="sldImg"/>
+          </p:nvPr>
+        </p:nvSpPr>
+        <p:spPr/>
+      </p:sp>
+      <p:sp>
+        <p:nvSpPr>
+          <p:cNvPr id="3" name="Notes Placeholder 2"/>
+          <p:cNvSpPr>
+            <a:spLocks noGrp="1"/>
+          </p:cNvSpPr>
+          <p:nvPr>
+            <p:ph type="body" idx="1"/>
+          </p:nvPr>
+        </p:nvSpPr>
+        <p:spPr/>
+        <p:txBody>
+          <a:bodyPr/>
+          <a:lstStyle/>
+          <a:p>
             <a:r>
               <a:rPr lang="en-GB" sz="1200" b="0" i="0" kern="1200" dirty="0" smtClean="0">
                 <a:solidFill>
@@ -2531,7 +2590,81 @@
                 <a:ea typeface="+mn-ea"/>
                 <a:cs typeface="+mn-cs"/>
               </a:rPr>
-              <a:t>In Self, and other prototype-based languages, the duality between classes and object instances is eliminated.</a:t>
+              <a:t>In Self, and other prototype-based languages, the duality between classes and object instances is eliminated</a:t>
+            </a:r>
+            <a:r>
+              <a:rPr lang="en-GB" sz="1200" b="0" i="0" kern="1200" dirty="0" smtClean="0">
+                <a:solidFill>
+                  <a:schemeClr val="tx1"/>
+                </a:solidFill>
+                <a:effectLst/>
+                <a:latin typeface="+mn-lt"/>
+                <a:ea typeface="+mn-ea"/>
+                <a:cs typeface="+mn-cs"/>
+              </a:rPr>
+              <a:t>.</a:t>
+            </a:r>
+          </a:p>
+          <a:p>
+            <a:endParaRPr lang="en-GB" sz="1200" b="0" i="0" kern="1200" dirty="0" smtClean="0">
+              <a:solidFill>
+                <a:schemeClr val="tx1"/>
+              </a:solidFill>
+              <a:effectLst/>
+              <a:latin typeface="+mn-lt"/>
+              <a:ea typeface="+mn-ea"/>
+              <a:cs typeface="+mn-cs"/>
+            </a:endParaRPr>
+          </a:p>
+          <a:p>
+            <a:r>
+              <a:rPr lang="en-GB" sz="1200" b="0" i="0" kern="1200" dirty="0" smtClean="0">
+                <a:solidFill>
+                  <a:schemeClr val="tx1"/>
+                </a:solidFill>
+                <a:effectLst/>
+                <a:latin typeface="+mn-lt"/>
+                <a:ea typeface="+mn-ea"/>
+                <a:cs typeface="+mn-cs"/>
+              </a:rPr>
+              <a:t>In classical inheritance,</a:t>
+            </a:r>
+            <a:r>
+              <a:rPr lang="en-GB" sz="1200" b="0" i="0" kern="1200" baseline="0" dirty="0" smtClean="0">
+                <a:solidFill>
+                  <a:schemeClr val="tx1"/>
+                </a:solidFill>
+                <a:effectLst/>
+                <a:latin typeface="+mn-lt"/>
+                <a:ea typeface="+mn-ea"/>
+                <a:cs typeface="+mn-cs"/>
+              </a:rPr>
+              <a:t> when you pass someone an instance of vehicle, the compiler refers to the class declaration to see what it can do.</a:t>
+            </a:r>
+          </a:p>
+          <a:p>
+            <a:endParaRPr lang="en-GB" sz="1200" b="0" i="0" kern="1200" baseline="0" dirty="0" smtClean="0">
+              <a:solidFill>
+                <a:schemeClr val="tx1"/>
+              </a:solidFill>
+              <a:effectLst/>
+              <a:latin typeface="+mn-lt"/>
+              <a:ea typeface="+mn-ea"/>
+              <a:cs typeface="+mn-cs"/>
+            </a:endParaRPr>
+          </a:p>
+          <a:p>
+            <a:r>
+              <a:rPr lang="en-GB" sz="1200" b="0" i="0" kern="1200" baseline="0" dirty="0" smtClean="0">
+                <a:solidFill>
+                  <a:schemeClr val="tx1"/>
+                </a:solidFill>
+                <a:effectLst/>
+                <a:latin typeface="+mn-lt"/>
+                <a:ea typeface="+mn-ea"/>
+                <a:cs typeface="+mn-cs"/>
+              </a:rPr>
+              <a:t>In prototyped inheritance, every instance keeps a REFERENCE to its originating class, but that’s just a loose object reference. Objects are disconnected from their definitions.</a:t>
             </a:r>
             <a:endParaRPr lang="en-GB" dirty="0"/>
           </a:p>
@@ -3504,7 +3637,7 @@
           <a:p>
             <a:fld id="{79FF1FDB-4612-42CD-8C9A-3A5EF85AE542}" type="datetimeFigureOut">
               <a:rPr lang="en-GB" smtClean="0"/>
-              <a:t>03/04/2011</a:t>
+              <a:t>04/04/2011</a:t>
             </a:fld>
             <a:endParaRPr lang="en-GB"/>
           </a:p>
@@ -3674,7 +3807,7 @@
           <a:p>
             <a:fld id="{79FF1FDB-4612-42CD-8C9A-3A5EF85AE542}" type="datetimeFigureOut">
               <a:rPr lang="en-GB" smtClean="0"/>
-              <a:t>03/04/2011</a:t>
+              <a:t>04/04/2011</a:t>
             </a:fld>
             <a:endParaRPr lang="en-GB"/>
           </a:p>
@@ -3854,7 +3987,7 @@
           <a:p>
             <a:fld id="{79FF1FDB-4612-42CD-8C9A-3A5EF85AE542}" type="datetimeFigureOut">
               <a:rPr lang="en-GB" smtClean="0"/>
-              <a:t>03/04/2011</a:t>
+              <a:t>04/04/2011</a:t>
             </a:fld>
             <a:endParaRPr lang="en-GB"/>
           </a:p>
@@ -4024,7 +4157,7 @@
           <a:p>
             <a:fld id="{79FF1FDB-4612-42CD-8C9A-3A5EF85AE542}" type="datetimeFigureOut">
               <a:rPr lang="en-GB" smtClean="0"/>
-              <a:t>03/04/2011</a:t>
+              <a:t>04/04/2011</a:t>
             </a:fld>
             <a:endParaRPr lang="en-GB"/>
           </a:p>
@@ -4270,7 +4403,7 @@
           <a:p>
             <a:fld id="{79FF1FDB-4612-42CD-8C9A-3A5EF85AE542}" type="datetimeFigureOut">
               <a:rPr lang="en-GB" smtClean="0"/>
-              <a:t>03/04/2011</a:t>
+              <a:t>04/04/2011</a:t>
             </a:fld>
             <a:endParaRPr lang="en-GB"/>
           </a:p>
@@ -4558,7 +4691,7 @@
           <a:p>
             <a:fld id="{79FF1FDB-4612-42CD-8C9A-3A5EF85AE542}" type="datetimeFigureOut">
               <a:rPr lang="en-GB" smtClean="0"/>
-              <a:t>03/04/2011</a:t>
+              <a:t>04/04/2011</a:t>
             </a:fld>
             <a:endParaRPr lang="en-GB"/>
           </a:p>
@@ -4980,7 +5113,7 @@
           <a:p>
             <a:fld id="{79FF1FDB-4612-42CD-8C9A-3A5EF85AE542}" type="datetimeFigureOut">
               <a:rPr lang="en-GB" smtClean="0"/>
-              <a:t>03/04/2011</a:t>
+              <a:t>04/04/2011</a:t>
             </a:fld>
             <a:endParaRPr lang="en-GB"/>
           </a:p>
@@ -5098,7 +5231,7 @@
           <a:p>
             <a:fld id="{79FF1FDB-4612-42CD-8C9A-3A5EF85AE542}" type="datetimeFigureOut">
               <a:rPr lang="en-GB" smtClean="0"/>
-              <a:t>03/04/2011</a:t>
+              <a:t>04/04/2011</a:t>
             </a:fld>
             <a:endParaRPr lang="en-GB"/>
           </a:p>
@@ -5193,7 +5326,7 @@
           <a:p>
             <a:fld id="{79FF1FDB-4612-42CD-8C9A-3A5EF85AE542}" type="datetimeFigureOut">
               <a:rPr lang="en-GB" smtClean="0"/>
-              <a:t>03/04/2011</a:t>
+              <a:t>04/04/2011</a:t>
             </a:fld>
             <a:endParaRPr lang="en-GB"/>
           </a:p>
@@ -5470,7 +5603,7 @@
           <a:p>
             <a:fld id="{79FF1FDB-4612-42CD-8C9A-3A5EF85AE542}" type="datetimeFigureOut">
               <a:rPr lang="en-GB" smtClean="0"/>
-              <a:t>03/04/2011</a:t>
+              <a:t>04/04/2011</a:t>
             </a:fld>
             <a:endParaRPr lang="en-GB"/>
           </a:p>
@@ -5723,7 +5856,7 @@
           <a:p>
             <a:fld id="{79FF1FDB-4612-42CD-8C9A-3A5EF85AE542}" type="datetimeFigureOut">
               <a:rPr lang="en-GB" smtClean="0"/>
-              <a:t>03/04/2011</a:t>
+              <a:t>04/04/2011</a:t>
             </a:fld>
             <a:endParaRPr lang="en-GB"/>
           </a:p>
@@ -5936,7 +6069,7 @@
           <a:p>
             <a:fld id="{79FF1FDB-4612-42CD-8C9A-3A5EF85AE542}" type="datetimeFigureOut">
               <a:rPr lang="en-GB" smtClean="0"/>
-              <a:t>03/04/2011</a:t>
+              <a:t>04/04/2011</a:t>
             </a:fld>
             <a:endParaRPr lang="en-GB"/>
           </a:p>
@@ -6384,37 +6517,17 @@
                 <a:latin typeface="Consolas" pitchFamily="49" charset="0"/>
                 <a:cs typeface="Consolas" pitchFamily="49" charset="0"/>
               </a:rPr>
-              <a:t>Server: </a:t>
-            </a:r>
-            <a:r>
-              <a:rPr lang="en-GB" sz="1800" b="1" dirty="0" smtClean="0">
+              <a:t>Server: 		</a:t>
+            </a:r>
+            <a:r>
+              <a:rPr lang="en-GB" sz="1800" dirty="0" smtClean="0">
                 <a:solidFill>
                   <a:srgbClr val="00FF00"/>
                 </a:solidFill>
                 <a:latin typeface="Consolas" pitchFamily="49" charset="0"/>
                 <a:cs typeface="Consolas" pitchFamily="49" charset="0"/>
               </a:rPr>
-              <a:t>		</a:t>
-            </a:r>
-            <a:r>
-              <a:rPr lang="en-GB" sz="1800" dirty="0" smtClean="0">
-                <a:solidFill>
-                  <a:srgbClr val="00FF00"/>
-                </a:solidFill>
-                <a:latin typeface="Consolas" pitchFamily="49" charset="0"/>
-                <a:cs typeface="Consolas" pitchFamily="49" charset="0"/>
-              </a:rPr>
               <a:t>skillsmatter.com</a:t>
-            </a:r>
-            <a:r>
-              <a:rPr lang="en-GB" sz="1800" dirty="0" smtClean="0">
-                <a:solidFill>
-                  <a:srgbClr val="00FF00"/>
-                </a:solidFill>
-                <a:latin typeface="Consolas" pitchFamily="49" charset="0"/>
-                <a:cs typeface="Consolas" pitchFamily="49" charset="0"/>
-              </a:rPr>
-              <a:t/>
             </a:r>
             <a:br>
               <a:rPr lang="en-GB" sz="1800" dirty="0" smtClean="0">
@@ -6443,27 +6556,7 @@
                 <a:latin typeface="Consolas" pitchFamily="49" charset="0"/>
                 <a:cs typeface="Consolas" pitchFamily="49" charset="0"/>
               </a:rPr>
-              <a:t> </a:t>
-            </a:r>
-            <a:r>
-              <a:rPr lang="en-GB" sz="1800" dirty="0" smtClean="0">
-                <a:solidFill>
-                  <a:srgbClr val="00FF00"/>
-                </a:solidFill>
-                <a:latin typeface="Consolas" pitchFamily="49" charset="0"/>
-                <a:cs typeface="Consolas" pitchFamily="49" charset="0"/>
-              </a:rPr>
-              <a:t>		application/x-slides-and-code-and-crap-jokes</a:t>
-            </a:r>
-            <a:r>
-              <a:rPr lang="en-GB" sz="1800" dirty="0" smtClean="0">
-                <a:solidFill>
-                  <a:srgbClr val="00FF00"/>
-                </a:solidFill>
-                <a:latin typeface="Consolas" pitchFamily="49" charset="0"/>
-                <a:cs typeface="Consolas" pitchFamily="49" charset="0"/>
-              </a:rPr>
-              <a:t/>
+              <a:t> 		application/x-slides-and-code-and-crap-jokes</a:t>
             </a:r>
             <a:br>
               <a:rPr lang="en-GB" sz="1800" dirty="0" smtClean="0">
@@ -6492,17 +6585,7 @@
                 <a:latin typeface="Consolas" pitchFamily="49" charset="0"/>
                 <a:cs typeface="Consolas" pitchFamily="49" charset="0"/>
               </a:rPr>
-              <a:t> </a:t>
-            </a:r>
-            <a:r>
-              <a:rPr lang="en-GB" sz="1800" dirty="0" smtClean="0">
-                <a:solidFill>
-                  <a:srgbClr val="00FF00"/>
-                </a:solidFill>
-                <a:latin typeface="Consolas" pitchFamily="49" charset="0"/>
-                <a:cs typeface="Consolas" pitchFamily="49" charset="0"/>
-              </a:rPr>
-              <a:t>	text/</a:t>
+              <a:t> 	text/</a:t>
             </a:r>
             <a:r>
               <a:rPr lang="en-GB" sz="1800" dirty="0" err="1" smtClean="0">
@@ -6591,17 +6674,7 @@
                 <a:latin typeface="Consolas" pitchFamily="49" charset="0"/>
                 <a:cs typeface="Consolas" pitchFamily="49" charset="0"/>
               </a:rPr>
-              <a:t>remember</a:t>
-            </a:r>
-            <a:r>
-              <a:rPr lang="en-GB" sz="1800" dirty="0" smtClean="0">
-                <a:solidFill>
-                  <a:srgbClr val="00FF00"/>
-                </a:solidFill>
-                <a:latin typeface="Consolas" pitchFamily="49" charset="0"/>
-                <a:cs typeface="Consolas" pitchFamily="49" charset="0"/>
-              </a:rPr>
-              <a:t>, share, tell-your-friends</a:t>
+              <a:t>remember, share, tell-your-friends</a:t>
             </a:r>
             <a:br>
               <a:rPr lang="en-GB" sz="1800" dirty="0" smtClean="0">
@@ -6650,17 +6723,7 @@
                 <a:latin typeface="Consolas" pitchFamily="49" charset="0"/>
                 <a:cs typeface="Consolas" pitchFamily="49" charset="0"/>
               </a:rPr>
-              <a:t>	about-1</a:t>
-            </a:r>
-            <a:r>
-              <a:rPr lang="en-GB" sz="1800" dirty="0" smtClean="0">
-                <a:solidFill>
-                  <a:srgbClr val="00FF00"/>
-                </a:solidFill>
-                <a:latin typeface="Consolas" pitchFamily="49" charset="0"/>
-                <a:cs typeface="Consolas" pitchFamily="49" charset="0"/>
-              </a:rPr>
-              <a:t>½-hours</a:t>
+              <a:t>	about-1½-hours</a:t>
             </a:r>
             <a:br>
               <a:rPr lang="en-GB" sz="1800" dirty="0" smtClean="0">
@@ -6709,17 +6772,7 @@
                 <a:latin typeface="Consolas" pitchFamily="49" charset="0"/>
                 <a:cs typeface="Consolas" pitchFamily="49" charset="0"/>
               </a:rPr>
-              <a:t>Tue</a:t>
-            </a:r>
-            <a:r>
-              <a:rPr lang="en-GB" sz="1800" dirty="0" smtClean="0">
-                <a:solidFill>
-                  <a:srgbClr val="00FF00"/>
-                </a:solidFill>
-                <a:latin typeface="Consolas" pitchFamily="49" charset="0"/>
-                <a:cs typeface="Consolas" pitchFamily="49" charset="0"/>
-              </a:rPr>
-              <a:t>, 05 </a:t>
+              <a:t>Tue, 05 </a:t>
             </a:r>
             <a:r>
               <a:rPr lang="en-GB" sz="1800" dirty="0">
@@ -6768,17 +6821,7 @@
                 <a:latin typeface="Consolas" pitchFamily="49" charset="0"/>
                 <a:cs typeface="Consolas" pitchFamily="49" charset="0"/>
               </a:rPr>
-              <a:t> </a:t>
-            </a:r>
-            <a:r>
-              <a:rPr lang="en-GB" sz="1800" dirty="0" smtClean="0">
-                <a:solidFill>
-                  <a:srgbClr val="00FF00"/>
-                </a:solidFill>
-                <a:latin typeface="Consolas" pitchFamily="49" charset="0"/>
-                <a:cs typeface="Consolas" pitchFamily="49" charset="0"/>
-              </a:rPr>
-              <a:t>		flavour=</a:t>
+              <a:t> 		flavour=</a:t>
             </a:r>
             <a:r>
               <a:rPr lang="en-GB" sz="1800" dirty="0" err="1" smtClean="0">
@@ -6817,37 +6860,17 @@
                 <a:latin typeface="Consolas" pitchFamily="49" charset="0"/>
                 <a:cs typeface="Consolas" pitchFamily="49" charset="0"/>
               </a:rPr>
-              <a:t>X-Subject: </a:t>
-            </a:r>
-            <a:r>
-              <a:rPr lang="en-GB" sz="1800" b="1" dirty="0" smtClean="0">
+              <a:t>X-Subject: 		</a:t>
+            </a:r>
+            <a:r>
+              <a:rPr lang="en-GB" sz="1800" dirty="0" smtClean="0">
                 <a:solidFill>
                   <a:srgbClr val="00FF00"/>
                 </a:solidFill>
                 <a:latin typeface="Consolas" pitchFamily="49" charset="0"/>
                 <a:cs typeface="Consolas" pitchFamily="49" charset="0"/>
               </a:rPr>
-              <a:t>		</a:t>
-            </a:r>
-            <a:r>
-              <a:rPr lang="en-GB" sz="1800" dirty="0" smtClean="0">
-                <a:solidFill>
-                  <a:srgbClr val="00FF00"/>
-                </a:solidFill>
-                <a:latin typeface="Consolas" pitchFamily="49" charset="0"/>
-                <a:cs typeface="Consolas" pitchFamily="49" charset="0"/>
-              </a:rPr>
               <a:t>JavaScript</a:t>
-            </a:r>
-            <a:r>
-              <a:rPr lang="en-GB" sz="1800" dirty="0" smtClean="0">
-                <a:solidFill>
-                  <a:srgbClr val="00FF00"/>
-                </a:solidFill>
-                <a:latin typeface="Consolas" pitchFamily="49" charset="0"/>
-                <a:cs typeface="Consolas" pitchFamily="49" charset="0"/>
-              </a:rPr>
-              <a:t/>
             </a:r>
             <a:br>
               <a:rPr lang="en-GB" sz="1800" dirty="0" smtClean="0">
@@ -6866,37 +6889,17 @@
                 <a:latin typeface="Consolas" pitchFamily="49" charset="0"/>
                 <a:cs typeface="Consolas" pitchFamily="49" charset="0"/>
               </a:rPr>
-              <a:t>X-Powered-By: </a:t>
-            </a:r>
-            <a:r>
-              <a:rPr lang="en-GB" sz="1800" b="1" dirty="0" smtClean="0">
+              <a:t>X-Powered-By: 		</a:t>
+            </a:r>
+            <a:r>
+              <a:rPr lang="en-GB" sz="1800" dirty="0" smtClean="0">
                 <a:solidFill>
                   <a:srgbClr val="00FF00"/>
                 </a:solidFill>
                 <a:latin typeface="Consolas" pitchFamily="49" charset="0"/>
                 <a:cs typeface="Consolas" pitchFamily="49" charset="0"/>
               </a:rPr>
-              <a:t>		</a:t>
-            </a:r>
-            <a:r>
-              <a:rPr lang="en-GB" sz="1800" dirty="0" smtClean="0">
-                <a:solidFill>
-                  <a:srgbClr val="00FF00"/>
-                </a:solidFill>
-                <a:latin typeface="Consolas" pitchFamily="49" charset="0"/>
-                <a:cs typeface="Consolas" pitchFamily="49" charset="0"/>
-              </a:rPr>
               <a:t>monmouth-coffee-and-80s-music</a:t>
-            </a:r>
-            <a:r>
-              <a:rPr lang="en-GB" sz="1800" dirty="0" smtClean="0">
-                <a:solidFill>
-                  <a:srgbClr val="00FF00"/>
-                </a:solidFill>
-                <a:latin typeface="Consolas" pitchFamily="49" charset="0"/>
-                <a:cs typeface="Consolas" pitchFamily="49" charset="0"/>
-              </a:rPr>
-              <a:t/>
             </a:r>
             <a:br>
               <a:rPr lang="en-GB" sz="1800" dirty="0" smtClean="0">
@@ -6915,37 +6918,17 @@
                 <a:latin typeface="Consolas" pitchFamily="49" charset="0"/>
                 <a:cs typeface="Consolas" pitchFamily="49" charset="0"/>
               </a:rPr>
-              <a:t>X-Speaker-Name: </a:t>
-            </a:r>
-            <a:r>
-              <a:rPr lang="en-GB" sz="1800" b="1" dirty="0" smtClean="0">
+              <a:t>X-Speaker-Name: 	</a:t>
+            </a:r>
+            <a:r>
+              <a:rPr lang="en-GB" sz="1800" dirty="0" smtClean="0">
                 <a:solidFill>
                   <a:srgbClr val="00FF00"/>
                 </a:solidFill>
                 <a:latin typeface="Consolas" pitchFamily="49" charset="0"/>
                 <a:cs typeface="Consolas" pitchFamily="49" charset="0"/>
               </a:rPr>
-              <a:t>	</a:t>
-            </a:r>
-            <a:r>
-              <a:rPr lang="en-GB" sz="1800" dirty="0" smtClean="0">
-                <a:solidFill>
-                  <a:srgbClr val="00FF00"/>
-                </a:solidFill>
-                <a:latin typeface="Consolas" pitchFamily="49" charset="0"/>
-                <a:cs typeface="Consolas" pitchFamily="49" charset="0"/>
-              </a:rPr>
-              <a:t>Dylan </a:t>
-            </a:r>
-            <a:r>
-              <a:rPr lang="en-GB" sz="1800" dirty="0" smtClean="0">
-                <a:solidFill>
-                  <a:srgbClr val="00FF00"/>
-                </a:solidFill>
-                <a:latin typeface="Consolas" pitchFamily="49" charset="0"/>
-                <a:cs typeface="Consolas" pitchFamily="49" charset="0"/>
-              </a:rPr>
-              <a:t>Beattie</a:t>
+              <a:t>Dylan Beattie</a:t>
             </a:r>
             <a:br>
               <a:rPr lang="en-GB" sz="1800" dirty="0" smtClean="0">
@@ -6964,37 +6947,17 @@
                 <a:latin typeface="Consolas" pitchFamily="49" charset="0"/>
                 <a:cs typeface="Consolas" pitchFamily="49" charset="0"/>
               </a:rPr>
-              <a:t>X-Speaker-Email: </a:t>
-            </a:r>
-            <a:r>
-              <a:rPr lang="en-GB" sz="1800" b="1" dirty="0" smtClean="0">
+              <a:t>X-Speaker-Email: 	</a:t>
+            </a:r>
+            <a:r>
+              <a:rPr lang="en-GB" sz="1800" dirty="0" smtClean="0">
                 <a:solidFill>
                   <a:srgbClr val="00FF00"/>
                 </a:solidFill>
                 <a:latin typeface="Consolas" pitchFamily="49" charset="0"/>
                 <a:cs typeface="Consolas" pitchFamily="49" charset="0"/>
               </a:rPr>
-              <a:t>	</a:t>
-            </a:r>
-            <a:r>
-              <a:rPr lang="en-GB" sz="1800" dirty="0" smtClean="0">
-                <a:solidFill>
-                  <a:srgbClr val="00FF00"/>
-                </a:solidFill>
-                <a:latin typeface="Consolas" pitchFamily="49" charset="0"/>
-                <a:cs typeface="Consolas" pitchFamily="49" charset="0"/>
-              </a:rPr>
               <a:t>dylan@dylanbeattie.net</a:t>
-            </a:r>
-            <a:r>
-              <a:rPr lang="en-GB" sz="1800" dirty="0" smtClean="0">
-                <a:solidFill>
-                  <a:srgbClr val="00FF00"/>
-                </a:solidFill>
-                <a:latin typeface="Consolas" pitchFamily="49" charset="0"/>
-                <a:cs typeface="Consolas" pitchFamily="49" charset="0"/>
-              </a:rPr>
-              <a:t/>
             </a:r>
             <a:br>
               <a:rPr lang="en-GB" sz="1800" dirty="0" smtClean="0">
@@ -7013,17 +6976,7 @@
                 <a:latin typeface="Consolas" pitchFamily="49" charset="0"/>
                 <a:cs typeface="Consolas" pitchFamily="49" charset="0"/>
               </a:rPr>
-              <a:t>X-Speaker-Twitter: </a:t>
-            </a:r>
-            <a:r>
-              <a:rPr lang="en-GB" sz="1800" b="1" dirty="0" smtClean="0">
-                <a:solidFill>
-                  <a:srgbClr val="00FF00"/>
-                </a:solidFill>
-                <a:latin typeface="Consolas" pitchFamily="49" charset="0"/>
-                <a:cs typeface="Consolas" pitchFamily="49" charset="0"/>
-              </a:rPr>
-              <a:t>	</a:t>
+              <a:t>X-Speaker-Twitter: 	</a:t>
             </a:r>
             <a:r>
               <a:rPr lang="en-GB" sz="1800" dirty="0" smtClean="0">
@@ -7072,35 +7025,18 @@
                 <a:latin typeface="Consolas" pitchFamily="49" charset="0"/>
                 <a:cs typeface="Consolas" pitchFamily="49" charset="0"/>
               </a:rPr>
-              <a:t>X-Speaker-Website: </a:t>
-            </a:r>
-            <a:r>
-              <a:rPr lang="en-GB" sz="1800" b="1" dirty="0" smtClean="0">
+              <a:t>X-Speaker-Website: 	</a:t>
+            </a:r>
+            <a:r>
+              <a:rPr lang="en-GB" sz="1800" dirty="0" smtClean="0">
                 <a:solidFill>
                   <a:srgbClr val="00FF00"/>
                 </a:solidFill>
                 <a:latin typeface="Consolas" pitchFamily="49" charset="0"/>
                 <a:cs typeface="Consolas" pitchFamily="49" charset="0"/>
               </a:rPr>
-              <a:t>	</a:t>
-            </a:r>
-            <a:r>
-              <a:rPr lang="en-GB" sz="1800" dirty="0" smtClean="0">
-                <a:solidFill>
-                  <a:srgbClr val="00FF00"/>
-                </a:solidFill>
-                <a:latin typeface="Consolas" pitchFamily="49" charset="0"/>
-                <a:cs typeface="Consolas" pitchFamily="49" charset="0"/>
-              </a:rPr>
               <a:t>www.dylanbeattie.net </a:t>
             </a:r>
-            <a:endParaRPr lang="en-GB" sz="1800" dirty="0" smtClean="0">
-              <a:solidFill>
-                <a:srgbClr val="00FF00"/>
-              </a:solidFill>
-              <a:latin typeface="Consolas" pitchFamily="49" charset="0"/>
-              <a:cs typeface="Consolas" pitchFamily="49" charset="0"/>
-            </a:endParaRPr>
           </a:p>
         </p:txBody>
       </p:sp>
@@ -9887,15 +9823,7 @@
               <a:srgbClr val="C0C0C0"/>
             </a:contourClr>
           </a:sp3d>
-          <a:extLst>
-            <a:ext uri="{909E8E84-426E-40DD-AFC4-6F175D3DCCD1}">
-              <a14:hiddenFill xmlns:a14="http://schemas.microsoft.com/office/drawing/2010/main">
-                <a:solidFill>
-                  <a:srgbClr val="FFFFFF"/>
-                </a:solidFill>
-              </a14:hiddenFill>
-            </a:ext>
-          </a:extLst>
+          <a:extLst/>
         </p:spPr>
       </p:pic>
       <p:pic>
@@ -10178,10 +10106,266 @@
         </p:nvSpPr>
         <p:spPr/>
         <p:txBody>
-          <a:bodyPr/>
+          <a:bodyPr>
+            <a:normAutofit fontScale="70000" lnSpcReduction="20000"/>
+          </a:bodyPr>
           <a:lstStyle/>
           <a:p>
-            <a:endParaRPr lang="en-GB"/>
+            <a:pPr marL="0" indent="0">
+              <a:buNone/>
+            </a:pPr>
+            <a:r>
+              <a:rPr lang="en-GB" dirty="0" smtClean="0">
+                <a:latin typeface="Consolas" pitchFamily="49" charset="0"/>
+                <a:cs typeface="Consolas" pitchFamily="49" charset="0"/>
+              </a:rPr>
+              <a:t>function </a:t>
+            </a:r>
+            <a:r>
+              <a:rPr lang="en-GB" dirty="0" err="1" smtClean="0">
+                <a:latin typeface="Consolas" pitchFamily="49" charset="0"/>
+                <a:cs typeface="Consolas" pitchFamily="49" charset="0"/>
+              </a:rPr>
+              <a:t>addCheese</a:t>
+            </a:r>
+            <a:r>
+              <a:rPr lang="en-GB" dirty="0" smtClean="0">
+                <a:latin typeface="Consolas" pitchFamily="49" charset="0"/>
+                <a:cs typeface="Consolas" pitchFamily="49" charset="0"/>
+              </a:rPr>
+              <a:t>(food) {</a:t>
+            </a:r>
+          </a:p>
+          <a:p>
+            <a:pPr marL="0" indent="0">
+              <a:buNone/>
+            </a:pPr>
+            <a:r>
+              <a:rPr lang="en-GB" dirty="0">
+                <a:latin typeface="Consolas" pitchFamily="49" charset="0"/>
+                <a:cs typeface="Consolas" pitchFamily="49" charset="0"/>
+              </a:rPr>
+              <a:t>	</a:t>
+            </a:r>
+            <a:r>
+              <a:rPr lang="en-GB" dirty="0" smtClean="0">
+                <a:latin typeface="Consolas" pitchFamily="49" charset="0"/>
+                <a:cs typeface="Consolas" pitchFamily="49" charset="0"/>
+              </a:rPr>
+              <a:t>return(food + “ with cheese”);</a:t>
+            </a:r>
+            <a:endParaRPr lang="en-GB" dirty="0" smtClean="0">
+              <a:latin typeface="Consolas" pitchFamily="49" charset="0"/>
+              <a:cs typeface="Consolas" pitchFamily="49" charset="0"/>
+            </a:endParaRPr>
+          </a:p>
+          <a:p>
+            <a:pPr marL="0" indent="0">
+              <a:buNone/>
+            </a:pPr>
+            <a:r>
+              <a:rPr lang="en-GB" dirty="0" smtClean="0">
+                <a:latin typeface="Consolas" pitchFamily="49" charset="0"/>
+                <a:cs typeface="Consolas" pitchFamily="49" charset="0"/>
+              </a:rPr>
+              <a:t>}</a:t>
+            </a:r>
+          </a:p>
+          <a:p>
+            <a:pPr marL="0" indent="0">
+              <a:buNone/>
+            </a:pPr>
+            <a:r>
+              <a:rPr lang="en-GB" dirty="0" smtClean="0">
+                <a:latin typeface="Consolas" pitchFamily="49" charset="0"/>
+                <a:cs typeface="Consolas" pitchFamily="49" charset="0"/>
+              </a:rPr>
+              <a:t>function </a:t>
+            </a:r>
+            <a:r>
+              <a:rPr lang="en-GB" dirty="0" err="1" smtClean="0">
+                <a:latin typeface="Consolas" pitchFamily="49" charset="0"/>
+                <a:cs typeface="Consolas" pitchFamily="49" charset="0"/>
+              </a:rPr>
+              <a:t>addBacon</a:t>
+            </a:r>
+            <a:r>
+              <a:rPr lang="en-GB" dirty="0" smtClean="0">
+                <a:latin typeface="Consolas" pitchFamily="49" charset="0"/>
+                <a:cs typeface="Consolas" pitchFamily="49" charset="0"/>
+              </a:rPr>
+              <a:t>(food) {</a:t>
+            </a:r>
+          </a:p>
+          <a:p>
+            <a:pPr marL="0" indent="0">
+              <a:buNone/>
+            </a:pPr>
+            <a:r>
+              <a:rPr lang="en-GB" dirty="0">
+                <a:latin typeface="Consolas" pitchFamily="49" charset="0"/>
+                <a:cs typeface="Consolas" pitchFamily="49" charset="0"/>
+              </a:rPr>
+              <a:t>	</a:t>
+            </a:r>
+            <a:r>
+              <a:rPr lang="en-GB" dirty="0" smtClean="0">
+                <a:latin typeface="Consolas" pitchFamily="49" charset="0"/>
+                <a:cs typeface="Consolas" pitchFamily="49" charset="0"/>
+              </a:rPr>
+              <a:t>return(food + “ with bacon”);</a:t>
+            </a:r>
+          </a:p>
+          <a:p>
+            <a:pPr marL="0" indent="0">
+              <a:buNone/>
+            </a:pPr>
+            <a:r>
+              <a:rPr lang="en-GB" dirty="0" smtClean="0">
+                <a:latin typeface="Consolas" pitchFamily="49" charset="0"/>
+                <a:cs typeface="Consolas" pitchFamily="49" charset="0"/>
+              </a:rPr>
+              <a:t>}</a:t>
+            </a:r>
+          </a:p>
+          <a:p>
+            <a:pPr marL="0" indent="0">
+              <a:buNone/>
+            </a:pPr>
+            <a:r>
+              <a:rPr lang="en-GB" dirty="0" smtClean="0">
+                <a:latin typeface="Consolas" pitchFamily="49" charset="0"/>
+                <a:cs typeface="Consolas" pitchFamily="49" charset="0"/>
+              </a:rPr>
+              <a:t>function combine(f1, f2) {</a:t>
+            </a:r>
+          </a:p>
+          <a:p>
+            <a:pPr marL="0" indent="0">
+              <a:buNone/>
+            </a:pPr>
+            <a:r>
+              <a:rPr lang="en-GB" dirty="0">
+                <a:latin typeface="Consolas" pitchFamily="49" charset="0"/>
+                <a:cs typeface="Consolas" pitchFamily="49" charset="0"/>
+              </a:rPr>
+              <a:t>	</a:t>
+            </a:r>
+            <a:r>
+              <a:rPr lang="en-GB" dirty="0" smtClean="0">
+                <a:latin typeface="Consolas" pitchFamily="49" charset="0"/>
+                <a:cs typeface="Consolas" pitchFamily="49" charset="0"/>
+              </a:rPr>
+              <a:t>return(function(x) { f1(f2(x)) });</a:t>
+            </a:r>
+          </a:p>
+          <a:p>
+            <a:pPr marL="0" indent="0">
+              <a:buNone/>
+            </a:pPr>
+            <a:r>
+              <a:rPr lang="en-GB" dirty="0" smtClean="0">
+                <a:latin typeface="Consolas" pitchFamily="49" charset="0"/>
+                <a:cs typeface="Consolas" pitchFamily="49" charset="0"/>
+              </a:rPr>
+              <a:t>}</a:t>
+            </a:r>
+          </a:p>
+          <a:p>
+            <a:pPr marL="0" indent="0">
+              <a:buNone/>
+            </a:pPr>
+            <a:r>
+              <a:rPr lang="en-GB" dirty="0" err="1" smtClean="0">
+                <a:latin typeface="Consolas" pitchFamily="49" charset="0"/>
+                <a:cs typeface="Consolas" pitchFamily="49" charset="0"/>
+              </a:rPr>
+              <a:t>var</a:t>
+            </a:r>
+            <a:r>
+              <a:rPr lang="en-GB" dirty="0" smtClean="0">
+                <a:latin typeface="Consolas" pitchFamily="49" charset="0"/>
+                <a:cs typeface="Consolas" pitchFamily="49" charset="0"/>
+              </a:rPr>
+              <a:t> </a:t>
+            </a:r>
+            <a:r>
+              <a:rPr lang="en-GB" dirty="0" err="1" smtClean="0">
+                <a:latin typeface="Consolas" pitchFamily="49" charset="0"/>
+                <a:cs typeface="Consolas" pitchFamily="49" charset="0"/>
+              </a:rPr>
+              <a:t>makeAwesome</a:t>
+            </a:r>
+            <a:r>
+              <a:rPr lang="en-GB" dirty="0" smtClean="0">
+                <a:latin typeface="Consolas" pitchFamily="49" charset="0"/>
+                <a:cs typeface="Consolas" pitchFamily="49" charset="0"/>
+              </a:rPr>
+              <a:t> = combine(</a:t>
+            </a:r>
+            <a:r>
+              <a:rPr lang="en-GB" dirty="0" err="1" smtClean="0">
+                <a:latin typeface="Consolas" pitchFamily="49" charset="0"/>
+                <a:cs typeface="Consolas" pitchFamily="49" charset="0"/>
+              </a:rPr>
+              <a:t>addCheese</a:t>
+            </a:r>
+            <a:r>
+              <a:rPr lang="en-GB" dirty="0" smtClean="0">
+                <a:latin typeface="Consolas" pitchFamily="49" charset="0"/>
+                <a:cs typeface="Consolas" pitchFamily="49" charset="0"/>
+              </a:rPr>
+              <a:t>, </a:t>
+            </a:r>
+            <a:r>
+              <a:rPr lang="en-GB" dirty="0" err="1" smtClean="0">
+                <a:latin typeface="Consolas" pitchFamily="49" charset="0"/>
+                <a:cs typeface="Consolas" pitchFamily="49" charset="0"/>
+              </a:rPr>
+              <a:t>addBacon</a:t>
+            </a:r>
+            <a:r>
+              <a:rPr lang="en-GB" dirty="0" smtClean="0">
+                <a:latin typeface="Consolas" pitchFamily="49" charset="0"/>
+                <a:cs typeface="Consolas" pitchFamily="49" charset="0"/>
+              </a:rPr>
+              <a:t>);</a:t>
+            </a:r>
+          </a:p>
+          <a:p>
+            <a:pPr marL="0" indent="0">
+              <a:buNone/>
+            </a:pPr>
+            <a:endParaRPr lang="en-GB" dirty="0">
+              <a:latin typeface="Consolas" pitchFamily="49" charset="0"/>
+              <a:cs typeface="Consolas" pitchFamily="49" charset="0"/>
+            </a:endParaRPr>
+          </a:p>
+          <a:p>
+            <a:pPr marL="0" indent="0">
+              <a:buNone/>
+            </a:pPr>
+            <a:r>
+              <a:rPr lang="en-GB" dirty="0" smtClean="0">
+                <a:latin typeface="Consolas" pitchFamily="49" charset="0"/>
+                <a:cs typeface="Consolas" pitchFamily="49" charset="0"/>
+              </a:rPr>
+              <a:t>alert(</a:t>
+            </a:r>
+            <a:r>
+              <a:rPr lang="en-GB" dirty="0" err="1" smtClean="0">
+                <a:latin typeface="Consolas" pitchFamily="49" charset="0"/>
+                <a:cs typeface="Consolas" pitchFamily="49" charset="0"/>
+              </a:rPr>
+              <a:t>makeAwesome</a:t>
+            </a:r>
+            <a:r>
+              <a:rPr lang="en-GB" dirty="0" smtClean="0">
+                <a:latin typeface="Consolas" pitchFamily="49" charset="0"/>
+                <a:cs typeface="Consolas" pitchFamily="49" charset="0"/>
+              </a:rPr>
+              <a:t>(“ice-cream”));</a:t>
+            </a:r>
           </a:p>
         </p:txBody>
       </p:sp>
@@ -10319,7 +10503,7 @@
       </p:grpSpPr>
       <p:sp>
         <p:nvSpPr>
-          <p:cNvPr id="2" name="Title 1"/>
+          <p:cNvPr id="6" name="Title 5"/>
           <p:cNvSpPr>
             <a:spLocks noGrp="1"/>
           </p:cNvSpPr>
@@ -10342,7 +10526,7 @@
       </p:sp>
       <p:sp>
         <p:nvSpPr>
-          <p:cNvPr id="3" name="Content Placeholder 2"/>
+          <p:cNvPr id="8" name="Content Placeholder 2"/>
           <p:cNvSpPr>
             <a:spLocks noGrp="1"/>
           </p:cNvSpPr>
@@ -10350,12 +10534,202 @@
             <p:ph idx="1"/>
           </p:nvPr>
         </p:nvSpPr>
-        <p:spPr/>
-        <p:txBody>
-          <a:bodyPr/>
+        <p:spPr>
+          <a:xfrm>
+            <a:off x="457200" y="1600200"/>
+            <a:ext cx="8229600" cy="4525963"/>
+          </a:xfrm>
+        </p:spPr>
+        <p:txBody>
+          <a:bodyPr>
+            <a:normAutofit/>
+          </a:bodyPr>
           <a:lstStyle/>
           <a:p>
-            <a:endParaRPr lang="en-GB"/>
+            <a:pPr marL="0" indent="0">
+              <a:buNone/>
+            </a:pPr>
+            <a:r>
+              <a:rPr lang="en-GB" sz="2000" dirty="0" err="1" smtClean="0">
+                <a:latin typeface="Consolas" pitchFamily="49" charset="0"/>
+                <a:cs typeface="Consolas" pitchFamily="49" charset="0"/>
+              </a:rPr>
+              <a:t>var</a:t>
+            </a:r>
+            <a:r>
+              <a:rPr lang="en-GB" sz="2000" dirty="0" smtClean="0">
+                <a:latin typeface="Consolas" pitchFamily="49" charset="0"/>
+                <a:cs typeface="Consolas" pitchFamily="49" charset="0"/>
+              </a:rPr>
+              <a:t> Hero = function(name, alias) {</a:t>
+            </a:r>
+          </a:p>
+          <a:p>
+            <a:pPr marL="0" indent="0">
+              <a:buNone/>
+            </a:pPr>
+            <a:r>
+              <a:rPr lang="en-GB" sz="2000" dirty="0">
+                <a:latin typeface="Consolas" pitchFamily="49" charset="0"/>
+                <a:cs typeface="Consolas" pitchFamily="49" charset="0"/>
+              </a:rPr>
+              <a:t> </a:t>
+            </a:r>
+            <a:r>
+              <a:rPr lang="en-GB" sz="2000" dirty="0" smtClean="0">
+                <a:latin typeface="Consolas" pitchFamily="49" charset="0"/>
+                <a:cs typeface="Consolas" pitchFamily="49" charset="0"/>
+              </a:rPr>
+              <a:t>  this.name = name;</a:t>
+            </a:r>
+          </a:p>
+          <a:p>
+            <a:pPr marL="0" indent="0">
+              <a:buNone/>
+            </a:pPr>
+            <a:r>
+              <a:rPr lang="en-GB" sz="2000" dirty="0" smtClean="0">
+                <a:latin typeface="Consolas" pitchFamily="49" charset="0"/>
+                <a:cs typeface="Consolas" pitchFamily="49" charset="0"/>
+              </a:rPr>
+              <a:t>   </a:t>
+            </a:r>
+            <a:r>
+              <a:rPr lang="en-GB" sz="2000" dirty="0" err="1" smtClean="0">
+                <a:latin typeface="Consolas" pitchFamily="49" charset="0"/>
+                <a:cs typeface="Consolas" pitchFamily="49" charset="0"/>
+              </a:rPr>
+              <a:t>this.alias</a:t>
+            </a:r>
+            <a:r>
+              <a:rPr lang="en-GB" sz="2000" dirty="0" smtClean="0">
+                <a:latin typeface="Consolas" pitchFamily="49" charset="0"/>
+                <a:cs typeface="Consolas" pitchFamily="49" charset="0"/>
+              </a:rPr>
+              <a:t> = alias;</a:t>
+            </a:r>
+          </a:p>
+          <a:p>
+            <a:pPr marL="0" indent="0">
+              <a:buNone/>
+            </a:pPr>
+            <a:r>
+              <a:rPr lang="en-GB" sz="2000" dirty="0" smtClean="0">
+                <a:latin typeface="Consolas" pitchFamily="49" charset="0"/>
+                <a:cs typeface="Consolas" pitchFamily="49" charset="0"/>
+              </a:rPr>
+              <a:t>}</a:t>
+            </a:r>
+          </a:p>
+          <a:p>
+            <a:pPr marL="0" indent="0">
+              <a:buNone/>
+            </a:pPr>
+            <a:endParaRPr lang="en-GB" sz="2000" dirty="0">
+              <a:latin typeface="Consolas" pitchFamily="49" charset="0"/>
+              <a:cs typeface="Consolas" pitchFamily="49" charset="0"/>
+            </a:endParaRPr>
+          </a:p>
+          <a:p>
+            <a:pPr marL="0" indent="0">
+              <a:buNone/>
+            </a:pPr>
+            <a:r>
+              <a:rPr lang="en-GB" sz="2000" dirty="0" err="1" smtClean="0">
+                <a:latin typeface="Consolas" pitchFamily="49" charset="0"/>
+                <a:cs typeface="Consolas" pitchFamily="49" charset="0"/>
+              </a:rPr>
+              <a:t>var</a:t>
+            </a:r>
+            <a:r>
+              <a:rPr lang="en-GB" sz="2000" dirty="0" smtClean="0">
+                <a:latin typeface="Consolas" pitchFamily="49" charset="0"/>
+                <a:cs typeface="Consolas" pitchFamily="49" charset="0"/>
+              </a:rPr>
+              <a:t> superman = new Hero(“Superman”, “Clark Kent”);</a:t>
+            </a:r>
+          </a:p>
+          <a:p>
+            <a:pPr marL="0" indent="0">
+              <a:buNone/>
+            </a:pPr>
+            <a:endParaRPr lang="en-GB" sz="2000" dirty="0" smtClean="0">
+              <a:latin typeface="Consolas" pitchFamily="49" charset="0"/>
+              <a:cs typeface="Consolas" pitchFamily="49" charset="0"/>
+            </a:endParaRPr>
+          </a:p>
+          <a:p>
+            <a:pPr marL="0" indent="0">
+              <a:buNone/>
+            </a:pPr>
+            <a:r>
+              <a:rPr lang="en-GB" sz="2000" dirty="0" err="1" smtClean="0">
+                <a:latin typeface="Consolas" pitchFamily="49" charset="0"/>
+                <a:cs typeface="Consolas" pitchFamily="49" charset="0"/>
+              </a:rPr>
+              <a:t>superman.cape</a:t>
+            </a:r>
+            <a:r>
+              <a:rPr lang="en-GB" sz="2000" dirty="0" smtClean="0">
+                <a:latin typeface="Consolas" pitchFamily="49" charset="0"/>
+                <a:cs typeface="Consolas" pitchFamily="49" charset="0"/>
+              </a:rPr>
+              <a:t> = “red”;</a:t>
+            </a:r>
+          </a:p>
+          <a:p>
+            <a:pPr marL="0" indent="0">
+              <a:buNone/>
+            </a:pPr>
+            <a:r>
+              <a:rPr lang="en-GB" sz="2000" dirty="0" err="1" smtClean="0">
+                <a:latin typeface="Consolas" pitchFamily="49" charset="0"/>
+                <a:cs typeface="Consolas" pitchFamily="49" charset="0"/>
+              </a:rPr>
+              <a:t>superman.fly</a:t>
+            </a:r>
+            <a:r>
+              <a:rPr lang="en-GB" sz="2000" dirty="0" smtClean="0">
+                <a:latin typeface="Consolas" pitchFamily="49" charset="0"/>
+                <a:cs typeface="Consolas" pitchFamily="49" charset="0"/>
+              </a:rPr>
+              <a:t> = function() {</a:t>
+            </a:r>
+          </a:p>
+          <a:p>
+            <a:pPr marL="0" indent="0">
+              <a:buNone/>
+            </a:pPr>
+            <a:r>
+              <a:rPr lang="en-GB" sz="2000" dirty="0">
+                <a:latin typeface="Consolas" pitchFamily="49" charset="0"/>
+                <a:cs typeface="Consolas" pitchFamily="49" charset="0"/>
+              </a:rPr>
+              <a:t>	</a:t>
+            </a:r>
+            <a:r>
+              <a:rPr lang="en-GB" sz="2000" dirty="0" smtClean="0">
+                <a:latin typeface="Consolas" pitchFamily="49" charset="0"/>
+                <a:cs typeface="Consolas" pitchFamily="49" charset="0"/>
+              </a:rPr>
+              <a:t>return(“Faster than a speeding bullet!”);</a:t>
+            </a:r>
+          </a:p>
+          <a:p>
+            <a:pPr marL="0" indent="0">
+              <a:buNone/>
+            </a:pPr>
+            <a:r>
+              <a:rPr lang="en-GB" sz="2000" dirty="0">
+                <a:latin typeface="Consolas" pitchFamily="49" charset="0"/>
+                <a:cs typeface="Consolas" pitchFamily="49" charset="0"/>
+              </a:rPr>
+              <a:t>}</a:t>
+            </a:r>
+            <a:endParaRPr lang="en-GB" sz="2000" dirty="0" smtClean="0">
+              <a:latin typeface="Consolas" pitchFamily="49" charset="0"/>
+              <a:cs typeface="Consolas" pitchFamily="49" charset="0"/>
+            </a:endParaRPr>
           </a:p>
         </p:txBody>
       </p:sp>
@@ -10986,7 +11360,7 @@
           <a:p>
             <a:r>
               <a:rPr lang="en-GB" dirty="0" smtClean="0"/>
-              <a:t>scope</a:t>
+              <a:t>Scope and Hoisting</a:t>
             </a:r>
             <a:endParaRPr lang="en-GB" dirty="0"/>
           </a:p>
@@ -11007,7 +11381,7 @@
           <a:bodyPr/>
           <a:lstStyle/>
           <a:p>
-            <a:endParaRPr lang="en-GB"/>
+            <a:endParaRPr lang="en-GB" dirty="0"/>
           </a:p>
         </p:txBody>
       </p:sp>
@@ -12839,29 +13213,7 @@
                 <a:latin typeface="Consolas" pitchFamily="49" charset="0"/>
                 <a:cs typeface="Consolas" pitchFamily="49" charset="0"/>
               </a:rPr>
-              <a:t>   </a:t>
-            </a:r>
-            <a:r>
-              <a:rPr kumimoji="0" lang="en-US" sz="3600" i="0" u="none" strike="noStrike" cap="none" normalizeH="0" baseline="0" dirty="0" smtClean="0">
-                <a:ln>
-                  <a:noFill/>
-                </a:ln>
-                <a:effectLst/>
-                <a:latin typeface="Consolas" pitchFamily="49" charset="0"/>
-                <a:cs typeface="Consolas" pitchFamily="49" charset="0"/>
-              </a:rPr>
-              <a:t>(1)</a:t>
-            </a:r>
-            <a:r>
-              <a:rPr kumimoji="0" lang="en-US" sz="3600" i="0" u="none" strike="noStrike" cap="none" normalizeH="0" baseline="0" dirty="0" smtClean="0">
-                <a:ln>
-                  <a:noFill/>
-                </a:ln>
-                <a:effectLst/>
-                <a:latin typeface="Consolas" pitchFamily="49" charset="0"/>
-                <a:cs typeface="Consolas" pitchFamily="49" charset="0"/>
-              </a:rPr>
-              <a:t/>
+              <a:t>   (1)</a:t>
             </a:r>
             <a:br>
               <a:rPr kumimoji="0" lang="en-US" sz="3600" i="0" u="none" strike="noStrike" cap="none" normalizeH="0" baseline="0" dirty="0" smtClean="0">

</xml_diff>

<commit_message>
Fonzy slide, code demos, and Features folder
</commit_message>
<xml_diff>
--- a/Slides/So You Think You Know Javascript.pptx
+++ b/Slides/So You Think You Know Javascript.pptx
@@ -5,7 +5,7 @@
     <p:sldMasterId id="2147483720" r:id="rId1"/>
   </p:sldMasterIdLst>
   <p:notesMasterIdLst>
-    <p:notesMasterId r:id="rId48"/>
+    <p:notesMasterId r:id="rId47"/>
   </p:notesMasterIdLst>
   <p:sldIdLst>
     <p:sldId id="313" r:id="rId2"/>
@@ -36,8 +36,8 @@
     <p:sldId id="302" r:id="rId27"/>
     <p:sldId id="291" r:id="rId28"/>
     <p:sldId id="294" r:id="rId29"/>
-    <p:sldId id="297" r:id="rId30"/>
-    <p:sldId id="292" r:id="rId31"/>
+    <p:sldId id="316" r:id="rId30"/>
+    <p:sldId id="297" r:id="rId31"/>
     <p:sldId id="286" r:id="rId32"/>
     <p:sldId id="295" r:id="rId33"/>
     <p:sldId id="310" r:id="rId34"/>
@@ -47,13 +47,12 @@
     <p:sldId id="257" r:id="rId38"/>
     <p:sldId id="304" r:id="rId39"/>
     <p:sldId id="258" r:id="rId40"/>
-    <p:sldId id="311" r:id="rId41"/>
-    <p:sldId id="271" r:id="rId42"/>
-    <p:sldId id="305" r:id="rId43"/>
+    <p:sldId id="271" r:id="rId41"/>
+    <p:sldId id="305" r:id="rId42"/>
+    <p:sldId id="306" r:id="rId43"/>
     <p:sldId id="309" r:id="rId44"/>
-    <p:sldId id="306" r:id="rId45"/>
-    <p:sldId id="282" r:id="rId46"/>
-    <p:sldId id="315" r:id="rId47"/>
+    <p:sldId id="317" r:id="rId45"/>
+    <p:sldId id="315" r:id="rId46"/>
   </p:sldIdLst>
   <p:sldSz cx="9144000" cy="6858000" type="screen4x3"/>
   <p:notesSz cx="6858000" cy="9144000"/>
@@ -237,6 +236,7 @@
           <a:p>
             <a:fld id="{1A072DB4-5734-40B7-9405-EBC05FE61D64}" type="datetimeFigureOut">
               <a:rPr lang="en-GB" smtClean="0"/>
+              <a:pPr/>
               <a:t>04/04/2011</a:t>
             </a:fld>
             <a:endParaRPr lang="en-GB"/>
@@ -396,6 +396,7 @@
           <a:p>
             <a:fld id="{680E7421-152F-4C5F-A339-C37B49386B6D}" type="slidenum">
               <a:rPr lang="en-GB" smtClean="0"/>
+              <a:pPr/>
               <a:t>‹#›</a:t>
             </a:fld>
             <a:endParaRPr lang="en-GB"/>
@@ -405,7 +406,7 @@
     </p:spTree>
     <p:extLst>
       <p:ext uri="{BB962C8B-B14F-4D97-AF65-F5344CB8AC3E}">
-        <p14:creationId xmlns:p14="http://schemas.microsoft.com/office/powerpoint/2010/main" val="610612025"/>
+        <p14:creationId xmlns:p14="http://schemas.microsoft.com/office/powerpoint/2010/main" xmlns="" val="610612025"/>
       </p:ext>
     </p:extLst>
   </p:cSld>
@@ -596,6 +597,7 @@
           <a:p>
             <a:fld id="{680E7421-152F-4C5F-A339-C37B49386B6D}" type="slidenum">
               <a:rPr lang="en-GB" smtClean="0"/>
+              <a:pPr/>
               <a:t>2</a:t>
             </a:fld>
             <a:endParaRPr lang="en-GB"/>
@@ -605,7 +607,7 @@
     </p:spTree>
     <p:extLst>
       <p:ext uri="{BB962C8B-B14F-4D97-AF65-F5344CB8AC3E}">
-        <p14:creationId xmlns:p14="http://schemas.microsoft.com/office/powerpoint/2010/main" val="2826732040"/>
+        <p14:creationId xmlns:p14="http://schemas.microsoft.com/office/powerpoint/2010/main" xmlns="" val="2826732040"/>
       </p:ext>
     </p:extLst>
   </p:cSld>
@@ -743,6 +745,7 @@
           <a:p>
             <a:fld id="{680E7421-152F-4C5F-A339-C37B49386B6D}" type="slidenum">
               <a:rPr lang="en-GB" smtClean="0"/>
+              <a:pPr/>
               <a:t>11</a:t>
             </a:fld>
             <a:endParaRPr lang="en-GB"/>
@@ -752,7 +755,7 @@
     </p:spTree>
     <p:extLst>
       <p:ext uri="{BB962C8B-B14F-4D97-AF65-F5344CB8AC3E}">
-        <p14:creationId xmlns:p14="http://schemas.microsoft.com/office/powerpoint/2010/main" val="1081184773"/>
+        <p14:creationId xmlns:p14="http://schemas.microsoft.com/office/powerpoint/2010/main" xmlns="" val="1081184773"/>
       </p:ext>
     </p:extLst>
   </p:cSld>
@@ -867,6 +870,7 @@
           <a:p>
             <a:fld id="{680E7421-152F-4C5F-A339-C37B49386B6D}" type="slidenum">
               <a:rPr lang="en-GB" smtClean="0"/>
+              <a:pPr/>
               <a:t>12</a:t>
             </a:fld>
             <a:endParaRPr lang="en-GB"/>
@@ -876,7 +880,7 @@
     </p:spTree>
     <p:extLst>
       <p:ext uri="{BB962C8B-B14F-4D97-AF65-F5344CB8AC3E}">
-        <p14:creationId xmlns:p14="http://schemas.microsoft.com/office/powerpoint/2010/main" val="233567828"/>
+        <p14:creationId xmlns:p14="http://schemas.microsoft.com/office/powerpoint/2010/main" xmlns="" val="233567828"/>
       </p:ext>
     </p:extLst>
   </p:cSld>
@@ -1016,6 +1020,7 @@
           <a:p>
             <a:fld id="{680E7421-152F-4C5F-A339-C37B49386B6D}" type="slidenum">
               <a:rPr lang="en-GB" smtClean="0"/>
+              <a:pPr/>
               <a:t>13</a:t>
             </a:fld>
             <a:endParaRPr lang="en-GB"/>
@@ -1025,7 +1030,7 @@
     </p:spTree>
     <p:extLst>
       <p:ext uri="{BB962C8B-B14F-4D97-AF65-F5344CB8AC3E}">
-        <p14:creationId xmlns:p14="http://schemas.microsoft.com/office/powerpoint/2010/main" val="2125697358"/>
+        <p14:creationId xmlns:p14="http://schemas.microsoft.com/office/powerpoint/2010/main" xmlns="" val="2125697358"/>
       </p:ext>
     </p:extLst>
   </p:cSld>
@@ -1328,6 +1333,7 @@
           <a:p>
             <a:fld id="{680E7421-152F-4C5F-A339-C37B49386B6D}" type="slidenum">
               <a:rPr lang="en-GB" smtClean="0"/>
+              <a:pPr/>
               <a:t>14</a:t>
             </a:fld>
             <a:endParaRPr lang="en-GB"/>
@@ -1337,7 +1343,7 @@
     </p:spTree>
     <p:extLst>
       <p:ext uri="{BB962C8B-B14F-4D97-AF65-F5344CB8AC3E}">
-        <p14:creationId xmlns:p14="http://schemas.microsoft.com/office/powerpoint/2010/main" val="2417948286"/>
+        <p14:creationId xmlns:p14="http://schemas.microsoft.com/office/powerpoint/2010/main" xmlns="" val="2417948286"/>
       </p:ext>
     </p:extLst>
   </p:cSld>
@@ -1508,6 +1514,7 @@
           <a:p>
             <a:fld id="{680E7421-152F-4C5F-A339-C37B49386B6D}" type="slidenum">
               <a:rPr lang="en-GB" smtClean="0"/>
+              <a:pPr/>
               <a:t>15</a:t>
             </a:fld>
             <a:endParaRPr lang="en-GB"/>
@@ -1517,7 +1524,7 @@
     </p:spTree>
     <p:extLst>
       <p:ext uri="{BB962C8B-B14F-4D97-AF65-F5344CB8AC3E}">
-        <p14:creationId xmlns:p14="http://schemas.microsoft.com/office/powerpoint/2010/main" val="3266073170"/>
+        <p14:creationId xmlns:p14="http://schemas.microsoft.com/office/powerpoint/2010/main" xmlns="" val="3266073170"/>
       </p:ext>
     </p:extLst>
   </p:cSld>
@@ -1968,6 +1975,7 @@
           <a:p>
             <a:fld id="{680E7421-152F-4C5F-A339-C37B49386B6D}" type="slidenum">
               <a:rPr lang="en-GB" smtClean="0"/>
+              <a:pPr/>
               <a:t>16</a:t>
             </a:fld>
             <a:endParaRPr lang="en-GB"/>
@@ -1977,7 +1985,7 @@
     </p:spTree>
     <p:extLst>
       <p:ext uri="{BB962C8B-B14F-4D97-AF65-F5344CB8AC3E}">
-        <p14:creationId xmlns:p14="http://schemas.microsoft.com/office/powerpoint/2010/main" val="3972150295"/>
+        <p14:creationId xmlns:p14="http://schemas.microsoft.com/office/powerpoint/2010/main" xmlns="" val="3972150295"/>
       </p:ext>
     </p:extLst>
   </p:cSld>
@@ -2054,25 +2062,16 @@
             </a:r>
           </a:p>
           <a:p>
-            <a:pPr lvl="0"/>
-            <a:r>
-              <a:rPr lang="en-GB" sz="1600" kern="1200" dirty="0" smtClean="0">
-                <a:solidFill>
-                  <a:schemeClr val="tx1"/>
-                </a:solidFill>
-                <a:effectLst/>
-                <a:latin typeface="+mn-lt"/>
-                <a:ea typeface="+mn-ea"/>
-                <a:cs typeface="+mn-cs"/>
-              </a:rPr>
-              <a:t>July 2006 – JSON described formally in RFC 4627</a:t>
-            </a:r>
             <a:endParaRPr lang="en-GB" dirty="0" smtClean="0"/>
           </a:p>
           <a:p>
             <a:r>
               <a:rPr lang="en-GB" dirty="0" smtClean="0"/>
-              <a:t>August 2006 – John</a:t>
+              <a:t>August </a:t>
+            </a:r>
+            <a:r>
+              <a:rPr lang="en-GB" dirty="0" smtClean="0"/>
+              <a:t>2006 – John</a:t>
             </a:r>
             <a:r>
               <a:rPr lang="en-GB" baseline="0" dirty="0" smtClean="0"/>
@@ -2092,8 +2091,53 @@
             </a:r>
             <a:r>
               <a:rPr lang="en-GB" dirty="0" smtClean="0"/>
-              <a:t> 1.0</a:t>
-            </a:r>
+              <a:t> </a:t>
+            </a:r>
+            <a:r>
+              <a:rPr lang="en-GB" dirty="0" smtClean="0"/>
+              <a:t>1.0</a:t>
+            </a:r>
+          </a:p>
+          <a:p>
+            <a:endParaRPr lang="en-GB" dirty="0" smtClean="0"/>
+          </a:p>
+          <a:p>
+            <a:r>
+              <a:rPr lang="en-GB" dirty="0" smtClean="0"/>
+              <a:t>John </a:t>
+            </a:r>
+            <a:r>
+              <a:rPr lang="en-GB" dirty="0" err="1" smtClean="0"/>
+              <a:t>Resig</a:t>
+            </a:r>
+            <a:r>
+              <a:rPr lang="en-GB" dirty="0" smtClean="0"/>
+              <a:t> is to </a:t>
+            </a:r>
+            <a:r>
+              <a:rPr lang="en-GB" dirty="0" err="1" smtClean="0"/>
+              <a:t>Javascript</a:t>
+            </a:r>
+            <a:r>
+              <a:rPr lang="en-GB" dirty="0" smtClean="0"/>
+              <a:t> what </a:t>
+            </a:r>
+            <a:r>
+              <a:rPr lang="en-GB" dirty="0" err="1" smtClean="0"/>
+              <a:t>Jimi</a:t>
+            </a:r>
+            <a:r>
+              <a:rPr lang="en-GB" dirty="0" smtClean="0"/>
+              <a:t> Hendrix was to the electric guitar – he did something singularly amazing</a:t>
+            </a:r>
+            <a:r>
+              <a:rPr lang="en-GB" baseline="0" dirty="0" smtClean="0"/>
+              <a:t> that just wouldn't have been possible using anything else.</a:t>
+            </a:r>
+            <a:endParaRPr lang="en-GB" dirty="0" smtClean="0"/>
+          </a:p>
+          <a:p>
+            <a:endParaRPr lang="en-GB" dirty="0" smtClean="0"/>
           </a:p>
           <a:p>
             <a:r>
@@ -2134,7 +2178,11 @@
           <a:p>
             <a:r>
               <a:rPr lang="en-GB" dirty="0" smtClean="0"/>
-              <a:t>June 2007 – iPhone</a:t>
+              <a:t>June </a:t>
+            </a:r>
+            <a:r>
+              <a:rPr lang="en-GB" dirty="0" smtClean="0"/>
+              <a:t>2007 – iPhone</a:t>
             </a:r>
             <a:r>
               <a:rPr lang="en-GB" baseline="0" dirty="0" smtClean="0"/>
@@ -2310,6 +2358,7 @@
           <a:p>
             <a:fld id="{680E7421-152F-4C5F-A339-C37B49386B6D}" type="slidenum">
               <a:rPr lang="en-GB" smtClean="0"/>
+              <a:pPr/>
               <a:t>17</a:t>
             </a:fld>
             <a:endParaRPr lang="en-GB"/>
@@ -2319,7 +2368,7 @@
     </p:spTree>
     <p:extLst>
       <p:ext uri="{BB962C8B-B14F-4D97-AF65-F5344CB8AC3E}">
-        <p14:creationId xmlns:p14="http://schemas.microsoft.com/office/powerpoint/2010/main" val="4126551459"/>
+        <p14:creationId xmlns:p14="http://schemas.microsoft.com/office/powerpoint/2010/main" xmlns="" val="4126551459"/>
       </p:ext>
     </p:extLst>
   </p:cSld>
@@ -2433,6 +2482,7 @@
           <a:p>
             <a:fld id="{680E7421-152F-4C5F-A339-C37B49386B6D}" type="slidenum">
               <a:rPr lang="en-GB" smtClean="0"/>
+              <a:pPr/>
               <a:t>18</a:t>
             </a:fld>
             <a:endParaRPr lang="en-GB"/>
@@ -2442,7 +2492,7 @@
     </p:spTree>
     <p:extLst>
       <p:ext uri="{BB962C8B-B14F-4D97-AF65-F5344CB8AC3E}">
-        <p14:creationId xmlns:p14="http://schemas.microsoft.com/office/powerpoint/2010/main" val="3726384715"/>
+        <p14:creationId xmlns:p14="http://schemas.microsoft.com/office/powerpoint/2010/main" xmlns="" val="3726384715"/>
       </p:ext>
     </p:extLst>
   </p:cSld>
@@ -2517,6 +2567,7 @@
           <a:p>
             <a:fld id="{680E7421-152F-4C5F-A339-C37B49386B6D}" type="slidenum">
               <a:rPr lang="en-GB" smtClean="0"/>
+              <a:pPr/>
               <a:t>19</a:t>
             </a:fld>
             <a:endParaRPr lang="en-GB"/>
@@ -2526,7 +2577,7 @@
     </p:spTree>
     <p:extLst>
       <p:ext uri="{BB962C8B-B14F-4D97-AF65-F5344CB8AC3E}">
-        <p14:creationId xmlns:p14="http://schemas.microsoft.com/office/powerpoint/2010/main" val="130714547"/>
+        <p14:creationId xmlns:p14="http://schemas.microsoft.com/office/powerpoint/2010/main" xmlns="" val="130714547"/>
       </p:ext>
     </p:extLst>
   </p:cSld>
@@ -2590,19 +2641,7 @@
                 <a:ea typeface="+mn-ea"/>
                 <a:cs typeface="+mn-cs"/>
               </a:rPr>
-              <a:t>In Self, and other prototype-based languages, the duality between classes and object instances is eliminated</a:t>
-            </a:r>
-            <a:r>
-              <a:rPr lang="en-GB" sz="1200" b="0" i="0" kern="1200" dirty="0" smtClean="0">
-                <a:solidFill>
-                  <a:schemeClr val="tx1"/>
-                </a:solidFill>
-                <a:effectLst/>
-                <a:latin typeface="+mn-lt"/>
-                <a:ea typeface="+mn-ea"/>
-                <a:cs typeface="+mn-cs"/>
-              </a:rPr>
-              <a:t>.</a:t>
+              <a:t>In Self, and other prototype-based languages, the duality between classes and object instances is eliminated.</a:t>
             </a:r>
           </a:p>
           <a:p>
@@ -2687,6 +2726,7 @@
           <a:p>
             <a:fld id="{680E7421-152F-4C5F-A339-C37B49386B6D}" type="slidenum">
               <a:rPr lang="en-GB" smtClean="0"/>
+              <a:pPr/>
               <a:t>20</a:t>
             </a:fld>
             <a:endParaRPr lang="en-GB"/>
@@ -2696,7 +2736,7 @@
     </p:spTree>
     <p:extLst>
       <p:ext uri="{BB962C8B-B14F-4D97-AF65-F5344CB8AC3E}">
-        <p14:creationId xmlns:p14="http://schemas.microsoft.com/office/powerpoint/2010/main" val="2139152777"/>
+        <p14:creationId xmlns:p14="http://schemas.microsoft.com/office/powerpoint/2010/main" xmlns="" val="2139152777"/>
       </p:ext>
     </p:extLst>
   </p:cSld>
@@ -2785,6 +2825,7 @@
           <a:p>
             <a:fld id="{680E7421-152F-4C5F-A339-C37B49386B6D}" type="slidenum">
               <a:rPr lang="en-GB" smtClean="0"/>
+              <a:pPr/>
               <a:t>3</a:t>
             </a:fld>
             <a:endParaRPr lang="en-GB"/>
@@ -2794,9 +2835,783 @@
     </p:spTree>
     <p:extLst>
       <p:ext uri="{BB962C8B-B14F-4D97-AF65-F5344CB8AC3E}">
-        <p14:creationId xmlns:p14="http://schemas.microsoft.com/office/powerpoint/2010/main" val="601231661"/>
+        <p14:creationId xmlns:p14="http://schemas.microsoft.com/office/powerpoint/2010/main" xmlns="" val="601231661"/>
       </p:ext>
     </p:extLst>
+  </p:cSld>
+  <p:clrMapOvr>
+    <a:masterClrMapping/>
+  </p:clrMapOvr>
+</p:notes>
+</file>
+
+<file path=ppt/notesSlides/notesSlide20.xml><?xml version="1.0" encoding="utf-8"?>
+<p:notes xmlns:a="http://schemas.openxmlformats.org/drawingml/2006/main" xmlns:r="http://schemas.openxmlformats.org/officeDocument/2006/relationships" xmlns:p="http://schemas.openxmlformats.org/presentationml/2006/main">
+  <p:cSld>
+    <p:spTree>
+      <p:nvGrpSpPr>
+        <p:cNvPr id="1" name=""/>
+        <p:cNvGrpSpPr/>
+        <p:nvPr/>
+      </p:nvGrpSpPr>
+      <p:grpSpPr>
+        <a:xfrm>
+          <a:off x="0" y="0"/>
+          <a:ext cx="0" cy="0"/>
+          <a:chOff x="0" y="0"/>
+          <a:chExt cx="0" cy="0"/>
+        </a:xfrm>
+      </p:grpSpPr>
+      <p:sp>
+        <p:nvSpPr>
+          <p:cNvPr id="2" name="Slide Image Placeholder 1"/>
+          <p:cNvSpPr>
+            <a:spLocks noGrp="1" noRot="1" noChangeAspect="1"/>
+          </p:cNvSpPr>
+          <p:nvPr>
+            <p:ph type="sldImg"/>
+          </p:nvPr>
+        </p:nvSpPr>
+        <p:spPr/>
+      </p:sp>
+      <p:sp>
+        <p:nvSpPr>
+          <p:cNvPr id="3" name="Notes Placeholder 2"/>
+          <p:cNvSpPr>
+            <a:spLocks noGrp="1"/>
+          </p:cNvSpPr>
+          <p:nvPr>
+            <p:ph type="body" idx="1"/>
+          </p:nvPr>
+        </p:nvSpPr>
+        <p:spPr/>
+        <p:txBody>
+          <a:bodyPr>
+            <a:normAutofit/>
+          </a:bodyPr>
+          <a:lstStyle/>
+          <a:p>
+            <a:endParaRPr lang="en-GB" dirty="0"/>
+          </a:p>
+        </p:txBody>
+      </p:sp>
+      <p:sp>
+        <p:nvSpPr>
+          <p:cNvPr id="4" name="Slide Number Placeholder 3"/>
+          <p:cNvSpPr>
+            <a:spLocks noGrp="1"/>
+          </p:cNvSpPr>
+          <p:nvPr>
+            <p:ph type="sldNum" sz="quarter" idx="10"/>
+          </p:nvPr>
+        </p:nvSpPr>
+        <p:spPr/>
+        <p:txBody>
+          <a:bodyPr/>
+          <a:lstStyle/>
+          <a:p>
+            <a:fld id="{680E7421-152F-4C5F-A339-C37B49386B6D}" type="slidenum">
+              <a:rPr lang="en-GB" smtClean="0"/>
+              <a:pPr/>
+              <a:t>22</a:t>
+            </a:fld>
+            <a:endParaRPr lang="en-GB"/>
+          </a:p>
+        </p:txBody>
+      </p:sp>
+    </p:spTree>
+  </p:cSld>
+  <p:clrMapOvr>
+    <a:masterClrMapping/>
+  </p:clrMapOvr>
+</p:notes>
+</file>
+
+<file path=ppt/notesSlides/notesSlide21.xml><?xml version="1.0" encoding="utf-8"?>
+<p:notes xmlns:a="http://schemas.openxmlformats.org/drawingml/2006/main" xmlns:r="http://schemas.openxmlformats.org/officeDocument/2006/relationships" xmlns:p="http://schemas.openxmlformats.org/presentationml/2006/main">
+  <p:cSld>
+    <p:spTree>
+      <p:nvGrpSpPr>
+        <p:cNvPr id="1" name=""/>
+        <p:cNvGrpSpPr/>
+        <p:nvPr/>
+      </p:nvGrpSpPr>
+      <p:grpSpPr>
+        <a:xfrm>
+          <a:off x="0" y="0"/>
+          <a:ext cx="0" cy="0"/>
+          <a:chOff x="0" y="0"/>
+          <a:chExt cx="0" cy="0"/>
+        </a:xfrm>
+      </p:grpSpPr>
+      <p:sp>
+        <p:nvSpPr>
+          <p:cNvPr id="2" name="Slide Image Placeholder 1"/>
+          <p:cNvSpPr>
+            <a:spLocks noGrp="1" noRot="1" noChangeAspect="1"/>
+          </p:cNvSpPr>
+          <p:nvPr>
+            <p:ph type="sldImg"/>
+          </p:nvPr>
+        </p:nvSpPr>
+        <p:spPr/>
+      </p:sp>
+      <p:sp>
+        <p:nvSpPr>
+          <p:cNvPr id="3" name="Notes Placeholder 2"/>
+          <p:cNvSpPr>
+            <a:spLocks noGrp="1"/>
+          </p:cNvSpPr>
+          <p:nvPr>
+            <p:ph type="body" idx="1"/>
+          </p:nvPr>
+        </p:nvSpPr>
+        <p:spPr/>
+        <p:txBody>
+          <a:bodyPr>
+            <a:normAutofit/>
+          </a:bodyPr>
+          <a:lstStyle/>
+          <a:p>
+            <a:endParaRPr lang="en-GB" dirty="0"/>
+          </a:p>
+        </p:txBody>
+      </p:sp>
+      <p:sp>
+        <p:nvSpPr>
+          <p:cNvPr id="4" name="Slide Number Placeholder 3"/>
+          <p:cNvSpPr>
+            <a:spLocks noGrp="1"/>
+          </p:cNvSpPr>
+          <p:nvPr>
+            <p:ph type="sldNum" sz="quarter" idx="10"/>
+          </p:nvPr>
+        </p:nvSpPr>
+        <p:spPr/>
+        <p:txBody>
+          <a:bodyPr/>
+          <a:lstStyle/>
+          <a:p>
+            <a:fld id="{680E7421-152F-4C5F-A339-C37B49386B6D}" type="slidenum">
+              <a:rPr lang="en-GB" smtClean="0"/>
+              <a:pPr/>
+              <a:t>29</a:t>
+            </a:fld>
+            <a:endParaRPr lang="en-GB"/>
+          </a:p>
+        </p:txBody>
+      </p:sp>
+    </p:spTree>
+  </p:cSld>
+  <p:clrMapOvr>
+    <a:masterClrMapping/>
+  </p:clrMapOvr>
+</p:notes>
+</file>
+
+<file path=ppt/notesSlides/notesSlide22.xml><?xml version="1.0" encoding="utf-8"?>
+<p:notes xmlns:a="http://schemas.openxmlformats.org/drawingml/2006/main" xmlns:r="http://schemas.openxmlformats.org/officeDocument/2006/relationships" xmlns:p="http://schemas.openxmlformats.org/presentationml/2006/main">
+  <p:cSld>
+    <p:spTree>
+      <p:nvGrpSpPr>
+        <p:cNvPr id="1" name=""/>
+        <p:cNvGrpSpPr/>
+        <p:nvPr/>
+      </p:nvGrpSpPr>
+      <p:grpSpPr>
+        <a:xfrm>
+          <a:off x="0" y="0"/>
+          <a:ext cx="0" cy="0"/>
+          <a:chOff x="0" y="0"/>
+          <a:chExt cx="0" cy="0"/>
+        </a:xfrm>
+      </p:grpSpPr>
+      <p:sp>
+        <p:nvSpPr>
+          <p:cNvPr id="2" name="Slide Image Placeholder 1"/>
+          <p:cNvSpPr>
+            <a:spLocks noGrp="1" noRot="1" noChangeAspect="1"/>
+          </p:cNvSpPr>
+          <p:nvPr>
+            <p:ph type="sldImg"/>
+          </p:nvPr>
+        </p:nvSpPr>
+        <p:spPr/>
+      </p:sp>
+      <p:sp>
+        <p:nvSpPr>
+          <p:cNvPr id="3" name="Notes Placeholder 2"/>
+          <p:cNvSpPr>
+            <a:spLocks noGrp="1"/>
+          </p:cNvSpPr>
+          <p:nvPr>
+            <p:ph type="body" idx="1"/>
+          </p:nvPr>
+        </p:nvSpPr>
+        <p:spPr/>
+        <p:txBody>
+          <a:bodyPr>
+            <a:normAutofit/>
+          </a:bodyPr>
+          <a:lstStyle/>
+          <a:p>
+            <a:r>
+              <a:rPr lang="en-GB" dirty="0" smtClean="0"/>
+              <a:t>When you're assigning event handlers, you are NOT saying "when I click this button, instantiate</a:t>
+            </a:r>
+            <a:r>
+              <a:rPr lang="en-GB" baseline="0" dirty="0" smtClean="0"/>
+              <a:t> a new Controller object and run the Click() method on it" You are saying "there is a block of code that happens to be on that Controller object, and I want you to use that code as your click handler"</a:t>
+            </a:r>
+          </a:p>
+          <a:p>
+            <a:endParaRPr lang="en-GB" baseline="0" dirty="0" smtClean="0"/>
+          </a:p>
+          <a:p>
+            <a:r>
+              <a:rPr lang="en-GB" baseline="0" dirty="0" smtClean="0"/>
+              <a:t>"this" does not mean "the object that defined this behaviour", it means "the object that INVOKED this behaviour"</a:t>
+            </a:r>
+          </a:p>
+          <a:p>
+            <a:endParaRPr lang="en-GB" baseline="0" dirty="0" smtClean="0"/>
+          </a:p>
+          <a:p>
+            <a:r>
+              <a:rPr lang="en-GB" baseline="0" dirty="0" smtClean="0"/>
+              <a:t>So when you assign a code to a button's click event, when the code runs, 'this' refers to the button – NOT to the controller or object that defines it.</a:t>
+            </a:r>
+          </a:p>
+          <a:p>
+            <a:endParaRPr lang="en-GB" baseline="0" dirty="0" smtClean="0"/>
+          </a:p>
+          <a:p>
+            <a:endParaRPr lang="en-GB" baseline="0" dirty="0" smtClean="0"/>
+          </a:p>
+          <a:p>
+            <a:endParaRPr lang="en-GB" baseline="0" dirty="0" smtClean="0"/>
+          </a:p>
+        </p:txBody>
+      </p:sp>
+      <p:sp>
+        <p:nvSpPr>
+          <p:cNvPr id="4" name="Slide Number Placeholder 3"/>
+          <p:cNvSpPr>
+            <a:spLocks noGrp="1"/>
+          </p:cNvSpPr>
+          <p:nvPr>
+            <p:ph type="sldNum" sz="quarter" idx="10"/>
+          </p:nvPr>
+        </p:nvSpPr>
+        <p:spPr/>
+        <p:txBody>
+          <a:bodyPr/>
+          <a:lstStyle/>
+          <a:p>
+            <a:fld id="{680E7421-152F-4C5F-A339-C37B49386B6D}" type="slidenum">
+              <a:rPr lang="en-GB" smtClean="0"/>
+              <a:pPr/>
+              <a:t>31</a:t>
+            </a:fld>
+            <a:endParaRPr lang="en-GB"/>
+          </a:p>
+        </p:txBody>
+      </p:sp>
+    </p:spTree>
+  </p:cSld>
+  <p:clrMapOvr>
+    <a:masterClrMapping/>
+  </p:clrMapOvr>
+</p:notes>
+</file>
+
+<file path=ppt/notesSlides/notesSlide23.xml><?xml version="1.0" encoding="utf-8"?>
+<p:notes xmlns:a="http://schemas.openxmlformats.org/drawingml/2006/main" xmlns:r="http://schemas.openxmlformats.org/officeDocument/2006/relationships" xmlns:p="http://schemas.openxmlformats.org/presentationml/2006/main">
+  <p:cSld>
+    <p:spTree>
+      <p:nvGrpSpPr>
+        <p:cNvPr id="1" name=""/>
+        <p:cNvGrpSpPr/>
+        <p:nvPr/>
+      </p:nvGrpSpPr>
+      <p:grpSpPr>
+        <a:xfrm>
+          <a:off x="0" y="0"/>
+          <a:ext cx="0" cy="0"/>
+          <a:chOff x="0" y="0"/>
+          <a:chExt cx="0" cy="0"/>
+        </a:xfrm>
+      </p:grpSpPr>
+      <p:sp>
+        <p:nvSpPr>
+          <p:cNvPr id="2" name="Slide Image Placeholder 1"/>
+          <p:cNvSpPr>
+            <a:spLocks noGrp="1" noRot="1" noChangeAspect="1"/>
+          </p:cNvSpPr>
+          <p:nvPr>
+            <p:ph type="sldImg"/>
+          </p:nvPr>
+        </p:nvSpPr>
+        <p:spPr/>
+      </p:sp>
+      <p:sp>
+        <p:nvSpPr>
+          <p:cNvPr id="3" name="Notes Placeholder 2"/>
+          <p:cNvSpPr>
+            <a:spLocks noGrp="1"/>
+          </p:cNvSpPr>
+          <p:nvPr>
+            <p:ph type="body" idx="1"/>
+          </p:nvPr>
+        </p:nvSpPr>
+        <p:spPr/>
+        <p:txBody>
+          <a:bodyPr>
+            <a:normAutofit/>
+          </a:bodyPr>
+          <a:lstStyle/>
+          <a:p>
+            <a:endParaRPr lang="en-GB" dirty="0"/>
+          </a:p>
+        </p:txBody>
+      </p:sp>
+      <p:sp>
+        <p:nvSpPr>
+          <p:cNvPr id="4" name="Slide Number Placeholder 3"/>
+          <p:cNvSpPr>
+            <a:spLocks noGrp="1"/>
+          </p:cNvSpPr>
+          <p:nvPr>
+            <p:ph type="sldNum" sz="quarter" idx="10"/>
+          </p:nvPr>
+        </p:nvSpPr>
+        <p:spPr/>
+        <p:txBody>
+          <a:bodyPr/>
+          <a:lstStyle/>
+          <a:p>
+            <a:fld id="{680E7421-152F-4C5F-A339-C37B49386B6D}" type="slidenum">
+              <a:rPr lang="en-GB" smtClean="0"/>
+              <a:pPr/>
+              <a:t>32</a:t>
+            </a:fld>
+            <a:endParaRPr lang="en-GB"/>
+          </a:p>
+        </p:txBody>
+      </p:sp>
+    </p:spTree>
+  </p:cSld>
+  <p:clrMapOvr>
+    <a:masterClrMapping/>
+  </p:clrMapOvr>
+</p:notes>
+</file>
+
+<file path=ppt/notesSlides/notesSlide24.xml><?xml version="1.0" encoding="utf-8"?>
+<p:notes xmlns:a="http://schemas.openxmlformats.org/drawingml/2006/main" xmlns:r="http://schemas.openxmlformats.org/officeDocument/2006/relationships" xmlns:p="http://schemas.openxmlformats.org/presentationml/2006/main">
+  <p:cSld>
+    <p:spTree>
+      <p:nvGrpSpPr>
+        <p:cNvPr id="1" name=""/>
+        <p:cNvGrpSpPr/>
+        <p:nvPr/>
+      </p:nvGrpSpPr>
+      <p:grpSpPr>
+        <a:xfrm>
+          <a:off x="0" y="0"/>
+          <a:ext cx="0" cy="0"/>
+          <a:chOff x="0" y="0"/>
+          <a:chExt cx="0" cy="0"/>
+        </a:xfrm>
+      </p:grpSpPr>
+      <p:sp>
+        <p:nvSpPr>
+          <p:cNvPr id="2" name="Slide Image Placeholder 1"/>
+          <p:cNvSpPr>
+            <a:spLocks noGrp="1" noRot="1" noChangeAspect="1"/>
+          </p:cNvSpPr>
+          <p:nvPr>
+            <p:ph type="sldImg"/>
+          </p:nvPr>
+        </p:nvSpPr>
+        <p:spPr/>
+      </p:sp>
+      <p:sp>
+        <p:nvSpPr>
+          <p:cNvPr id="3" name="Notes Placeholder 2"/>
+          <p:cNvSpPr>
+            <a:spLocks noGrp="1"/>
+          </p:cNvSpPr>
+          <p:nvPr>
+            <p:ph type="body" idx="1"/>
+          </p:nvPr>
+        </p:nvSpPr>
+        <p:spPr/>
+        <p:txBody>
+          <a:bodyPr>
+            <a:normAutofit/>
+          </a:bodyPr>
+          <a:lstStyle/>
+          <a:p>
+            <a:r>
+              <a:rPr lang="en-GB" dirty="0" smtClean="0"/>
+              <a:t>Be careful.</a:t>
+            </a:r>
+          </a:p>
+          <a:p>
+            <a:endParaRPr lang="en-GB" dirty="0" smtClean="0"/>
+          </a:p>
+          <a:p>
+            <a:r>
+              <a:rPr lang="en-GB" dirty="0" smtClean="0"/>
+              <a:t>Dates</a:t>
+            </a:r>
+            <a:r>
+              <a:rPr lang="en-GB" baseline="0" dirty="0" smtClean="0"/>
+              <a:t> – all date/times are true EXCEPT midnight on January 1</a:t>
+            </a:r>
+            <a:r>
+              <a:rPr lang="en-GB" baseline="30000" dirty="0" smtClean="0"/>
+              <a:t>st</a:t>
+            </a:r>
+            <a:r>
+              <a:rPr lang="en-GB" baseline="0" dirty="0" smtClean="0"/>
+              <a:t>, 1970. As someone said who was there "It was midnight, New Years Eve, the dawn of a new decade, and there was optimism everywhere; everyone thought Vietnam was over, Nixon was honest, and we'd all be living on the moon by 2001. Looking back on it – it *was* false"</a:t>
+            </a:r>
+          </a:p>
+          <a:p>
+            <a:endParaRPr lang="en-GB" baseline="0" dirty="0" smtClean="0"/>
+          </a:p>
+          <a:p>
+            <a:r>
+              <a:rPr lang="en-GB" baseline="0" dirty="0" smtClean="0"/>
+              <a:t>"false" is true. "0" is true. </a:t>
+            </a:r>
+          </a:p>
+          <a:p>
+            <a:endParaRPr lang="en-GB" baseline="0" dirty="0" smtClean="0"/>
+          </a:p>
+          <a:p>
+            <a:r>
+              <a:rPr lang="en-GB" baseline="0" dirty="0" smtClean="0"/>
+              <a:t>"5" + 3 = 53</a:t>
+            </a:r>
+          </a:p>
+          <a:p>
+            <a:r>
+              <a:rPr lang="en-GB" baseline="0" dirty="0" smtClean="0"/>
+              <a:t>"5" – 3 = 2</a:t>
+            </a:r>
+          </a:p>
+          <a:p>
+            <a:endParaRPr lang="en-GB" dirty="0"/>
+          </a:p>
+        </p:txBody>
+      </p:sp>
+      <p:sp>
+        <p:nvSpPr>
+          <p:cNvPr id="4" name="Slide Number Placeholder 3"/>
+          <p:cNvSpPr>
+            <a:spLocks noGrp="1"/>
+          </p:cNvSpPr>
+          <p:nvPr>
+            <p:ph type="sldNum" sz="quarter" idx="10"/>
+          </p:nvPr>
+        </p:nvSpPr>
+        <p:spPr/>
+        <p:txBody>
+          <a:bodyPr/>
+          <a:lstStyle/>
+          <a:p>
+            <a:fld id="{680E7421-152F-4C5F-A339-C37B49386B6D}" type="slidenum">
+              <a:rPr lang="en-GB" smtClean="0"/>
+              <a:pPr/>
+              <a:t>33</a:t>
+            </a:fld>
+            <a:endParaRPr lang="en-GB"/>
+          </a:p>
+        </p:txBody>
+      </p:sp>
+    </p:spTree>
+  </p:cSld>
+  <p:clrMapOvr>
+    <a:masterClrMapping/>
+  </p:clrMapOvr>
+</p:notes>
+</file>
+
+<file path=ppt/notesSlides/notesSlide25.xml><?xml version="1.0" encoding="utf-8"?>
+<p:notes xmlns:a="http://schemas.openxmlformats.org/drawingml/2006/main" xmlns:r="http://schemas.openxmlformats.org/officeDocument/2006/relationships" xmlns:p="http://schemas.openxmlformats.org/presentationml/2006/main">
+  <p:cSld>
+    <p:spTree>
+      <p:nvGrpSpPr>
+        <p:cNvPr id="1" name=""/>
+        <p:cNvGrpSpPr/>
+        <p:nvPr/>
+      </p:nvGrpSpPr>
+      <p:grpSpPr>
+        <a:xfrm>
+          <a:off x="0" y="0"/>
+          <a:ext cx="0" cy="0"/>
+          <a:chOff x="0" y="0"/>
+          <a:chExt cx="0" cy="0"/>
+        </a:xfrm>
+      </p:grpSpPr>
+      <p:sp>
+        <p:nvSpPr>
+          <p:cNvPr id="2" name="Slide Image Placeholder 1"/>
+          <p:cNvSpPr>
+            <a:spLocks noGrp="1" noRot="1" noChangeAspect="1"/>
+          </p:cNvSpPr>
+          <p:nvPr>
+            <p:ph type="sldImg"/>
+          </p:nvPr>
+        </p:nvSpPr>
+        <p:spPr/>
+      </p:sp>
+      <p:sp>
+        <p:nvSpPr>
+          <p:cNvPr id="3" name="Notes Placeholder 2"/>
+          <p:cNvSpPr>
+            <a:spLocks noGrp="1"/>
+          </p:cNvSpPr>
+          <p:nvPr>
+            <p:ph type="body" idx="1"/>
+          </p:nvPr>
+        </p:nvSpPr>
+        <p:spPr/>
+        <p:txBody>
+          <a:bodyPr>
+            <a:normAutofit/>
+          </a:bodyPr>
+          <a:lstStyle/>
+          <a:p>
+            <a:r>
+              <a:rPr lang="en-GB" dirty="0" err="1" smtClean="0"/>
+              <a:t>Javascript</a:t>
+            </a:r>
+            <a:r>
+              <a:rPr lang="en-GB" dirty="0" smtClean="0"/>
+              <a:t> defines NOTHING. The</a:t>
+            </a:r>
+            <a:r>
+              <a:rPr lang="en-GB" baseline="0" dirty="0" smtClean="0"/>
+              <a:t> core language has no networking, no I/O, no </a:t>
+            </a:r>
+            <a:r>
+              <a:rPr lang="en-GB" baseline="0" dirty="0" err="1" smtClean="0"/>
+              <a:t>filesystem</a:t>
+            </a:r>
+            <a:r>
+              <a:rPr lang="en-GB" baseline="0" dirty="0" smtClean="0"/>
+              <a:t> access – in fact, it doesn't even define any extension mechanism for adding these things.</a:t>
+            </a:r>
+          </a:p>
+          <a:p>
+            <a:endParaRPr lang="en-GB" baseline="0" dirty="0" smtClean="0"/>
+          </a:p>
+          <a:p>
+            <a:r>
+              <a:rPr lang="en-GB" baseline="0" dirty="0" smtClean="0"/>
+              <a:t>Making </a:t>
+            </a:r>
+            <a:r>
+              <a:rPr lang="en-GB" baseline="0" dirty="0" err="1" smtClean="0"/>
+              <a:t>Javascript</a:t>
+            </a:r>
+            <a:r>
+              <a:rPr lang="en-GB" baseline="0" dirty="0" smtClean="0"/>
+              <a:t> talk to the rest of the world is ALL about the host – the engine that's actually running the code.</a:t>
+            </a:r>
+          </a:p>
+          <a:p>
+            <a:endParaRPr lang="en-GB" baseline="0" dirty="0" smtClean="0"/>
+          </a:p>
+          <a:p>
+            <a:r>
+              <a:rPr lang="en-GB" baseline="0" dirty="0" smtClean="0"/>
+              <a:t>When the engine is a browser, </a:t>
+            </a:r>
+            <a:r>
+              <a:rPr lang="en-GB" baseline="0" dirty="0" err="1" smtClean="0"/>
+              <a:t>Javascript</a:t>
+            </a:r>
+            <a:r>
+              <a:rPr lang="en-GB" baseline="0" dirty="0" smtClean="0"/>
+              <a:t> gets full access to the DOM, and to various things like </a:t>
+            </a:r>
+            <a:r>
+              <a:rPr lang="en-GB" baseline="0" dirty="0" err="1" smtClean="0"/>
+              <a:t>XMLHttpRequest</a:t>
+            </a:r>
+            <a:r>
+              <a:rPr lang="en-GB" baseline="0" dirty="0" smtClean="0"/>
+              <a:t> that are exposed by the browser's </a:t>
+            </a:r>
+            <a:r>
+              <a:rPr lang="en-GB" baseline="0" dirty="0" err="1" smtClean="0"/>
+              <a:t>Javascript</a:t>
+            </a:r>
+            <a:r>
+              <a:rPr lang="en-GB" baseline="0" dirty="0" smtClean="0"/>
+              <a:t> runtime. You know that slide earlier about "</a:t>
+            </a:r>
+            <a:r>
+              <a:rPr lang="en-GB" baseline="0" dirty="0" err="1" smtClean="0"/>
+              <a:t>Javscript</a:t>
+            </a:r>
+            <a:r>
+              <a:rPr lang="en-GB" baseline="0" dirty="0" smtClean="0"/>
+              <a:t>: The Complete Guide" </a:t>
+            </a:r>
+            <a:r>
+              <a:rPr lang="en-GB" baseline="0" dirty="0" err="1" smtClean="0"/>
+              <a:t>vs</a:t>
+            </a:r>
+            <a:r>
+              <a:rPr lang="en-GB" baseline="0" dirty="0" smtClean="0"/>
+              <a:t> "</a:t>
+            </a:r>
+            <a:r>
+              <a:rPr lang="en-GB" baseline="0" dirty="0" err="1" smtClean="0"/>
+              <a:t>Javascript</a:t>
+            </a:r>
+            <a:r>
+              <a:rPr lang="en-GB" baseline="0" dirty="0" smtClean="0"/>
+              <a:t>: The Good Parts" ? That's because the Complete </a:t>
+            </a:r>
+            <a:r>
+              <a:rPr lang="en-GB" baseline="0" dirty="0" err="1" smtClean="0"/>
+              <a:t>GUide</a:t>
+            </a:r>
+            <a:r>
+              <a:rPr lang="en-GB" baseline="0" dirty="0" smtClean="0"/>
+              <a:t> actually covers every DOM element, event and attribute, and documents their cross-browser implementations and </a:t>
+            </a:r>
+            <a:r>
+              <a:rPr lang="en-GB" baseline="0" dirty="0" err="1" smtClean="0"/>
+              <a:t>compability</a:t>
+            </a:r>
+            <a:r>
+              <a:rPr lang="en-GB" baseline="0" dirty="0" smtClean="0"/>
+              <a:t> issues.</a:t>
+            </a:r>
+          </a:p>
+          <a:p>
+            <a:endParaRPr lang="en-GB" baseline="0" dirty="0" smtClean="0"/>
+          </a:p>
+          <a:p>
+            <a:endParaRPr lang="en-GB" baseline="0" dirty="0" smtClean="0"/>
+          </a:p>
+        </p:txBody>
+      </p:sp>
+      <p:sp>
+        <p:nvSpPr>
+          <p:cNvPr id="4" name="Slide Number Placeholder 3"/>
+          <p:cNvSpPr>
+            <a:spLocks noGrp="1"/>
+          </p:cNvSpPr>
+          <p:nvPr>
+            <p:ph type="sldNum" sz="quarter" idx="10"/>
+          </p:nvPr>
+        </p:nvSpPr>
+        <p:spPr/>
+        <p:txBody>
+          <a:bodyPr/>
+          <a:lstStyle/>
+          <a:p>
+            <a:fld id="{680E7421-152F-4C5F-A339-C37B49386B6D}" type="slidenum">
+              <a:rPr lang="en-GB" smtClean="0"/>
+              <a:pPr/>
+              <a:t>34</a:t>
+            </a:fld>
+            <a:endParaRPr lang="en-GB"/>
+          </a:p>
+        </p:txBody>
+      </p:sp>
+    </p:spTree>
+  </p:cSld>
+  <p:clrMapOvr>
+    <a:masterClrMapping/>
+  </p:clrMapOvr>
+</p:notes>
+</file>
+
+<file path=ppt/notesSlides/notesSlide26.xml><?xml version="1.0" encoding="utf-8"?>
+<p:notes xmlns:a="http://schemas.openxmlformats.org/drawingml/2006/main" xmlns:r="http://schemas.openxmlformats.org/officeDocument/2006/relationships" xmlns:p="http://schemas.openxmlformats.org/presentationml/2006/main">
+  <p:cSld>
+    <p:spTree>
+      <p:nvGrpSpPr>
+        <p:cNvPr id="1" name=""/>
+        <p:cNvGrpSpPr/>
+        <p:nvPr/>
+      </p:nvGrpSpPr>
+      <p:grpSpPr>
+        <a:xfrm>
+          <a:off x="0" y="0"/>
+          <a:ext cx="0" cy="0"/>
+          <a:chOff x="0" y="0"/>
+          <a:chExt cx="0" cy="0"/>
+        </a:xfrm>
+      </p:grpSpPr>
+      <p:sp>
+        <p:nvSpPr>
+          <p:cNvPr id="2" name="Slide Image Placeholder 1"/>
+          <p:cNvSpPr>
+            <a:spLocks noGrp="1" noRot="1" noChangeAspect="1"/>
+          </p:cNvSpPr>
+          <p:nvPr>
+            <p:ph type="sldImg"/>
+          </p:nvPr>
+        </p:nvSpPr>
+        <p:spPr/>
+      </p:sp>
+      <p:sp>
+        <p:nvSpPr>
+          <p:cNvPr id="3" name="Notes Placeholder 2"/>
+          <p:cNvSpPr>
+            <a:spLocks noGrp="1"/>
+          </p:cNvSpPr>
+          <p:nvPr>
+            <p:ph type="body" idx="1"/>
+          </p:nvPr>
+        </p:nvSpPr>
+        <p:spPr/>
+        <p:txBody>
+          <a:bodyPr>
+            <a:normAutofit/>
+          </a:bodyPr>
+          <a:lstStyle/>
+          <a:p>
+            <a:endParaRPr lang="en-GB" dirty="0"/>
+          </a:p>
+        </p:txBody>
+      </p:sp>
+      <p:sp>
+        <p:nvSpPr>
+          <p:cNvPr id="4" name="Slide Number Placeholder 3"/>
+          <p:cNvSpPr>
+            <a:spLocks noGrp="1"/>
+          </p:cNvSpPr>
+          <p:nvPr>
+            <p:ph type="sldNum" sz="quarter" idx="10"/>
+          </p:nvPr>
+        </p:nvSpPr>
+        <p:spPr/>
+        <p:txBody>
+          <a:bodyPr/>
+          <a:lstStyle/>
+          <a:p>
+            <a:fld id="{680E7421-152F-4C5F-A339-C37B49386B6D}" type="slidenum">
+              <a:rPr lang="en-GB" smtClean="0"/>
+              <a:pPr/>
+              <a:t>36</a:t>
+            </a:fld>
+            <a:endParaRPr lang="en-GB"/>
+          </a:p>
+        </p:txBody>
+      </p:sp>
+    </p:spTree>
   </p:cSld>
   <p:clrMapOvr>
     <a:masterClrMapping/>
@@ -2885,6 +3700,7 @@
           <a:p>
             <a:fld id="{680E7421-152F-4C5F-A339-C37B49386B6D}" type="slidenum">
               <a:rPr lang="en-GB" smtClean="0"/>
+              <a:pPr/>
               <a:t>4</a:t>
             </a:fld>
             <a:endParaRPr lang="en-GB"/>
@@ -2894,7 +3710,7 @@
     </p:spTree>
     <p:extLst>
       <p:ext uri="{BB962C8B-B14F-4D97-AF65-F5344CB8AC3E}">
-        <p14:creationId xmlns:p14="http://schemas.microsoft.com/office/powerpoint/2010/main" val="1031692254"/>
+        <p14:creationId xmlns:p14="http://schemas.microsoft.com/office/powerpoint/2010/main" xmlns="" val="1031692254"/>
       </p:ext>
     </p:extLst>
   </p:cSld>
@@ -2973,6 +3789,7 @@
           <a:p>
             <a:fld id="{680E7421-152F-4C5F-A339-C37B49386B6D}" type="slidenum">
               <a:rPr lang="en-GB" smtClean="0"/>
+              <a:pPr/>
               <a:t>5</a:t>
             </a:fld>
             <a:endParaRPr lang="en-GB"/>
@@ -2982,7 +3799,7 @@
     </p:spTree>
     <p:extLst>
       <p:ext uri="{BB962C8B-B14F-4D97-AF65-F5344CB8AC3E}">
-        <p14:creationId xmlns:p14="http://schemas.microsoft.com/office/powerpoint/2010/main" val="355567362"/>
+        <p14:creationId xmlns:p14="http://schemas.microsoft.com/office/powerpoint/2010/main" xmlns="" val="355567362"/>
       </p:ext>
     </p:extLst>
   </p:cSld>
@@ -3065,6 +3882,7 @@
           <a:p>
             <a:fld id="{680E7421-152F-4C5F-A339-C37B49386B6D}" type="slidenum">
               <a:rPr lang="en-GB" smtClean="0"/>
+              <a:pPr/>
               <a:t>6</a:t>
             </a:fld>
             <a:endParaRPr lang="en-GB"/>
@@ -3074,7 +3892,7 @@
     </p:spTree>
     <p:extLst>
       <p:ext uri="{BB962C8B-B14F-4D97-AF65-F5344CB8AC3E}">
-        <p14:creationId xmlns:p14="http://schemas.microsoft.com/office/powerpoint/2010/main" val="4045155336"/>
+        <p14:creationId xmlns:p14="http://schemas.microsoft.com/office/powerpoint/2010/main" xmlns="" val="4045155336"/>
       </p:ext>
     </p:extLst>
   </p:cSld>
@@ -3153,6 +3971,7 @@
           <a:p>
             <a:fld id="{680E7421-152F-4C5F-A339-C37B49386B6D}" type="slidenum">
               <a:rPr lang="en-GB" smtClean="0"/>
+              <a:pPr/>
               <a:t>7</a:t>
             </a:fld>
             <a:endParaRPr lang="en-GB"/>
@@ -3162,7 +3981,7 @@
     </p:spTree>
     <p:extLst>
       <p:ext uri="{BB962C8B-B14F-4D97-AF65-F5344CB8AC3E}">
-        <p14:creationId xmlns:p14="http://schemas.microsoft.com/office/powerpoint/2010/main" val="3296244990"/>
+        <p14:creationId xmlns:p14="http://schemas.microsoft.com/office/powerpoint/2010/main" xmlns="" val="3296244990"/>
       </p:ext>
     </p:extLst>
   </p:cSld>
@@ -3245,6 +4064,7 @@
           <a:p>
             <a:fld id="{680E7421-152F-4C5F-A339-C37B49386B6D}" type="slidenum">
               <a:rPr lang="en-GB" smtClean="0"/>
+              <a:pPr/>
               <a:t>8</a:t>
             </a:fld>
             <a:endParaRPr lang="en-GB"/>
@@ -3254,7 +4074,7 @@
     </p:spTree>
     <p:extLst>
       <p:ext uri="{BB962C8B-B14F-4D97-AF65-F5344CB8AC3E}">
-        <p14:creationId xmlns:p14="http://schemas.microsoft.com/office/powerpoint/2010/main" val="1000632246"/>
+        <p14:creationId xmlns:p14="http://schemas.microsoft.com/office/powerpoint/2010/main" xmlns="" val="1000632246"/>
       </p:ext>
     </p:extLst>
   </p:cSld>
@@ -3337,6 +4157,7 @@
           <a:p>
             <a:fld id="{680E7421-152F-4C5F-A339-C37B49386B6D}" type="slidenum">
               <a:rPr lang="en-GB" smtClean="0"/>
+              <a:pPr/>
               <a:t>9</a:t>
             </a:fld>
             <a:endParaRPr lang="en-GB"/>
@@ -3346,7 +4167,7 @@
     </p:spTree>
     <p:extLst>
       <p:ext uri="{BB962C8B-B14F-4D97-AF65-F5344CB8AC3E}">
-        <p14:creationId xmlns:p14="http://schemas.microsoft.com/office/powerpoint/2010/main" val="182042685"/>
+        <p14:creationId xmlns:p14="http://schemas.microsoft.com/office/powerpoint/2010/main" xmlns="" val="182042685"/>
       </p:ext>
     </p:extLst>
   </p:cSld>
@@ -3437,6 +4258,7 @@
           <a:p>
             <a:fld id="{680E7421-152F-4C5F-A339-C37B49386B6D}" type="slidenum">
               <a:rPr lang="en-GB" smtClean="0"/>
+              <a:pPr/>
               <a:t>10</a:t>
             </a:fld>
             <a:endParaRPr lang="en-GB"/>
@@ -3446,7 +4268,7 @@
     </p:spTree>
     <p:extLst>
       <p:ext uri="{BB962C8B-B14F-4D97-AF65-F5344CB8AC3E}">
-        <p14:creationId xmlns:p14="http://schemas.microsoft.com/office/powerpoint/2010/main" val="2946709928"/>
+        <p14:creationId xmlns:p14="http://schemas.microsoft.com/office/powerpoint/2010/main" xmlns="" val="2946709928"/>
       </p:ext>
     </p:extLst>
   </p:cSld>
@@ -3637,6 +4459,7 @@
           <a:p>
             <a:fld id="{79FF1FDB-4612-42CD-8C9A-3A5EF85AE542}" type="datetimeFigureOut">
               <a:rPr lang="en-GB" smtClean="0"/>
+              <a:pPr/>
               <a:t>04/04/2011</a:t>
             </a:fld>
             <a:endParaRPr lang="en-GB"/>
@@ -3679,6 +4502,7 @@
           <a:p>
             <a:fld id="{E5B8B548-BADF-4327-8D27-B4FBC30564E4}" type="slidenum">
               <a:rPr lang="en-GB" smtClean="0"/>
+              <a:pPr/>
               <a:t>‹#›</a:t>
             </a:fld>
             <a:endParaRPr lang="en-GB"/>
@@ -3688,7 +4512,7 @@
     </p:spTree>
     <p:extLst>
       <p:ext uri="{BB962C8B-B14F-4D97-AF65-F5344CB8AC3E}">
-        <p14:creationId xmlns:p14="http://schemas.microsoft.com/office/powerpoint/2010/main" val="2758244230"/>
+        <p14:creationId xmlns:p14="http://schemas.microsoft.com/office/powerpoint/2010/main" xmlns="" val="2758244230"/>
       </p:ext>
     </p:extLst>
   </p:cSld>
@@ -3807,6 +4631,7 @@
           <a:p>
             <a:fld id="{79FF1FDB-4612-42CD-8C9A-3A5EF85AE542}" type="datetimeFigureOut">
               <a:rPr lang="en-GB" smtClean="0"/>
+              <a:pPr/>
               <a:t>04/04/2011</a:t>
             </a:fld>
             <a:endParaRPr lang="en-GB"/>
@@ -3849,6 +4674,7 @@
           <a:p>
             <a:fld id="{E5B8B548-BADF-4327-8D27-B4FBC30564E4}" type="slidenum">
               <a:rPr lang="en-GB" smtClean="0"/>
+              <a:pPr/>
               <a:t>‹#›</a:t>
             </a:fld>
             <a:endParaRPr lang="en-GB"/>
@@ -3858,7 +4684,7 @@
     </p:spTree>
     <p:extLst>
       <p:ext uri="{BB962C8B-B14F-4D97-AF65-F5344CB8AC3E}">
-        <p14:creationId xmlns:p14="http://schemas.microsoft.com/office/powerpoint/2010/main" val="3574220041"/>
+        <p14:creationId xmlns:p14="http://schemas.microsoft.com/office/powerpoint/2010/main" xmlns="" val="3574220041"/>
       </p:ext>
     </p:extLst>
   </p:cSld>
@@ -3987,6 +4813,7 @@
           <a:p>
             <a:fld id="{79FF1FDB-4612-42CD-8C9A-3A5EF85AE542}" type="datetimeFigureOut">
               <a:rPr lang="en-GB" smtClean="0"/>
+              <a:pPr/>
               <a:t>04/04/2011</a:t>
             </a:fld>
             <a:endParaRPr lang="en-GB"/>
@@ -4029,6 +4856,7 @@
           <a:p>
             <a:fld id="{E5B8B548-BADF-4327-8D27-B4FBC30564E4}" type="slidenum">
               <a:rPr lang="en-GB" smtClean="0"/>
+              <a:pPr/>
               <a:t>‹#›</a:t>
             </a:fld>
             <a:endParaRPr lang="en-GB"/>
@@ -4038,7 +4866,7 @@
     </p:spTree>
     <p:extLst>
       <p:ext uri="{BB962C8B-B14F-4D97-AF65-F5344CB8AC3E}">
-        <p14:creationId xmlns:p14="http://schemas.microsoft.com/office/powerpoint/2010/main" val="3659696286"/>
+        <p14:creationId xmlns:p14="http://schemas.microsoft.com/office/powerpoint/2010/main" xmlns="" val="3659696286"/>
       </p:ext>
     </p:extLst>
   </p:cSld>
@@ -4157,6 +4985,7 @@
           <a:p>
             <a:fld id="{79FF1FDB-4612-42CD-8C9A-3A5EF85AE542}" type="datetimeFigureOut">
               <a:rPr lang="en-GB" smtClean="0"/>
+              <a:pPr/>
               <a:t>04/04/2011</a:t>
             </a:fld>
             <a:endParaRPr lang="en-GB"/>
@@ -4199,6 +5028,7 @@
           <a:p>
             <a:fld id="{E5B8B548-BADF-4327-8D27-B4FBC30564E4}" type="slidenum">
               <a:rPr lang="en-GB" smtClean="0"/>
+              <a:pPr/>
               <a:t>‹#›</a:t>
             </a:fld>
             <a:endParaRPr lang="en-GB"/>
@@ -4208,7 +5038,7 @@
     </p:spTree>
     <p:extLst>
       <p:ext uri="{BB962C8B-B14F-4D97-AF65-F5344CB8AC3E}">
-        <p14:creationId xmlns:p14="http://schemas.microsoft.com/office/powerpoint/2010/main" val="4195198214"/>
+        <p14:creationId xmlns:p14="http://schemas.microsoft.com/office/powerpoint/2010/main" xmlns="" val="4195198214"/>
       </p:ext>
     </p:extLst>
   </p:cSld>
@@ -4403,6 +5233,7 @@
           <a:p>
             <a:fld id="{79FF1FDB-4612-42CD-8C9A-3A5EF85AE542}" type="datetimeFigureOut">
               <a:rPr lang="en-GB" smtClean="0"/>
+              <a:pPr/>
               <a:t>04/04/2011</a:t>
             </a:fld>
             <a:endParaRPr lang="en-GB"/>
@@ -4445,6 +5276,7 @@
           <a:p>
             <a:fld id="{E5B8B548-BADF-4327-8D27-B4FBC30564E4}" type="slidenum">
               <a:rPr lang="en-GB" smtClean="0"/>
+              <a:pPr/>
               <a:t>‹#›</a:t>
             </a:fld>
             <a:endParaRPr lang="en-GB"/>
@@ -4454,7 +5286,7 @@
     </p:spTree>
     <p:extLst>
       <p:ext uri="{BB962C8B-B14F-4D97-AF65-F5344CB8AC3E}">
-        <p14:creationId xmlns:p14="http://schemas.microsoft.com/office/powerpoint/2010/main" val="2354423350"/>
+        <p14:creationId xmlns:p14="http://schemas.microsoft.com/office/powerpoint/2010/main" xmlns="" val="2354423350"/>
       </p:ext>
     </p:extLst>
   </p:cSld>
@@ -4691,6 +5523,7 @@
           <a:p>
             <a:fld id="{79FF1FDB-4612-42CD-8C9A-3A5EF85AE542}" type="datetimeFigureOut">
               <a:rPr lang="en-GB" smtClean="0"/>
+              <a:pPr/>
               <a:t>04/04/2011</a:t>
             </a:fld>
             <a:endParaRPr lang="en-GB"/>
@@ -4733,6 +5566,7 @@
           <a:p>
             <a:fld id="{E5B8B548-BADF-4327-8D27-B4FBC30564E4}" type="slidenum">
               <a:rPr lang="en-GB" smtClean="0"/>
+              <a:pPr/>
               <a:t>‹#›</a:t>
             </a:fld>
             <a:endParaRPr lang="en-GB"/>
@@ -4742,7 +5576,7 @@
     </p:spTree>
     <p:extLst>
       <p:ext uri="{BB962C8B-B14F-4D97-AF65-F5344CB8AC3E}">
-        <p14:creationId xmlns:p14="http://schemas.microsoft.com/office/powerpoint/2010/main" val="547036700"/>
+        <p14:creationId xmlns:p14="http://schemas.microsoft.com/office/powerpoint/2010/main" xmlns="" val="547036700"/>
       </p:ext>
     </p:extLst>
   </p:cSld>
@@ -5113,6 +5947,7 @@
           <a:p>
             <a:fld id="{79FF1FDB-4612-42CD-8C9A-3A5EF85AE542}" type="datetimeFigureOut">
               <a:rPr lang="en-GB" smtClean="0"/>
+              <a:pPr/>
               <a:t>04/04/2011</a:t>
             </a:fld>
             <a:endParaRPr lang="en-GB"/>
@@ -5155,6 +5990,7 @@
           <a:p>
             <a:fld id="{E5B8B548-BADF-4327-8D27-B4FBC30564E4}" type="slidenum">
               <a:rPr lang="en-GB" smtClean="0"/>
+              <a:pPr/>
               <a:t>‹#›</a:t>
             </a:fld>
             <a:endParaRPr lang="en-GB"/>
@@ -5164,7 +6000,7 @@
     </p:spTree>
     <p:extLst>
       <p:ext uri="{BB962C8B-B14F-4D97-AF65-F5344CB8AC3E}">
-        <p14:creationId xmlns:p14="http://schemas.microsoft.com/office/powerpoint/2010/main" val="2138923743"/>
+        <p14:creationId xmlns:p14="http://schemas.microsoft.com/office/powerpoint/2010/main" xmlns="" val="2138923743"/>
       </p:ext>
     </p:extLst>
   </p:cSld>
@@ -5231,6 +6067,7 @@
           <a:p>
             <a:fld id="{79FF1FDB-4612-42CD-8C9A-3A5EF85AE542}" type="datetimeFigureOut">
               <a:rPr lang="en-GB" smtClean="0"/>
+              <a:pPr/>
               <a:t>04/04/2011</a:t>
             </a:fld>
             <a:endParaRPr lang="en-GB"/>
@@ -5273,6 +6110,7 @@
           <a:p>
             <a:fld id="{E5B8B548-BADF-4327-8D27-B4FBC30564E4}" type="slidenum">
               <a:rPr lang="en-GB" smtClean="0"/>
+              <a:pPr/>
               <a:t>‹#›</a:t>
             </a:fld>
             <a:endParaRPr lang="en-GB"/>
@@ -5282,7 +6120,7 @@
     </p:spTree>
     <p:extLst>
       <p:ext uri="{BB962C8B-B14F-4D97-AF65-F5344CB8AC3E}">
-        <p14:creationId xmlns:p14="http://schemas.microsoft.com/office/powerpoint/2010/main" val="3597451202"/>
+        <p14:creationId xmlns:p14="http://schemas.microsoft.com/office/powerpoint/2010/main" xmlns="" val="3597451202"/>
       </p:ext>
     </p:extLst>
   </p:cSld>
@@ -5326,6 +6164,7 @@
           <a:p>
             <a:fld id="{79FF1FDB-4612-42CD-8C9A-3A5EF85AE542}" type="datetimeFigureOut">
               <a:rPr lang="en-GB" smtClean="0"/>
+              <a:pPr/>
               <a:t>04/04/2011</a:t>
             </a:fld>
             <a:endParaRPr lang="en-GB"/>
@@ -5368,6 +6207,7 @@
           <a:p>
             <a:fld id="{E5B8B548-BADF-4327-8D27-B4FBC30564E4}" type="slidenum">
               <a:rPr lang="en-GB" smtClean="0"/>
+              <a:pPr/>
               <a:t>‹#›</a:t>
             </a:fld>
             <a:endParaRPr lang="en-GB"/>
@@ -5377,7 +6217,7 @@
     </p:spTree>
     <p:extLst>
       <p:ext uri="{BB962C8B-B14F-4D97-AF65-F5344CB8AC3E}">
-        <p14:creationId xmlns:p14="http://schemas.microsoft.com/office/powerpoint/2010/main" val="2630420917"/>
+        <p14:creationId xmlns:p14="http://schemas.microsoft.com/office/powerpoint/2010/main" xmlns="" val="2630420917"/>
       </p:ext>
     </p:extLst>
   </p:cSld>
@@ -5603,6 +6443,7 @@
           <a:p>
             <a:fld id="{79FF1FDB-4612-42CD-8C9A-3A5EF85AE542}" type="datetimeFigureOut">
               <a:rPr lang="en-GB" smtClean="0"/>
+              <a:pPr/>
               <a:t>04/04/2011</a:t>
             </a:fld>
             <a:endParaRPr lang="en-GB"/>
@@ -5645,6 +6486,7 @@
           <a:p>
             <a:fld id="{E5B8B548-BADF-4327-8D27-B4FBC30564E4}" type="slidenum">
               <a:rPr lang="en-GB" smtClean="0"/>
+              <a:pPr/>
               <a:t>‹#›</a:t>
             </a:fld>
             <a:endParaRPr lang="en-GB"/>
@@ -5654,7 +6496,7 @@
     </p:spTree>
     <p:extLst>
       <p:ext uri="{BB962C8B-B14F-4D97-AF65-F5344CB8AC3E}">
-        <p14:creationId xmlns:p14="http://schemas.microsoft.com/office/powerpoint/2010/main" val="448021710"/>
+        <p14:creationId xmlns:p14="http://schemas.microsoft.com/office/powerpoint/2010/main" xmlns="" val="448021710"/>
       </p:ext>
     </p:extLst>
   </p:cSld>
@@ -5856,6 +6698,7 @@
           <a:p>
             <a:fld id="{79FF1FDB-4612-42CD-8C9A-3A5EF85AE542}" type="datetimeFigureOut">
               <a:rPr lang="en-GB" smtClean="0"/>
+              <a:pPr/>
               <a:t>04/04/2011</a:t>
             </a:fld>
             <a:endParaRPr lang="en-GB"/>
@@ -5898,6 +6741,7 @@
           <a:p>
             <a:fld id="{E5B8B548-BADF-4327-8D27-B4FBC30564E4}" type="slidenum">
               <a:rPr lang="en-GB" smtClean="0"/>
+              <a:pPr/>
               <a:t>‹#›</a:t>
             </a:fld>
             <a:endParaRPr lang="en-GB"/>
@@ -5907,7 +6751,7 @@
     </p:spTree>
     <p:extLst>
       <p:ext uri="{BB962C8B-B14F-4D97-AF65-F5344CB8AC3E}">
-        <p14:creationId xmlns:p14="http://schemas.microsoft.com/office/powerpoint/2010/main" val="2487262328"/>
+        <p14:creationId xmlns:p14="http://schemas.microsoft.com/office/powerpoint/2010/main" xmlns="" val="2487262328"/>
       </p:ext>
     </p:extLst>
   </p:cSld>
@@ -6069,6 +6913,7 @@
           <a:p>
             <a:fld id="{79FF1FDB-4612-42CD-8C9A-3A5EF85AE542}" type="datetimeFigureOut">
               <a:rPr lang="en-GB" smtClean="0"/>
+              <a:pPr/>
               <a:t>04/04/2011</a:t>
             </a:fld>
             <a:endParaRPr lang="en-GB"/>
@@ -6147,6 +6992,7 @@
           <a:p>
             <a:fld id="{E5B8B548-BADF-4327-8D27-B4FBC30564E4}" type="slidenum">
               <a:rPr lang="en-GB" smtClean="0"/>
+              <a:pPr/>
               <a:t>‹#›</a:t>
             </a:fld>
             <a:endParaRPr lang="en-GB"/>
@@ -6156,7 +7002,7 @@
     </p:spTree>
     <p:extLst>
       <p:ext uri="{BB962C8B-B14F-4D97-AF65-F5344CB8AC3E}">
-        <p14:creationId xmlns:p14="http://schemas.microsoft.com/office/powerpoint/2010/main" val="2538704773"/>
+        <p14:creationId xmlns:p14="http://schemas.microsoft.com/office/powerpoint/2010/main" xmlns="" val="2538704773"/>
       </p:ext>
     </p:extLst>
   </p:cSld>
@@ -7043,7 +7889,7 @@
     </p:spTree>
     <p:extLst>
       <p:ext uri="{BB962C8B-B14F-4D97-AF65-F5344CB8AC3E}">
-        <p14:creationId xmlns:p14="http://schemas.microsoft.com/office/powerpoint/2010/main" val="3533413541"/>
+        <p14:creationId xmlns:p14="http://schemas.microsoft.com/office/powerpoint/2010/main" xmlns="" val="3533413541"/>
       </p:ext>
     </p:extLst>
   </p:cSld>
@@ -7378,11 +8224,11 @@
   <p:clrMapOvr>
     <a:masterClrMapping/>
   </p:clrMapOvr>
-  <mc:AlternateContent xmlns:mc="http://schemas.openxmlformats.org/markup-compatibility/2006" xmlns:p14="http://schemas.microsoft.com/office/powerpoint/2010/main">
-    <mc:Choice Requires="p14">
+  <mc:AlternateContent xmlns:mc="http://schemas.openxmlformats.org/markup-compatibility/2006">
+    <mc:Choice xmlns:p14="http://schemas.microsoft.com/office/powerpoint/2010/main" xmlns="" Requires="p14">
       <p:transition spd="slow" p14:dur="2000"/>
     </mc:Choice>
-    <mc:Fallback xmlns="">
+    <mc:Fallback>
       <p:transition spd="slow"/>
     </mc:Fallback>
   </mc:AlternateContent>
@@ -7415,10 +8261,10 @@
           <p:nvPr/>
         </p:nvPicPr>
         <p:blipFill>
-          <a:blip r:embed="rId3">
+          <a:blip r:embed="rId3" cstate="print">
             <a:extLst>
               <a:ext uri="{28A0092B-C50C-407E-A947-70E740481C1C}">
-                <a14:useLocalDpi xmlns:a14="http://schemas.microsoft.com/office/drawing/2010/main" val="0"/>
+                <a14:useLocalDpi xmlns:a14="http://schemas.microsoft.com/office/drawing/2010/main" xmlns="" val="0"/>
               </a:ext>
             </a:extLst>
           </a:blip>
@@ -7438,7 +8284,7 @@
           <a:noFill/>
           <a:extLst>
             <a:ext uri="{909E8E84-426E-40DD-AFC4-6F175D3DCCD1}">
-              <a14:hiddenFill xmlns:a14="http://schemas.microsoft.com/office/drawing/2010/main">
+              <a14:hiddenFill xmlns:a14="http://schemas.microsoft.com/office/drawing/2010/main" xmlns="">
                 <a:solidFill>
                   <a:srgbClr val="FFFFFF"/>
                 </a:solidFill>
@@ -7561,10 +8407,10 @@
           <p:nvPr/>
         </p:nvPicPr>
         <p:blipFill>
-          <a:blip r:embed="rId4">
+          <a:blip r:embed="rId4" cstate="print">
             <a:extLst>
               <a:ext uri="{28A0092B-C50C-407E-A947-70E740481C1C}">
-                <a14:useLocalDpi xmlns:a14="http://schemas.microsoft.com/office/drawing/2010/main" val="0"/>
+                <a14:useLocalDpi xmlns:a14="http://schemas.microsoft.com/office/drawing/2010/main" xmlns="" val="0"/>
               </a:ext>
             </a:extLst>
           </a:blip>
@@ -7584,7 +8430,7 @@
           <a:noFill/>
           <a:extLst>
             <a:ext uri="{909E8E84-426E-40DD-AFC4-6F175D3DCCD1}">
-              <a14:hiddenFill xmlns:a14="http://schemas.microsoft.com/office/drawing/2010/main">
+              <a14:hiddenFill xmlns:a14="http://schemas.microsoft.com/office/drawing/2010/main" xmlns="">
                 <a:solidFill>
                   <a:srgbClr val="FFFFFF"/>
                 </a:solidFill>
@@ -7598,11 +8444,11 @@
   <p:clrMapOvr>
     <a:masterClrMapping/>
   </p:clrMapOvr>
-  <mc:AlternateContent xmlns:mc="http://schemas.openxmlformats.org/markup-compatibility/2006" xmlns:p14="http://schemas.microsoft.com/office/powerpoint/2010/main">
-    <mc:Choice Requires="p14">
+  <mc:AlternateContent xmlns:mc="http://schemas.openxmlformats.org/markup-compatibility/2006">
+    <mc:Choice xmlns:p14="http://schemas.microsoft.com/office/powerpoint/2010/main" xmlns="" Requires="p14">
       <p:transition spd="slow" p14:dur="2000"/>
     </mc:Choice>
-    <mc:Fallback xmlns="">
+    <mc:Fallback>
       <p:transition spd="slow"/>
     </mc:Fallback>
   </mc:AlternateContent>
@@ -7635,10 +8481,10 @@
           <p:nvPr/>
         </p:nvPicPr>
         <p:blipFill>
-          <a:blip r:embed="rId3">
+          <a:blip r:embed="rId3" cstate="print">
             <a:extLst>
               <a:ext uri="{28A0092B-C50C-407E-A947-70E740481C1C}">
-                <a14:useLocalDpi xmlns:a14="http://schemas.microsoft.com/office/drawing/2010/main" val="0"/>
+                <a14:useLocalDpi xmlns:a14="http://schemas.microsoft.com/office/drawing/2010/main" xmlns="" val="0"/>
               </a:ext>
             </a:extLst>
           </a:blip>
@@ -7658,7 +8504,7 @@
           <a:noFill/>
           <a:extLst>
             <a:ext uri="{909E8E84-426E-40DD-AFC4-6F175D3DCCD1}">
-              <a14:hiddenFill xmlns:a14="http://schemas.microsoft.com/office/drawing/2010/main">
+              <a14:hiddenFill xmlns:a14="http://schemas.microsoft.com/office/drawing/2010/main" xmlns="">
                 <a:solidFill>
                   <a:srgbClr val="FFFFFF"/>
                 </a:solidFill>
@@ -7781,10 +8627,10 @@
           <p:nvPr/>
         </p:nvPicPr>
         <p:blipFill>
-          <a:blip r:embed="rId4">
+          <a:blip r:embed="rId4" cstate="print">
             <a:extLst>
               <a:ext uri="{28A0092B-C50C-407E-A947-70E740481C1C}">
-                <a14:useLocalDpi xmlns:a14="http://schemas.microsoft.com/office/drawing/2010/main" val="0"/>
+                <a14:useLocalDpi xmlns:a14="http://schemas.microsoft.com/office/drawing/2010/main" xmlns="" val="0"/>
               </a:ext>
             </a:extLst>
           </a:blip>
@@ -7804,7 +8650,7 @@
           <a:noFill/>
           <a:extLst>
             <a:ext uri="{909E8E84-426E-40DD-AFC4-6F175D3DCCD1}">
-              <a14:hiddenFill xmlns:a14="http://schemas.microsoft.com/office/drawing/2010/main">
+              <a14:hiddenFill xmlns:a14="http://schemas.microsoft.com/office/drawing/2010/main" xmlns="">
                 <a:solidFill>
                   <a:srgbClr val="FFFFFF"/>
                 </a:solidFill>
@@ -7825,7 +8671,7 @@
           <a:blip r:embed="rId5" cstate="print">
             <a:extLst>
               <a:ext uri="{28A0092B-C50C-407E-A947-70E740481C1C}">
-                <a14:useLocalDpi xmlns:a14="http://schemas.microsoft.com/office/drawing/2010/main" val="0"/>
+                <a14:useLocalDpi xmlns:a14="http://schemas.microsoft.com/office/drawing/2010/main" xmlns="" val="0"/>
               </a:ext>
             </a:extLst>
           </a:blip>
@@ -7845,7 +8691,7 @@
           <a:noFill/>
           <a:extLst>
             <a:ext uri="{909E8E84-426E-40DD-AFC4-6F175D3DCCD1}">
-              <a14:hiddenFill xmlns:a14="http://schemas.microsoft.com/office/drawing/2010/main">
+              <a14:hiddenFill xmlns:a14="http://schemas.microsoft.com/office/drawing/2010/main" xmlns="">
                 <a:solidFill>
                   <a:srgbClr val="FFFFFF"/>
                 </a:solidFill>
@@ -7857,18 +8703,18 @@
     </p:spTree>
     <p:extLst>
       <p:ext uri="{BB962C8B-B14F-4D97-AF65-F5344CB8AC3E}">
-        <p14:creationId xmlns:p14="http://schemas.microsoft.com/office/powerpoint/2010/main" val="910850063"/>
+        <p14:creationId xmlns:p14="http://schemas.microsoft.com/office/powerpoint/2010/main" xmlns="" val="910850063"/>
       </p:ext>
     </p:extLst>
   </p:cSld>
   <p:clrMapOvr>
     <a:masterClrMapping/>
   </p:clrMapOvr>
-  <mc:AlternateContent xmlns:mc="http://schemas.openxmlformats.org/markup-compatibility/2006" xmlns:p14="http://schemas.microsoft.com/office/powerpoint/2010/main">
-    <mc:Choice Requires="p14">
+  <mc:AlternateContent xmlns:mc="http://schemas.openxmlformats.org/markup-compatibility/2006">
+    <mc:Choice xmlns:p14="http://schemas.microsoft.com/office/powerpoint/2010/main" xmlns="" Requires="p14">
       <p:transition spd="slow" p14:dur="2000"/>
     </mc:Choice>
-    <mc:Fallback xmlns="">
+    <mc:Fallback>
       <p:transition spd="slow"/>
     </mc:Fallback>
   </mc:AlternateContent>
@@ -7901,10 +8747,10 @@
           <p:nvPr/>
         </p:nvPicPr>
         <p:blipFill>
-          <a:blip r:embed="rId3">
+          <a:blip r:embed="rId3" cstate="print">
             <a:extLst>
               <a:ext uri="{28A0092B-C50C-407E-A947-70E740481C1C}">
-                <a14:useLocalDpi xmlns:a14="http://schemas.microsoft.com/office/drawing/2010/main" val="0"/>
+                <a14:useLocalDpi xmlns:a14="http://schemas.microsoft.com/office/drawing/2010/main" xmlns="" val="0"/>
               </a:ext>
             </a:extLst>
           </a:blip>
@@ -7924,7 +8770,7 @@
           <a:noFill/>
           <a:extLst>
             <a:ext uri="{909E8E84-426E-40DD-AFC4-6F175D3DCCD1}">
-              <a14:hiddenFill xmlns:a14="http://schemas.microsoft.com/office/drawing/2010/main">
+              <a14:hiddenFill xmlns:a14="http://schemas.microsoft.com/office/drawing/2010/main" xmlns="">
                 <a:solidFill>
                   <a:srgbClr val="FFFFFF"/>
                 </a:solidFill>
@@ -8088,10 +8934,10 @@
           <p:nvPr/>
         </p:nvPicPr>
         <p:blipFill>
-          <a:blip r:embed="rId4">
+          <a:blip r:embed="rId4" cstate="print">
             <a:extLst>
               <a:ext uri="{28A0092B-C50C-407E-A947-70E740481C1C}">
-                <a14:useLocalDpi xmlns:a14="http://schemas.microsoft.com/office/drawing/2010/main" val="0"/>
+                <a14:useLocalDpi xmlns:a14="http://schemas.microsoft.com/office/drawing/2010/main" xmlns="" val="0"/>
               </a:ext>
             </a:extLst>
           </a:blip>
@@ -8111,7 +8957,7 @@
           <a:noFill/>
           <a:extLst>
             <a:ext uri="{909E8E84-426E-40DD-AFC4-6F175D3DCCD1}">
-              <a14:hiddenFill xmlns:a14="http://schemas.microsoft.com/office/drawing/2010/main">
+              <a14:hiddenFill xmlns:a14="http://schemas.microsoft.com/office/drawing/2010/main" xmlns="">
                 <a:solidFill>
                   <a:srgbClr val="FFFFFF"/>
                 </a:solidFill>
@@ -8132,7 +8978,7 @@
           <a:blip r:embed="rId5" cstate="print">
             <a:extLst>
               <a:ext uri="{28A0092B-C50C-407E-A947-70E740481C1C}">
-                <a14:useLocalDpi xmlns:a14="http://schemas.microsoft.com/office/drawing/2010/main" val="0"/>
+                <a14:useLocalDpi xmlns:a14="http://schemas.microsoft.com/office/drawing/2010/main" xmlns="" val="0"/>
               </a:ext>
             </a:extLst>
           </a:blip>
@@ -8152,7 +8998,7 @@
           <a:noFill/>
           <a:extLst>
             <a:ext uri="{909E8E84-426E-40DD-AFC4-6F175D3DCCD1}">
-              <a14:hiddenFill xmlns:a14="http://schemas.microsoft.com/office/drawing/2010/main">
+              <a14:hiddenFill xmlns:a14="http://schemas.microsoft.com/office/drawing/2010/main" xmlns="">
                 <a:solidFill>
                   <a:srgbClr val="FFFFFF"/>
                 </a:solidFill>
@@ -8170,10 +9016,10 @@
           <p:nvPr/>
         </p:nvPicPr>
         <p:blipFill>
-          <a:blip r:embed="rId6">
+          <a:blip r:embed="rId6" cstate="print">
             <a:extLst>
               <a:ext uri="{28A0092B-C50C-407E-A947-70E740481C1C}">
-                <a14:useLocalDpi xmlns:a14="http://schemas.microsoft.com/office/drawing/2010/main" val="0"/>
+                <a14:useLocalDpi xmlns:a14="http://schemas.microsoft.com/office/drawing/2010/main" xmlns="" val="0"/>
               </a:ext>
             </a:extLst>
           </a:blip>
@@ -8193,7 +9039,7 @@
           <a:noFill/>
           <a:extLst>
             <a:ext uri="{909E8E84-426E-40DD-AFC4-6F175D3DCCD1}">
-              <a14:hiddenFill xmlns:a14="http://schemas.microsoft.com/office/drawing/2010/main">
+              <a14:hiddenFill xmlns:a14="http://schemas.microsoft.com/office/drawing/2010/main" xmlns="">
                 <a:solidFill>
                   <a:srgbClr val="FFFFFF"/>
                 </a:solidFill>
@@ -8211,10 +9057,10 @@
           <p:nvPr/>
         </p:nvPicPr>
         <p:blipFill>
-          <a:blip r:embed="rId7">
+          <a:blip r:embed="rId7" cstate="print">
             <a:extLst>
               <a:ext uri="{28A0092B-C50C-407E-A947-70E740481C1C}">
-                <a14:useLocalDpi xmlns:a14="http://schemas.microsoft.com/office/drawing/2010/main" val="0"/>
+                <a14:useLocalDpi xmlns:a14="http://schemas.microsoft.com/office/drawing/2010/main" xmlns="" val="0"/>
               </a:ext>
             </a:extLst>
           </a:blip>
@@ -8234,7 +9080,7 @@
           <a:noFill/>
           <a:extLst>
             <a:ext uri="{909E8E84-426E-40DD-AFC4-6F175D3DCCD1}">
-              <a14:hiddenFill xmlns:a14="http://schemas.microsoft.com/office/drawing/2010/main">
+              <a14:hiddenFill xmlns:a14="http://schemas.microsoft.com/office/drawing/2010/main" xmlns="">
                 <a:solidFill>
                   <a:srgbClr val="FFFFFF"/>
                 </a:solidFill>
@@ -8246,7 +9092,7 @@
     </p:spTree>
     <p:extLst>
       <p:ext uri="{BB962C8B-B14F-4D97-AF65-F5344CB8AC3E}">
-        <p14:creationId xmlns:p14="http://schemas.microsoft.com/office/powerpoint/2010/main" val="1673023839"/>
+        <p14:creationId xmlns:p14="http://schemas.microsoft.com/office/powerpoint/2010/main" xmlns="" val="1673023839"/>
       </p:ext>
     </p:extLst>
   </p:cSld>
@@ -8282,10 +9128,10 @@
           <p:nvPr/>
         </p:nvPicPr>
         <p:blipFill>
-          <a:blip r:embed="rId3">
+          <a:blip r:embed="rId3" cstate="print">
             <a:extLst>
               <a:ext uri="{28A0092B-C50C-407E-A947-70E740481C1C}">
-                <a14:useLocalDpi xmlns:a14="http://schemas.microsoft.com/office/drawing/2010/main" val="0"/>
+                <a14:useLocalDpi xmlns:a14="http://schemas.microsoft.com/office/drawing/2010/main" xmlns="" val="0"/>
               </a:ext>
             </a:extLst>
           </a:blip>
@@ -8305,7 +9151,7 @@
           <a:noFill/>
           <a:extLst>
             <a:ext uri="{909E8E84-426E-40DD-AFC4-6F175D3DCCD1}">
-              <a14:hiddenFill xmlns:a14="http://schemas.microsoft.com/office/drawing/2010/main">
+              <a14:hiddenFill xmlns:a14="http://schemas.microsoft.com/office/drawing/2010/main" xmlns="">
                 <a:solidFill>
                   <a:srgbClr val="FFFFFF"/>
                 </a:solidFill>
@@ -8323,10 +9169,10 @@
           <p:nvPr/>
         </p:nvPicPr>
         <p:blipFill>
-          <a:blip r:embed="rId4">
+          <a:blip r:embed="rId4" cstate="print">
             <a:extLst>
               <a:ext uri="{28A0092B-C50C-407E-A947-70E740481C1C}">
-                <a14:useLocalDpi xmlns:a14="http://schemas.microsoft.com/office/drawing/2010/main" val="0"/>
+                <a14:useLocalDpi xmlns:a14="http://schemas.microsoft.com/office/drawing/2010/main" xmlns="" val="0"/>
               </a:ext>
             </a:extLst>
           </a:blip>
@@ -8346,7 +9192,7 @@
           <a:noFill/>
           <a:extLst>
             <a:ext uri="{909E8E84-426E-40DD-AFC4-6F175D3DCCD1}">
-              <a14:hiddenFill xmlns:a14="http://schemas.microsoft.com/office/drawing/2010/main">
+              <a14:hiddenFill xmlns:a14="http://schemas.microsoft.com/office/drawing/2010/main" xmlns="">
                 <a:solidFill>
                   <a:srgbClr val="FFFFFF"/>
                 </a:solidFill>
@@ -8367,7 +9213,7 @@
           <a:blip r:embed="rId5" cstate="print">
             <a:extLst>
               <a:ext uri="{28A0092B-C50C-407E-A947-70E740481C1C}">
-                <a14:useLocalDpi xmlns:a14="http://schemas.microsoft.com/office/drawing/2010/main" val="0"/>
+                <a14:useLocalDpi xmlns:a14="http://schemas.microsoft.com/office/drawing/2010/main" xmlns="" val="0"/>
               </a:ext>
             </a:extLst>
           </a:blip>
@@ -8387,7 +9233,7 @@
           <a:noFill/>
           <a:extLst>
             <a:ext uri="{909E8E84-426E-40DD-AFC4-6F175D3DCCD1}">
-              <a14:hiddenFill xmlns:a14="http://schemas.microsoft.com/office/drawing/2010/main">
+              <a14:hiddenFill xmlns:a14="http://schemas.microsoft.com/office/drawing/2010/main" xmlns="">
                 <a:solidFill>
                   <a:srgbClr val="FFFFFF"/>
                 </a:solidFill>
@@ -8405,10 +9251,10 @@
           <p:nvPr/>
         </p:nvPicPr>
         <p:blipFill>
-          <a:blip r:embed="rId6">
+          <a:blip r:embed="rId6" cstate="print">
             <a:extLst>
               <a:ext uri="{28A0092B-C50C-407E-A947-70E740481C1C}">
-                <a14:useLocalDpi xmlns:a14="http://schemas.microsoft.com/office/drawing/2010/main" val="0"/>
+                <a14:useLocalDpi xmlns:a14="http://schemas.microsoft.com/office/drawing/2010/main" xmlns="" val="0"/>
               </a:ext>
             </a:extLst>
           </a:blip>
@@ -8428,7 +9274,7 @@
           <a:noFill/>
           <a:extLst>
             <a:ext uri="{909E8E84-426E-40DD-AFC4-6F175D3DCCD1}">
-              <a14:hiddenFill xmlns:a14="http://schemas.microsoft.com/office/drawing/2010/main">
+              <a14:hiddenFill xmlns:a14="http://schemas.microsoft.com/office/drawing/2010/main" xmlns="">
                 <a:solidFill>
                   <a:srgbClr val="FFFFFF"/>
                 </a:solidFill>
@@ -8446,10 +9292,10 @@
           <p:nvPr/>
         </p:nvPicPr>
         <p:blipFill>
-          <a:blip r:embed="rId7">
+          <a:blip r:embed="rId7" cstate="print">
             <a:extLst>
               <a:ext uri="{28A0092B-C50C-407E-A947-70E740481C1C}">
-                <a14:useLocalDpi xmlns:a14="http://schemas.microsoft.com/office/drawing/2010/main" val="0"/>
+                <a14:useLocalDpi xmlns:a14="http://schemas.microsoft.com/office/drawing/2010/main" xmlns="" val="0"/>
               </a:ext>
             </a:extLst>
           </a:blip>
@@ -8469,7 +9315,7 @@
           <a:noFill/>
           <a:extLst>
             <a:ext uri="{909E8E84-426E-40DD-AFC4-6F175D3DCCD1}">
-              <a14:hiddenFill xmlns:a14="http://schemas.microsoft.com/office/drawing/2010/main">
+              <a14:hiddenFill xmlns:a14="http://schemas.microsoft.com/office/drawing/2010/main" xmlns="">
                 <a:solidFill>
                   <a:srgbClr val="FFFFFF"/>
                 </a:solidFill>
@@ -8487,10 +9333,10 @@
           <p:nvPr/>
         </p:nvPicPr>
         <p:blipFill>
-          <a:blip r:embed="rId8">
+          <a:blip r:embed="rId8" cstate="print">
             <a:extLst>
               <a:ext uri="{28A0092B-C50C-407E-A947-70E740481C1C}">
-                <a14:useLocalDpi xmlns:a14="http://schemas.microsoft.com/office/drawing/2010/main" val="0"/>
+                <a14:useLocalDpi xmlns:a14="http://schemas.microsoft.com/office/drawing/2010/main" xmlns="" val="0"/>
               </a:ext>
             </a:extLst>
           </a:blip>
@@ -8510,7 +9356,7 @@
           <a:noFill/>
           <a:extLst>
             <a:ext uri="{909E8E84-426E-40DD-AFC4-6F175D3DCCD1}">
-              <a14:hiddenFill xmlns:a14="http://schemas.microsoft.com/office/drawing/2010/main">
+              <a14:hiddenFill xmlns:a14="http://schemas.microsoft.com/office/drawing/2010/main" xmlns="">
                 <a:solidFill>
                   <a:srgbClr val="FFFFFF"/>
                 </a:solidFill>
@@ -8528,10 +9374,10 @@
           <p:nvPr/>
         </p:nvPicPr>
         <p:blipFill>
-          <a:blip r:embed="rId9">
+          <a:blip r:embed="rId9" cstate="print">
             <a:extLst>
               <a:ext uri="{28A0092B-C50C-407E-A947-70E740481C1C}">
-                <a14:useLocalDpi xmlns:a14="http://schemas.microsoft.com/office/drawing/2010/main" val="0"/>
+                <a14:useLocalDpi xmlns:a14="http://schemas.microsoft.com/office/drawing/2010/main" xmlns="" val="0"/>
               </a:ext>
             </a:extLst>
           </a:blip>
@@ -8551,7 +9397,7 @@
           <a:noFill/>
           <a:extLst>
             <a:ext uri="{909E8E84-426E-40DD-AFC4-6F175D3DCCD1}">
-              <a14:hiddenFill xmlns:a14="http://schemas.microsoft.com/office/drawing/2010/main">
+              <a14:hiddenFill xmlns:a14="http://schemas.microsoft.com/office/drawing/2010/main" xmlns="">
                 <a:solidFill>
                   <a:srgbClr val="FFFFFF"/>
                 </a:solidFill>
@@ -8563,18 +9409,18 @@
     </p:spTree>
     <p:extLst>
       <p:ext uri="{BB962C8B-B14F-4D97-AF65-F5344CB8AC3E}">
-        <p14:creationId xmlns:p14="http://schemas.microsoft.com/office/powerpoint/2010/main" val="837701220"/>
+        <p14:creationId xmlns:p14="http://schemas.microsoft.com/office/powerpoint/2010/main" xmlns="" val="837701220"/>
       </p:ext>
     </p:extLst>
   </p:cSld>
   <p:clrMapOvr>
     <a:masterClrMapping/>
   </p:clrMapOvr>
-  <mc:AlternateContent xmlns:mc="http://schemas.openxmlformats.org/markup-compatibility/2006" xmlns:p14="http://schemas.microsoft.com/office/powerpoint/2010/main">
-    <mc:Choice Requires="p14">
+  <mc:AlternateContent xmlns:mc="http://schemas.openxmlformats.org/markup-compatibility/2006">
+    <mc:Choice xmlns:p14="http://schemas.microsoft.com/office/powerpoint/2010/main" xmlns="" Requires="p14">
       <p:transition spd="slow" p14:dur="2000"/>
     </mc:Choice>
-    <mc:Fallback xmlns="">
+    <mc:Fallback>
       <p:transition spd="slow"/>
     </mc:Fallback>
   </mc:AlternateContent>
@@ -8626,10 +9472,10 @@
           <p:nvPr/>
         </p:nvPicPr>
         <p:blipFill>
-          <a:blip r:embed="rId3">
+          <a:blip r:embed="rId3" cstate="print">
             <a:extLst>
               <a:ext uri="{28A0092B-C50C-407E-A947-70E740481C1C}">
-                <a14:useLocalDpi xmlns:a14="http://schemas.microsoft.com/office/drawing/2010/main" val="0"/>
+                <a14:useLocalDpi xmlns:a14="http://schemas.microsoft.com/office/drawing/2010/main" xmlns="" val="0"/>
               </a:ext>
             </a:extLst>
           </a:blip>
@@ -8649,7 +9495,7 @@
           <a:noFill/>
           <a:extLst>
             <a:ext uri="{909E8E84-426E-40DD-AFC4-6F175D3DCCD1}">
-              <a14:hiddenFill xmlns:a14="http://schemas.microsoft.com/office/drawing/2010/main">
+              <a14:hiddenFill xmlns:a14="http://schemas.microsoft.com/office/drawing/2010/main" xmlns="">
                 <a:solidFill>
                   <a:srgbClr val="FFFFFF"/>
                 </a:solidFill>
@@ -8667,10 +9513,10 @@
           <p:nvPr/>
         </p:nvPicPr>
         <p:blipFill>
-          <a:blip r:embed="rId4">
+          <a:blip r:embed="rId4" cstate="print">
             <a:extLst>
               <a:ext uri="{28A0092B-C50C-407E-A947-70E740481C1C}">
-                <a14:useLocalDpi xmlns:a14="http://schemas.microsoft.com/office/drawing/2010/main" val="0"/>
+                <a14:useLocalDpi xmlns:a14="http://schemas.microsoft.com/office/drawing/2010/main" xmlns="" val="0"/>
               </a:ext>
             </a:extLst>
           </a:blip>
@@ -8690,7 +9536,7 @@
           <a:noFill/>
           <a:extLst>
             <a:ext uri="{909E8E84-426E-40DD-AFC4-6F175D3DCCD1}">
-              <a14:hiddenFill xmlns:a14="http://schemas.microsoft.com/office/drawing/2010/main">
+              <a14:hiddenFill xmlns:a14="http://schemas.microsoft.com/office/drawing/2010/main" xmlns="">
                 <a:solidFill>
                   <a:srgbClr val="FFFFFF"/>
                 </a:solidFill>
@@ -8711,7 +9557,7 @@
           <a:blip r:embed="rId5" cstate="print">
             <a:extLst>
               <a:ext uri="{28A0092B-C50C-407E-A947-70E740481C1C}">
-                <a14:useLocalDpi xmlns:a14="http://schemas.microsoft.com/office/drawing/2010/main" val="0"/>
+                <a14:useLocalDpi xmlns:a14="http://schemas.microsoft.com/office/drawing/2010/main" xmlns="" val="0"/>
               </a:ext>
             </a:extLst>
           </a:blip>
@@ -8731,7 +9577,7 @@
           <a:noFill/>
           <a:extLst>
             <a:ext uri="{909E8E84-426E-40DD-AFC4-6F175D3DCCD1}">
-              <a14:hiddenFill xmlns:a14="http://schemas.microsoft.com/office/drawing/2010/main">
+              <a14:hiddenFill xmlns:a14="http://schemas.microsoft.com/office/drawing/2010/main" xmlns="">
                 <a:solidFill>
                   <a:srgbClr val="FFFFFF"/>
                 </a:solidFill>
@@ -8749,10 +9595,10 @@
           <p:nvPr/>
         </p:nvPicPr>
         <p:blipFill>
-          <a:blip r:embed="rId6">
+          <a:blip r:embed="rId6" cstate="print">
             <a:extLst>
               <a:ext uri="{28A0092B-C50C-407E-A947-70E740481C1C}">
-                <a14:useLocalDpi xmlns:a14="http://schemas.microsoft.com/office/drawing/2010/main" val="0"/>
+                <a14:useLocalDpi xmlns:a14="http://schemas.microsoft.com/office/drawing/2010/main" xmlns="" val="0"/>
               </a:ext>
             </a:extLst>
           </a:blip>
@@ -8772,7 +9618,7 @@
           <a:noFill/>
           <a:extLst>
             <a:ext uri="{909E8E84-426E-40DD-AFC4-6F175D3DCCD1}">
-              <a14:hiddenFill xmlns:a14="http://schemas.microsoft.com/office/drawing/2010/main">
+              <a14:hiddenFill xmlns:a14="http://schemas.microsoft.com/office/drawing/2010/main" xmlns="">
                 <a:solidFill>
                   <a:srgbClr val="FFFFFF"/>
                 </a:solidFill>
@@ -8790,10 +9636,10 @@
           <p:nvPr/>
         </p:nvPicPr>
         <p:blipFill>
-          <a:blip r:embed="rId7">
+          <a:blip r:embed="rId7" cstate="print">
             <a:extLst>
               <a:ext uri="{28A0092B-C50C-407E-A947-70E740481C1C}">
-                <a14:useLocalDpi xmlns:a14="http://schemas.microsoft.com/office/drawing/2010/main" val="0"/>
+                <a14:useLocalDpi xmlns:a14="http://schemas.microsoft.com/office/drawing/2010/main" xmlns="" val="0"/>
               </a:ext>
             </a:extLst>
           </a:blip>
@@ -8813,7 +9659,7 @@
           <a:noFill/>
           <a:extLst>
             <a:ext uri="{909E8E84-426E-40DD-AFC4-6F175D3DCCD1}">
-              <a14:hiddenFill xmlns:a14="http://schemas.microsoft.com/office/drawing/2010/main">
+              <a14:hiddenFill xmlns:a14="http://schemas.microsoft.com/office/drawing/2010/main" xmlns="">
                 <a:solidFill>
                   <a:srgbClr val="FFFFFF"/>
                 </a:solidFill>
@@ -8831,10 +9677,10 @@
           <p:nvPr/>
         </p:nvPicPr>
         <p:blipFill>
-          <a:blip r:embed="rId8">
+          <a:blip r:embed="rId8" cstate="print">
             <a:extLst>
               <a:ext uri="{28A0092B-C50C-407E-A947-70E740481C1C}">
-                <a14:useLocalDpi xmlns:a14="http://schemas.microsoft.com/office/drawing/2010/main" val="0"/>
+                <a14:useLocalDpi xmlns:a14="http://schemas.microsoft.com/office/drawing/2010/main" xmlns="" val="0"/>
               </a:ext>
             </a:extLst>
           </a:blip>
@@ -8854,7 +9700,7 @@
           <a:noFill/>
           <a:extLst>
             <a:ext uri="{909E8E84-426E-40DD-AFC4-6F175D3DCCD1}">
-              <a14:hiddenFill xmlns:a14="http://schemas.microsoft.com/office/drawing/2010/main">
+              <a14:hiddenFill xmlns:a14="http://schemas.microsoft.com/office/drawing/2010/main" xmlns="">
                 <a:solidFill>
                   <a:srgbClr val="FFFFFF"/>
                 </a:solidFill>
@@ -8872,10 +9718,10 @@
           <p:nvPr/>
         </p:nvPicPr>
         <p:blipFill>
-          <a:blip r:embed="rId9">
+          <a:blip r:embed="rId9" cstate="print">
             <a:extLst>
               <a:ext uri="{28A0092B-C50C-407E-A947-70E740481C1C}">
-                <a14:useLocalDpi xmlns:a14="http://schemas.microsoft.com/office/drawing/2010/main" val="0"/>
+                <a14:useLocalDpi xmlns:a14="http://schemas.microsoft.com/office/drawing/2010/main" xmlns="" val="0"/>
               </a:ext>
             </a:extLst>
           </a:blip>
@@ -8895,7 +9741,7 @@
           <a:noFill/>
           <a:extLst>
             <a:ext uri="{909E8E84-426E-40DD-AFC4-6F175D3DCCD1}">
-              <a14:hiddenFill xmlns:a14="http://schemas.microsoft.com/office/drawing/2010/main">
+              <a14:hiddenFill xmlns:a14="http://schemas.microsoft.com/office/drawing/2010/main" xmlns="">
                 <a:solidFill>
                   <a:srgbClr val="FFFFFF"/>
                 </a:solidFill>
@@ -8907,18 +9753,18 @@
     </p:spTree>
     <p:extLst>
       <p:ext uri="{BB962C8B-B14F-4D97-AF65-F5344CB8AC3E}">
-        <p14:creationId xmlns:p14="http://schemas.microsoft.com/office/powerpoint/2010/main" val="1937642497"/>
+        <p14:creationId xmlns:p14="http://schemas.microsoft.com/office/powerpoint/2010/main" xmlns="" val="1937642497"/>
       </p:ext>
     </p:extLst>
   </p:cSld>
   <p:clrMapOvr>
     <a:masterClrMapping/>
   </p:clrMapOvr>
-  <mc:AlternateContent xmlns:mc="http://schemas.openxmlformats.org/markup-compatibility/2006" xmlns:p14="http://schemas.microsoft.com/office/powerpoint/2010/main">
-    <mc:Choice Requires="p14">
+  <mc:AlternateContent xmlns:mc="http://schemas.openxmlformats.org/markup-compatibility/2006">
+    <mc:Choice xmlns:p14="http://schemas.microsoft.com/office/powerpoint/2010/main" xmlns="" Requires="p14">
       <p:transition spd="slow" p14:dur="2000"/>
     </mc:Choice>
-    <mc:Fallback xmlns="">
+    <mc:Fallback>
       <p:transition spd="slow"/>
     </mc:Fallback>
   </mc:AlternateContent>
@@ -8951,10 +9797,10 @@
           <p:nvPr/>
         </p:nvPicPr>
         <p:blipFill>
-          <a:blip r:embed="rId3">
+          <a:blip r:embed="rId3" cstate="print">
             <a:extLst>
               <a:ext uri="{28A0092B-C50C-407E-A947-70E740481C1C}">
-                <a14:useLocalDpi xmlns:a14="http://schemas.microsoft.com/office/drawing/2010/main" val="0"/>
+                <a14:useLocalDpi xmlns:a14="http://schemas.microsoft.com/office/drawing/2010/main" xmlns="" val="0"/>
               </a:ext>
             </a:extLst>
           </a:blip>
@@ -8978,14 +9824,14 @@
           <a:effectLst/>
           <a:extLst>
             <a:ext uri="{909E8E84-426E-40DD-AFC4-6F175D3DCCD1}">
-              <a14:hiddenFill xmlns:a14="http://schemas.microsoft.com/office/drawing/2010/main">
+              <a14:hiddenFill xmlns:a14="http://schemas.microsoft.com/office/drawing/2010/main" xmlns="">
                 <a:solidFill>
                   <a:schemeClr val="accent1"/>
                 </a:solidFill>
               </a14:hiddenFill>
             </a:ext>
             <a:ext uri="{91240B29-F687-4F45-9708-019B960494DF}">
-              <a14:hiddenLine xmlns:a14="http://schemas.microsoft.com/office/drawing/2010/main" w="9525">
+              <a14:hiddenLine xmlns:a14="http://schemas.microsoft.com/office/drawing/2010/main" xmlns="" w="9525">
                 <a:solidFill>
                   <a:schemeClr val="tx1"/>
                 </a:solidFill>
@@ -8995,7 +9841,7 @@
               </a14:hiddenLine>
             </a:ext>
             <a:ext uri="{AF507438-7753-43E0-B8FC-AC1667EBCBE1}">
-              <a14:hiddenEffects xmlns:a14="http://schemas.microsoft.com/office/drawing/2010/main">
+              <a14:hiddenEffects xmlns:a14="http://schemas.microsoft.com/office/drawing/2010/main" xmlns="">
                 <a:effectLst>
                   <a:outerShdw dist="35921" dir="2700000" algn="ctr" rotWithShape="0">
                     <a:schemeClr val="bg2"/>
@@ -9034,10 +9880,10 @@
           <p:nvPr/>
         </p:nvPicPr>
         <p:blipFill>
-          <a:blip r:embed="rId4">
+          <a:blip r:embed="rId4" cstate="print">
             <a:extLst>
               <a:ext uri="{28A0092B-C50C-407E-A947-70E740481C1C}">
-                <a14:useLocalDpi xmlns:a14="http://schemas.microsoft.com/office/drawing/2010/main" val="0"/>
+                <a14:useLocalDpi xmlns:a14="http://schemas.microsoft.com/office/drawing/2010/main" xmlns="" val="0"/>
               </a:ext>
             </a:extLst>
           </a:blip>
@@ -9057,7 +9903,7 @@
           <a:noFill/>
           <a:extLst>
             <a:ext uri="{909E8E84-426E-40DD-AFC4-6F175D3DCCD1}">
-              <a14:hiddenFill xmlns:a14="http://schemas.microsoft.com/office/drawing/2010/main">
+              <a14:hiddenFill xmlns:a14="http://schemas.microsoft.com/office/drawing/2010/main" xmlns="">
                 <a:solidFill>
                   <a:srgbClr val="FFFFFF"/>
                 </a:solidFill>
@@ -9075,10 +9921,10 @@
           <p:nvPr/>
         </p:nvPicPr>
         <p:blipFill>
-          <a:blip r:embed="rId5">
+          <a:blip r:embed="rId5" cstate="print">
             <a:extLst>
               <a:ext uri="{28A0092B-C50C-407E-A947-70E740481C1C}">
-                <a14:useLocalDpi xmlns:a14="http://schemas.microsoft.com/office/drawing/2010/main" val="0"/>
+                <a14:useLocalDpi xmlns:a14="http://schemas.microsoft.com/office/drawing/2010/main" xmlns="" val="0"/>
               </a:ext>
             </a:extLst>
           </a:blip>
@@ -9098,7 +9944,7 @@
           <a:noFill/>
           <a:extLst>
             <a:ext uri="{909E8E84-426E-40DD-AFC4-6F175D3DCCD1}">
-              <a14:hiddenFill xmlns:a14="http://schemas.microsoft.com/office/drawing/2010/main">
+              <a14:hiddenFill xmlns:a14="http://schemas.microsoft.com/office/drawing/2010/main" xmlns="">
                 <a:solidFill>
                   <a:srgbClr val="FFFFFF"/>
                 </a:solidFill>
@@ -9119,7 +9965,7 @@
           <a:blip r:embed="rId6" cstate="print">
             <a:extLst>
               <a:ext uri="{28A0092B-C50C-407E-A947-70E740481C1C}">
-                <a14:useLocalDpi xmlns:a14="http://schemas.microsoft.com/office/drawing/2010/main" val="0"/>
+                <a14:useLocalDpi xmlns:a14="http://schemas.microsoft.com/office/drawing/2010/main" xmlns="" val="0"/>
               </a:ext>
             </a:extLst>
           </a:blip>
@@ -9139,7 +9985,7 @@
           <a:noFill/>
           <a:extLst>
             <a:ext uri="{909E8E84-426E-40DD-AFC4-6F175D3DCCD1}">
-              <a14:hiddenFill xmlns:a14="http://schemas.microsoft.com/office/drawing/2010/main">
+              <a14:hiddenFill xmlns:a14="http://schemas.microsoft.com/office/drawing/2010/main" xmlns="">
                 <a:solidFill>
                   <a:srgbClr val="FFFFFF"/>
                 </a:solidFill>
@@ -9157,10 +10003,10 @@
           <p:nvPr/>
         </p:nvPicPr>
         <p:blipFill>
-          <a:blip r:embed="rId7">
+          <a:blip r:embed="rId7" cstate="print">
             <a:extLst>
               <a:ext uri="{28A0092B-C50C-407E-A947-70E740481C1C}">
-                <a14:useLocalDpi xmlns:a14="http://schemas.microsoft.com/office/drawing/2010/main" val="0"/>
+                <a14:useLocalDpi xmlns:a14="http://schemas.microsoft.com/office/drawing/2010/main" xmlns="" val="0"/>
               </a:ext>
             </a:extLst>
           </a:blip>
@@ -9180,7 +10026,7 @@
           <a:noFill/>
           <a:extLst>
             <a:ext uri="{909E8E84-426E-40DD-AFC4-6F175D3DCCD1}">
-              <a14:hiddenFill xmlns:a14="http://schemas.microsoft.com/office/drawing/2010/main">
+              <a14:hiddenFill xmlns:a14="http://schemas.microsoft.com/office/drawing/2010/main" xmlns="">
                 <a:solidFill>
                   <a:srgbClr val="FFFFFF"/>
                 </a:solidFill>
@@ -9198,10 +10044,10 @@
           <p:nvPr/>
         </p:nvPicPr>
         <p:blipFill>
-          <a:blip r:embed="rId8">
+          <a:blip r:embed="rId8" cstate="print">
             <a:extLst>
               <a:ext uri="{28A0092B-C50C-407E-A947-70E740481C1C}">
-                <a14:useLocalDpi xmlns:a14="http://schemas.microsoft.com/office/drawing/2010/main" val="0"/>
+                <a14:useLocalDpi xmlns:a14="http://schemas.microsoft.com/office/drawing/2010/main" xmlns="" val="0"/>
               </a:ext>
             </a:extLst>
           </a:blip>
@@ -9221,7 +10067,7 @@
           <a:noFill/>
           <a:extLst>
             <a:ext uri="{909E8E84-426E-40DD-AFC4-6F175D3DCCD1}">
-              <a14:hiddenFill xmlns:a14="http://schemas.microsoft.com/office/drawing/2010/main">
+              <a14:hiddenFill xmlns:a14="http://schemas.microsoft.com/office/drawing/2010/main" xmlns="">
                 <a:solidFill>
                   <a:srgbClr val="FFFFFF"/>
                 </a:solidFill>
@@ -9239,10 +10085,10 @@
           <p:nvPr/>
         </p:nvPicPr>
         <p:blipFill>
-          <a:blip r:embed="rId9">
+          <a:blip r:embed="rId9" cstate="print">
             <a:extLst>
               <a:ext uri="{28A0092B-C50C-407E-A947-70E740481C1C}">
-                <a14:useLocalDpi xmlns:a14="http://schemas.microsoft.com/office/drawing/2010/main" val="0"/>
+                <a14:useLocalDpi xmlns:a14="http://schemas.microsoft.com/office/drawing/2010/main" xmlns="" val="0"/>
               </a:ext>
             </a:extLst>
           </a:blip>
@@ -9262,7 +10108,7 @@
           <a:noFill/>
           <a:extLst>
             <a:ext uri="{909E8E84-426E-40DD-AFC4-6F175D3DCCD1}">
-              <a14:hiddenFill xmlns:a14="http://schemas.microsoft.com/office/drawing/2010/main">
+              <a14:hiddenFill xmlns:a14="http://schemas.microsoft.com/office/drawing/2010/main" xmlns="">
                 <a:solidFill>
                   <a:srgbClr val="FFFFFF"/>
                 </a:solidFill>
@@ -9280,10 +10126,10 @@
           <p:nvPr/>
         </p:nvPicPr>
         <p:blipFill>
-          <a:blip r:embed="rId10">
+          <a:blip r:embed="rId10" cstate="print">
             <a:extLst>
               <a:ext uri="{28A0092B-C50C-407E-A947-70E740481C1C}">
-                <a14:useLocalDpi xmlns:a14="http://schemas.microsoft.com/office/drawing/2010/main" val="0"/>
+                <a14:useLocalDpi xmlns:a14="http://schemas.microsoft.com/office/drawing/2010/main" xmlns="" val="0"/>
               </a:ext>
             </a:extLst>
           </a:blip>
@@ -9307,14 +10153,14 @@
           <a:effectLst/>
           <a:extLst>
             <a:ext uri="{909E8E84-426E-40DD-AFC4-6F175D3DCCD1}">
-              <a14:hiddenFill xmlns:a14="http://schemas.microsoft.com/office/drawing/2010/main">
+              <a14:hiddenFill xmlns:a14="http://schemas.microsoft.com/office/drawing/2010/main" xmlns="">
                 <a:solidFill>
                   <a:schemeClr val="accent1"/>
                 </a:solidFill>
               </a14:hiddenFill>
             </a:ext>
             <a:ext uri="{91240B29-F687-4F45-9708-019B960494DF}">
-              <a14:hiddenLine xmlns:a14="http://schemas.microsoft.com/office/drawing/2010/main" w="9525">
+              <a14:hiddenLine xmlns:a14="http://schemas.microsoft.com/office/drawing/2010/main" xmlns="" w="9525">
                 <a:solidFill>
                   <a:schemeClr val="tx1"/>
                 </a:solidFill>
@@ -9324,7 +10170,7 @@
               </a14:hiddenLine>
             </a:ext>
             <a:ext uri="{AF507438-7753-43E0-B8FC-AC1667EBCBE1}">
-              <a14:hiddenEffects xmlns:a14="http://schemas.microsoft.com/office/drawing/2010/main">
+              <a14:hiddenEffects xmlns:a14="http://schemas.microsoft.com/office/drawing/2010/main" xmlns="">
                 <a:effectLst>
                   <a:outerShdw dist="35921" dir="2700000" algn="ctr" rotWithShape="0">
                     <a:schemeClr val="bg2"/>
@@ -9338,18 +10184,18 @@
     </p:spTree>
     <p:extLst>
       <p:ext uri="{BB962C8B-B14F-4D97-AF65-F5344CB8AC3E}">
-        <p14:creationId xmlns:p14="http://schemas.microsoft.com/office/powerpoint/2010/main" val="265185508"/>
+        <p14:creationId xmlns:p14="http://schemas.microsoft.com/office/powerpoint/2010/main" xmlns="" val="265185508"/>
       </p:ext>
     </p:extLst>
   </p:cSld>
   <p:clrMapOvr>
     <a:masterClrMapping/>
   </p:clrMapOvr>
-  <mc:AlternateContent xmlns:mc="http://schemas.openxmlformats.org/markup-compatibility/2006" xmlns:p14="http://schemas.microsoft.com/office/powerpoint/2010/main">
-    <mc:Choice Requires="p14">
+  <mc:AlternateContent xmlns:mc="http://schemas.openxmlformats.org/markup-compatibility/2006">
+    <mc:Choice xmlns:p14="http://schemas.microsoft.com/office/powerpoint/2010/main" xmlns="" Requires="p14">
       <p:transition spd="slow" p14:dur="2000"/>
     </mc:Choice>
-    <mc:Fallback xmlns="">
+    <mc:Fallback>
       <p:transition spd="slow"/>
     </mc:Fallback>
   </mc:AlternateContent>
@@ -9385,7 +10231,7 @@
           <a:blip r:embed="rId3" cstate="print">
             <a:extLst>
               <a:ext uri="{28A0092B-C50C-407E-A947-70E740481C1C}">
-                <a14:useLocalDpi xmlns:a14="http://schemas.microsoft.com/office/drawing/2010/main" val="0"/>
+                <a14:useLocalDpi xmlns:a14="http://schemas.microsoft.com/office/drawing/2010/main" xmlns="" val="0"/>
               </a:ext>
             </a:extLst>
           </a:blip>
@@ -9405,7 +10251,7 @@
           <a:noFill/>
           <a:extLst>
             <a:ext uri="{909E8E84-426E-40DD-AFC4-6F175D3DCCD1}">
-              <a14:hiddenFill xmlns:a14="http://schemas.microsoft.com/office/drawing/2010/main">
+              <a14:hiddenFill xmlns:a14="http://schemas.microsoft.com/office/drawing/2010/main" xmlns="">
                 <a:solidFill>
                   <a:srgbClr val="FFFFFF"/>
                 </a:solidFill>
@@ -9426,7 +10272,7 @@
           <a:blip r:embed="rId4" cstate="print">
             <a:extLst>
               <a:ext uri="{28A0092B-C50C-407E-A947-70E740481C1C}">
-                <a14:useLocalDpi xmlns:a14="http://schemas.microsoft.com/office/drawing/2010/main" val="0"/>
+                <a14:useLocalDpi xmlns:a14="http://schemas.microsoft.com/office/drawing/2010/main" xmlns="" val="0"/>
               </a:ext>
             </a:extLst>
           </a:blip>
@@ -9446,7 +10292,7 @@
           <a:noFill/>
           <a:extLst>
             <a:ext uri="{909E8E84-426E-40DD-AFC4-6F175D3DCCD1}">
-              <a14:hiddenFill xmlns:a14="http://schemas.microsoft.com/office/drawing/2010/main">
+              <a14:hiddenFill xmlns:a14="http://schemas.microsoft.com/office/drawing/2010/main" xmlns="">
                 <a:solidFill>
                   <a:srgbClr val="FFFFFF"/>
                 </a:solidFill>
@@ -9467,7 +10313,7 @@
           <a:blip r:embed="rId5" cstate="print">
             <a:extLst>
               <a:ext uri="{28A0092B-C50C-407E-A947-70E740481C1C}">
-                <a14:useLocalDpi xmlns:a14="http://schemas.microsoft.com/office/drawing/2010/main" val="0"/>
+                <a14:useLocalDpi xmlns:a14="http://schemas.microsoft.com/office/drawing/2010/main" xmlns="" val="0"/>
               </a:ext>
             </a:extLst>
           </a:blip>
@@ -9487,7 +10333,7 @@
           <a:noFill/>
           <a:extLst>
             <a:ext uri="{909E8E84-426E-40DD-AFC4-6F175D3DCCD1}">
-              <a14:hiddenFill xmlns:a14="http://schemas.microsoft.com/office/drawing/2010/main">
+              <a14:hiddenFill xmlns:a14="http://schemas.microsoft.com/office/drawing/2010/main" xmlns="">
                 <a:solidFill>
                   <a:srgbClr val="FFFFFF"/>
                 </a:solidFill>
@@ -9508,7 +10354,7 @@
           <a:blip r:embed="rId6" cstate="print">
             <a:extLst>
               <a:ext uri="{28A0092B-C50C-407E-A947-70E740481C1C}">
-                <a14:useLocalDpi xmlns:a14="http://schemas.microsoft.com/office/drawing/2010/main" val="0"/>
+                <a14:useLocalDpi xmlns:a14="http://schemas.microsoft.com/office/drawing/2010/main" xmlns="" val="0"/>
               </a:ext>
             </a:extLst>
           </a:blip>
@@ -9528,7 +10374,7 @@
           <a:noFill/>
           <a:extLst>
             <a:ext uri="{909E8E84-426E-40DD-AFC4-6F175D3DCCD1}">
-              <a14:hiddenFill xmlns:a14="http://schemas.microsoft.com/office/drawing/2010/main">
+              <a14:hiddenFill xmlns:a14="http://schemas.microsoft.com/office/drawing/2010/main" xmlns="">
                 <a:solidFill>
                   <a:srgbClr val="FFFFFF"/>
                 </a:solidFill>
@@ -9549,7 +10395,7 @@
           <a:blip r:embed="rId7" cstate="print">
             <a:extLst>
               <a:ext uri="{28A0092B-C50C-407E-A947-70E740481C1C}">
-                <a14:useLocalDpi xmlns:a14="http://schemas.microsoft.com/office/drawing/2010/main" val="0"/>
+                <a14:useLocalDpi xmlns:a14="http://schemas.microsoft.com/office/drawing/2010/main" xmlns="" val="0"/>
               </a:ext>
             </a:extLst>
           </a:blip>
@@ -9569,7 +10415,7 @@
           <a:noFill/>
           <a:extLst>
             <a:ext uri="{909E8E84-426E-40DD-AFC4-6F175D3DCCD1}">
-              <a14:hiddenFill xmlns:a14="http://schemas.microsoft.com/office/drawing/2010/main">
+              <a14:hiddenFill xmlns:a14="http://schemas.microsoft.com/office/drawing/2010/main" xmlns="">
                 <a:solidFill>
                   <a:srgbClr val="FFFFFF"/>
                 </a:solidFill>
@@ -9590,7 +10436,7 @@
           <a:blip r:embed="rId8" cstate="print">
             <a:extLst>
               <a:ext uri="{28A0092B-C50C-407E-A947-70E740481C1C}">
-                <a14:useLocalDpi xmlns:a14="http://schemas.microsoft.com/office/drawing/2010/main" val="0"/>
+                <a14:useLocalDpi xmlns:a14="http://schemas.microsoft.com/office/drawing/2010/main" xmlns="" val="0"/>
               </a:ext>
             </a:extLst>
           </a:blip>
@@ -9610,7 +10456,7 @@
           <a:noFill/>
           <a:extLst>
             <a:ext uri="{909E8E84-426E-40DD-AFC4-6F175D3DCCD1}">
-              <a14:hiddenFill xmlns:a14="http://schemas.microsoft.com/office/drawing/2010/main">
+              <a14:hiddenFill xmlns:a14="http://schemas.microsoft.com/office/drawing/2010/main" xmlns="">
                 <a:solidFill>
                   <a:srgbClr val="FFFFFF"/>
                 </a:solidFill>
@@ -9631,7 +10477,7 @@
           <a:blip r:embed="rId9" cstate="print">
             <a:extLst>
               <a:ext uri="{28A0092B-C50C-407E-A947-70E740481C1C}">
-                <a14:useLocalDpi xmlns:a14="http://schemas.microsoft.com/office/drawing/2010/main" val="0"/>
+                <a14:useLocalDpi xmlns:a14="http://schemas.microsoft.com/office/drawing/2010/main" xmlns="" val="0"/>
               </a:ext>
             </a:extLst>
           </a:blip>
@@ -9655,14 +10501,14 @@
           <a:effectLst/>
           <a:extLst>
             <a:ext uri="{909E8E84-426E-40DD-AFC4-6F175D3DCCD1}">
-              <a14:hiddenFill xmlns:a14="http://schemas.microsoft.com/office/drawing/2010/main">
+              <a14:hiddenFill xmlns:a14="http://schemas.microsoft.com/office/drawing/2010/main" xmlns="">
                 <a:solidFill>
                   <a:schemeClr val="accent1"/>
                 </a:solidFill>
               </a14:hiddenFill>
             </a:ext>
             <a:ext uri="{91240B29-F687-4F45-9708-019B960494DF}">
-              <a14:hiddenLine xmlns:a14="http://schemas.microsoft.com/office/drawing/2010/main" w="9525">
+              <a14:hiddenLine xmlns:a14="http://schemas.microsoft.com/office/drawing/2010/main" xmlns="" w="9525">
                 <a:solidFill>
                   <a:schemeClr val="tx1"/>
                 </a:solidFill>
@@ -9672,7 +10518,7 @@
               </a14:hiddenLine>
             </a:ext>
             <a:ext uri="{AF507438-7753-43E0-B8FC-AC1667EBCBE1}">
-              <a14:hiddenEffects xmlns:a14="http://schemas.microsoft.com/office/drawing/2010/main">
+              <a14:hiddenEffects xmlns:a14="http://schemas.microsoft.com/office/drawing/2010/main" xmlns="">
                 <a:effectLst>
                   <a:outerShdw dist="35921" dir="2700000" algn="ctr" rotWithShape="0">
                     <a:schemeClr val="bg2"/>
@@ -9695,7 +10541,7 @@
           <a:blip r:embed="rId10" cstate="print">
             <a:extLst>
               <a:ext uri="{28A0092B-C50C-407E-A947-70E740481C1C}">
-                <a14:useLocalDpi xmlns:a14="http://schemas.microsoft.com/office/drawing/2010/main" val="0"/>
+                <a14:useLocalDpi xmlns:a14="http://schemas.microsoft.com/office/drawing/2010/main" xmlns="" val="0"/>
               </a:ext>
             </a:extLst>
           </a:blip>
@@ -9715,7 +10561,7 @@
           <a:noFill/>
           <a:extLst>
             <a:ext uri="{909E8E84-426E-40DD-AFC4-6F175D3DCCD1}">
-              <a14:hiddenFill xmlns:a14="http://schemas.microsoft.com/office/drawing/2010/main">
+              <a14:hiddenFill xmlns:a14="http://schemas.microsoft.com/office/drawing/2010/main" xmlns="">
                 <a:solidFill>
                   <a:srgbClr val="FFFFFF"/>
                 </a:solidFill>
@@ -9733,10 +10579,10 @@
           <p:nvPr/>
         </p:nvPicPr>
         <p:blipFill>
-          <a:blip r:embed="rId11">
+          <a:blip r:embed="rId11" cstate="print">
             <a:extLst>
               <a:ext uri="{28A0092B-C50C-407E-A947-70E740481C1C}">
-                <a14:useLocalDpi xmlns:a14="http://schemas.microsoft.com/office/drawing/2010/main" val="0"/>
+                <a14:useLocalDpi xmlns:a14="http://schemas.microsoft.com/office/drawing/2010/main" xmlns="" val="0"/>
               </a:ext>
             </a:extLst>
           </a:blip>
@@ -9756,7 +10602,7 @@
           <a:noFill/>
           <a:extLst>
             <a:ext uri="{909E8E84-426E-40DD-AFC4-6F175D3DCCD1}">
-              <a14:hiddenFill xmlns:a14="http://schemas.microsoft.com/office/drawing/2010/main">
+              <a14:hiddenFill xmlns:a14="http://schemas.microsoft.com/office/drawing/2010/main" xmlns="">
                 <a:solidFill>
                   <a:srgbClr val="FFFFFF"/>
                 </a:solidFill>
@@ -9774,10 +10620,10 @@
           <p:nvPr/>
         </p:nvPicPr>
         <p:blipFill>
-          <a:blip r:embed="rId12">
+          <a:blip r:embed="rId12" cstate="print">
             <a:extLst>
               <a:ext uri="{28A0092B-C50C-407E-A947-70E740481C1C}">
-                <a14:useLocalDpi xmlns:a14="http://schemas.microsoft.com/office/drawing/2010/main" val="0"/>
+                <a14:useLocalDpi xmlns:a14="http://schemas.microsoft.com/office/drawing/2010/main" xmlns="" val="0"/>
               </a:ext>
             </a:extLst>
           </a:blip>
@@ -9835,10 +10681,10 @@
           <p:nvPr/>
         </p:nvPicPr>
         <p:blipFill>
-          <a:blip r:embed="rId13">
+          <a:blip r:embed="rId13" cstate="print">
             <a:extLst>
               <a:ext uri="{28A0092B-C50C-407E-A947-70E740481C1C}">
-                <a14:useLocalDpi xmlns:a14="http://schemas.microsoft.com/office/drawing/2010/main" val="0"/>
+                <a14:useLocalDpi xmlns:a14="http://schemas.microsoft.com/office/drawing/2010/main" xmlns="" val="0"/>
               </a:ext>
             </a:extLst>
           </a:blip>
@@ -9858,7 +10704,7 @@
           <a:noFill/>
           <a:extLst>
             <a:ext uri="{909E8E84-426E-40DD-AFC4-6F175D3DCCD1}">
-              <a14:hiddenFill xmlns:a14="http://schemas.microsoft.com/office/drawing/2010/main">
+              <a14:hiddenFill xmlns:a14="http://schemas.microsoft.com/office/drawing/2010/main" xmlns="">
                 <a:solidFill>
                   <a:srgbClr val="FFFFFF"/>
                 </a:solidFill>
@@ -9879,7 +10725,7 @@
           <a:blip r:embed="rId14" cstate="print">
             <a:extLst>
               <a:ext uri="{28A0092B-C50C-407E-A947-70E740481C1C}">
-                <a14:useLocalDpi xmlns:a14="http://schemas.microsoft.com/office/drawing/2010/main" val="0"/>
+                <a14:useLocalDpi xmlns:a14="http://schemas.microsoft.com/office/drawing/2010/main" xmlns="" val="0"/>
               </a:ext>
             </a:extLst>
           </a:blip>
@@ -9906,10 +10752,10 @@
           <p:nvPr/>
         </p:nvPicPr>
         <p:blipFill rotWithShape="1">
-          <a:blip r:embed="rId15">
+          <a:blip r:embed="rId15" cstate="print">
             <a:extLst>
               <a:ext uri="{28A0092B-C50C-407E-A947-70E740481C1C}">
-                <a14:useLocalDpi xmlns:a14="http://schemas.microsoft.com/office/drawing/2010/main" val="0"/>
+                <a14:useLocalDpi xmlns:a14="http://schemas.microsoft.com/office/drawing/2010/main" xmlns="" val="0"/>
               </a:ext>
             </a:extLst>
           </a:blip>
@@ -9935,10 +10781,10 @@
           <p:nvPr/>
         </p:nvPicPr>
         <p:blipFill>
-          <a:blip r:embed="rId16">
+          <a:blip r:embed="rId16" cstate="print">
             <a:extLst>
               <a:ext uri="{28A0092B-C50C-407E-A947-70E740481C1C}">
-                <a14:useLocalDpi xmlns:a14="http://schemas.microsoft.com/office/drawing/2010/main" val="0"/>
+                <a14:useLocalDpi xmlns:a14="http://schemas.microsoft.com/office/drawing/2010/main" xmlns="" val="0"/>
               </a:ext>
             </a:extLst>
           </a:blip>
@@ -9959,18 +10805,18 @@
     </p:spTree>
     <p:extLst>
       <p:ext uri="{BB962C8B-B14F-4D97-AF65-F5344CB8AC3E}">
-        <p14:creationId xmlns:p14="http://schemas.microsoft.com/office/powerpoint/2010/main" val="1183496477"/>
+        <p14:creationId xmlns:p14="http://schemas.microsoft.com/office/powerpoint/2010/main" xmlns="" val="1183496477"/>
       </p:ext>
     </p:extLst>
   </p:cSld>
   <p:clrMapOvr>
     <a:masterClrMapping/>
   </p:clrMapOvr>
-  <mc:AlternateContent xmlns:mc="http://schemas.openxmlformats.org/markup-compatibility/2006" xmlns:p14="http://schemas.microsoft.com/office/powerpoint/2010/main">
-    <mc:Choice Requires="p14">
+  <mc:AlternateContent xmlns:mc="http://schemas.openxmlformats.org/markup-compatibility/2006">
+    <mc:Choice xmlns:p14="http://schemas.microsoft.com/office/powerpoint/2010/main" xmlns="" Requires="p14">
       <p:transition spd="slow" p14:dur="2000"/>
     </mc:Choice>
-    <mc:Fallback xmlns="">
+    <mc:Fallback>
       <p:transition spd="slow"/>
     </mc:Fallback>
   </mc:AlternateContent>
@@ -10003,10 +10849,10 @@
           <p:nvPr/>
         </p:nvPicPr>
         <p:blipFill rotWithShape="1">
-          <a:blip r:embed="rId3">
+          <a:blip r:embed="rId3" cstate="print">
             <a:extLst>
               <a:ext uri="{28A0092B-C50C-407E-A947-70E740481C1C}">
-                <a14:useLocalDpi xmlns:a14="http://schemas.microsoft.com/office/drawing/2010/main" val="0"/>
+                <a14:useLocalDpi xmlns:a14="http://schemas.microsoft.com/office/drawing/2010/main" xmlns="" val="0"/>
               </a:ext>
             </a:extLst>
           </a:blip>
@@ -10024,7 +10870,7 @@
           <a:noFill/>
           <a:extLst>
             <a:ext uri="{909E8E84-426E-40DD-AFC4-6F175D3DCCD1}">
-              <a14:hiddenFill xmlns:a14="http://schemas.microsoft.com/office/drawing/2010/main">
+              <a14:hiddenFill xmlns:a14="http://schemas.microsoft.com/office/drawing/2010/main" xmlns="">
                 <a:solidFill>
                   <a:srgbClr val="FFFFFF"/>
                 </a:solidFill>
@@ -10036,18 +10882,18 @@
     </p:spTree>
     <p:extLst>
       <p:ext uri="{BB962C8B-B14F-4D97-AF65-F5344CB8AC3E}">
-        <p14:creationId xmlns:p14="http://schemas.microsoft.com/office/powerpoint/2010/main" val="2221834488"/>
+        <p14:creationId xmlns:p14="http://schemas.microsoft.com/office/powerpoint/2010/main" xmlns="" val="2221834488"/>
       </p:ext>
     </p:extLst>
   </p:cSld>
   <p:clrMapOvr>
     <a:masterClrMapping/>
   </p:clrMapOvr>
-  <mc:AlternateContent xmlns:mc="http://schemas.openxmlformats.org/markup-compatibility/2006" xmlns:p14="http://schemas.microsoft.com/office/powerpoint/2010/main">
-    <mc:Choice Requires="p14">
+  <mc:AlternateContent xmlns:mc="http://schemas.openxmlformats.org/markup-compatibility/2006">
+    <mc:Choice xmlns:p14="http://schemas.microsoft.com/office/powerpoint/2010/main" xmlns="" Requires="p14">
       <p:transition spd="slow" p14:dur="2000"/>
     </mc:Choice>
-    <mc:Fallback xmlns="">
+    <mc:Fallback>
       <p:transition spd="slow"/>
     </mc:Fallback>
   </mc:AlternateContent>
@@ -10154,10 +11000,6 @@
               </a:rPr>
               <a:t>return(food + “ with cheese”);</a:t>
             </a:r>
-            <a:endParaRPr lang="en-GB" dirty="0" smtClean="0">
-              <a:latin typeface="Consolas" pitchFamily="49" charset="0"/>
-              <a:cs typeface="Consolas" pitchFamily="49" charset="0"/>
-            </a:endParaRPr>
           </a:p>
           <a:p>
             <a:pPr marL="0" indent="0">
@@ -10372,18 +11214,18 @@
     </p:spTree>
     <p:extLst>
       <p:ext uri="{BB962C8B-B14F-4D97-AF65-F5344CB8AC3E}">
-        <p14:creationId xmlns:p14="http://schemas.microsoft.com/office/powerpoint/2010/main" val="1423979825"/>
+        <p14:creationId xmlns:p14="http://schemas.microsoft.com/office/powerpoint/2010/main" xmlns="" val="1423979825"/>
       </p:ext>
     </p:extLst>
   </p:cSld>
   <p:clrMapOvr>
     <a:masterClrMapping/>
   </p:clrMapOvr>
-  <mc:AlternateContent xmlns:mc="http://schemas.openxmlformats.org/markup-compatibility/2006" xmlns:p14="http://schemas.microsoft.com/office/powerpoint/2010/main">
-    <mc:Choice Requires="p14">
+  <mc:AlternateContent xmlns:mc="http://schemas.openxmlformats.org/markup-compatibility/2006">
+    <mc:Choice xmlns:p14="http://schemas.microsoft.com/office/powerpoint/2010/main" xmlns="" Requires="p14">
       <p:transition spd="slow" p14:dur="2000"/>
     </mc:Choice>
-    <mc:Fallback xmlns="">
+    <mc:Fallback>
       <p:transition spd="slow"/>
     </mc:Fallback>
   </mc:AlternateContent>
@@ -10466,11 +11308,11 @@
   <p:clrMapOvr>
     <a:masterClrMapping/>
   </p:clrMapOvr>
-  <mc:AlternateContent xmlns:mc="http://schemas.openxmlformats.org/markup-compatibility/2006" xmlns:p14="http://schemas.microsoft.com/office/powerpoint/2010/main">
-    <mc:Choice Requires="p14">
+  <mc:AlternateContent xmlns:mc="http://schemas.openxmlformats.org/markup-compatibility/2006">
+    <mc:Choice xmlns:p14="http://schemas.microsoft.com/office/powerpoint/2010/main" xmlns="" Requires="p14">
       <p:transition spd="slow" p14:dur="2000"/>
     </mc:Choice>
-    <mc:Fallback xmlns="">
+    <mc:Fallback>
       <p:transition spd="slow"/>
     </mc:Fallback>
   </mc:AlternateContent>
@@ -10736,18 +11578,18 @@
     </p:spTree>
     <p:extLst>
       <p:ext uri="{BB962C8B-B14F-4D97-AF65-F5344CB8AC3E}">
-        <p14:creationId xmlns:p14="http://schemas.microsoft.com/office/powerpoint/2010/main" val="636125739"/>
+        <p14:creationId xmlns:p14="http://schemas.microsoft.com/office/powerpoint/2010/main" xmlns="" val="636125739"/>
       </p:ext>
     </p:extLst>
   </p:cSld>
   <p:clrMapOvr>
     <a:masterClrMapping/>
   </p:clrMapOvr>
-  <mc:AlternateContent xmlns:mc="http://schemas.openxmlformats.org/markup-compatibility/2006" xmlns:p14="http://schemas.microsoft.com/office/powerpoint/2010/main">
-    <mc:Choice Requires="p14">
+  <mc:AlternateContent xmlns:mc="http://schemas.openxmlformats.org/markup-compatibility/2006">
+    <mc:Choice xmlns:p14="http://schemas.microsoft.com/office/powerpoint/2010/main" xmlns="" Requires="p14">
       <p:transition spd="slow" p14:dur="2000"/>
     </mc:Choice>
-    <mc:Fallback xmlns="">
+    <mc:Fallback>
       <p:transition spd="slow"/>
     </mc:Fallback>
   </mc:AlternateContent>
@@ -10816,18 +11658,18 @@
     </p:spTree>
     <p:extLst>
       <p:ext uri="{BB962C8B-B14F-4D97-AF65-F5344CB8AC3E}">
-        <p14:creationId xmlns:p14="http://schemas.microsoft.com/office/powerpoint/2010/main" val="565444107"/>
+        <p14:creationId xmlns:p14="http://schemas.microsoft.com/office/powerpoint/2010/main" xmlns="" val="565444107"/>
       </p:ext>
     </p:extLst>
   </p:cSld>
   <p:clrMapOvr>
     <a:masterClrMapping/>
   </p:clrMapOvr>
-  <mc:AlternateContent xmlns:mc="http://schemas.openxmlformats.org/markup-compatibility/2006" xmlns:p14="http://schemas.microsoft.com/office/powerpoint/2010/main">
-    <mc:Choice Requires="p14">
+  <mc:AlternateContent xmlns:mc="http://schemas.openxmlformats.org/markup-compatibility/2006">
+    <mc:Choice xmlns:p14="http://schemas.microsoft.com/office/powerpoint/2010/main" xmlns="" Requires="p14">
       <p:transition spd="slow" p14:dur="2000"/>
     </mc:Choice>
-    <mc:Fallback xmlns="">
+    <mc:Fallback>
       <p:transition spd="slow"/>
     </mc:Fallback>
   </mc:AlternateContent>
@@ -10868,7 +11710,7 @@
           <a:p>
             <a:r>
               <a:rPr lang="en-GB" dirty="0" smtClean="0"/>
-              <a:t>Loose Typing</a:t>
+              <a:t>Quote Marks</a:t>
             </a:r>
             <a:endParaRPr lang="en-GB" dirty="0"/>
           </a:p>
@@ -10886,28 +11728,130 @@
         </p:nvSpPr>
         <p:spPr/>
         <p:txBody>
-          <a:bodyPr/>
+          <a:bodyPr>
+            <a:normAutofit fontScale="92500"/>
+          </a:bodyPr>
           <a:lstStyle/>
           <a:p>
-            <a:endParaRPr lang="en-GB"/>
+            <a:pPr>
+              <a:buNone/>
+            </a:pPr>
+            <a:r>
+              <a:rPr lang="en-GB" dirty="0" smtClean="0"/>
+              <a:t>Either one is fine.</a:t>
+            </a:r>
+          </a:p>
+          <a:p>
+            <a:pPr>
+              <a:buNone/>
+            </a:pPr>
+            <a:endParaRPr lang="en-GB" dirty="0" smtClean="0"/>
+          </a:p>
+          <a:p>
+            <a:pPr>
+              <a:buNone/>
+            </a:pPr>
+            <a:r>
+              <a:rPr lang="en-GB" dirty="0" smtClean="0"/>
+              <a:t>Same as in HTML.</a:t>
+            </a:r>
+          </a:p>
+          <a:p>
+            <a:pPr>
+              <a:buNone/>
+            </a:pPr>
+            <a:endParaRPr lang="en-GB" dirty="0" smtClean="0"/>
+          </a:p>
+          <a:p>
+            <a:pPr>
+              <a:buNone/>
+            </a:pPr>
+            <a:r>
+              <a:rPr lang="en-GB" dirty="0" err="1" smtClean="0"/>
+              <a:t>var</a:t>
+            </a:r>
+            <a:r>
+              <a:rPr lang="en-GB" dirty="0" smtClean="0"/>
+              <a:t> html = </a:t>
+            </a:r>
+            <a:r>
+              <a:rPr lang="en-GB" dirty="0" smtClean="0">
+                <a:solidFill>
+                  <a:srgbClr val="FF0000"/>
+                </a:solidFill>
+              </a:rPr>
+              <a:t>'&lt;a </a:t>
+            </a:r>
+            <a:r>
+              <a:rPr lang="en-GB" dirty="0" err="1" smtClean="0">
+                <a:solidFill>
+                  <a:srgbClr val="FF0000"/>
+                </a:solidFill>
+              </a:rPr>
+              <a:t>href</a:t>
+            </a:r>
+            <a:r>
+              <a:rPr lang="en-GB" dirty="0" smtClean="0">
+                <a:solidFill>
+                  <a:srgbClr val="FF0000"/>
+                </a:solidFill>
+              </a:rPr>
+              <a:t>=</a:t>
+            </a:r>
+            <a:r>
+              <a:rPr lang="en-GB" b="1" dirty="0" smtClean="0">
+                <a:solidFill>
+                  <a:srgbClr val="FF0000"/>
+                </a:solidFill>
+              </a:rPr>
+              <a:t>"http://www.google.com/"&gt;</a:t>
+            </a:r>
+            <a:r>
+              <a:rPr lang="en-GB" dirty="0" smtClean="0">
+                <a:solidFill>
+                  <a:srgbClr val="FF0000"/>
+                </a:solidFill>
+              </a:rPr>
+              <a:t>Google&lt;/a&gt;'</a:t>
+            </a:r>
+            <a:r>
+              <a:rPr lang="en-GB" dirty="0" smtClean="0"/>
+              <a:t>;</a:t>
+            </a:r>
+          </a:p>
+          <a:p>
+            <a:pPr>
+              <a:buNone/>
+            </a:pPr>
+            <a:endParaRPr lang="en-GB" dirty="0" smtClean="0"/>
+          </a:p>
+          <a:p>
+            <a:pPr>
+              <a:buNone/>
+            </a:pPr>
+            <a:r>
+              <a:rPr lang="en-GB" dirty="0" smtClean="0"/>
+              <a:t>VERY useful.</a:t>
+            </a:r>
+            <a:endParaRPr lang="en-GB" dirty="0"/>
           </a:p>
         </p:txBody>
       </p:sp>
     </p:spTree>
     <p:extLst>
       <p:ext uri="{BB962C8B-B14F-4D97-AF65-F5344CB8AC3E}">
-        <p14:creationId xmlns:p14="http://schemas.microsoft.com/office/powerpoint/2010/main" val="1345058122"/>
+        <p14:creationId xmlns:p14="http://schemas.microsoft.com/office/powerpoint/2010/main" xmlns="" val="1345058122"/>
       </p:ext>
     </p:extLst>
   </p:cSld>
   <p:clrMapOvr>
     <a:masterClrMapping/>
   </p:clrMapOvr>
-  <mc:AlternateContent xmlns:mc="http://schemas.openxmlformats.org/markup-compatibility/2006" xmlns:p14="http://schemas.microsoft.com/office/powerpoint/2010/main">
-    <mc:Choice Requires="p14">
+  <mc:AlternateContent xmlns:mc="http://schemas.openxmlformats.org/markup-compatibility/2006">
+    <mc:Choice xmlns:p14="http://schemas.microsoft.com/office/powerpoint/2010/main" xmlns="" Requires="p14">
       <p:transition spd="slow" p14:dur="2000"/>
     </mc:Choice>
-    <mc:Fallback xmlns="">
+    <mc:Fallback>
       <p:transition spd="slow"/>
     </mc:Fallback>
   </mc:AlternateContent>
@@ -10973,25 +11917,80 @@
           <a:bodyPr/>
           <a:lstStyle/>
           <a:p>
-            <a:endParaRPr lang="en-GB"/>
+            <a:pPr>
+              <a:buNone/>
+            </a:pPr>
+            <a:r>
+              <a:rPr lang="en-GB" dirty="0" err="1" smtClean="0"/>
+              <a:t>var</a:t>
+            </a:r>
+            <a:r>
+              <a:rPr lang="en-GB" dirty="0" smtClean="0"/>
+              <a:t> bucket = {};</a:t>
+            </a:r>
+          </a:p>
+          <a:p>
+            <a:pPr>
+              <a:buNone/>
+            </a:pPr>
+            <a:r>
+              <a:rPr lang="en-GB" dirty="0" smtClean="0"/>
+              <a:t>bucket[0] = "A thing";</a:t>
+            </a:r>
+          </a:p>
+          <a:p>
+            <a:pPr>
+              <a:buNone/>
+            </a:pPr>
+            <a:r>
+              <a:rPr lang="en-GB" dirty="0" err="1" smtClean="0"/>
+              <a:t>bucket.snack</a:t>
+            </a:r>
+            <a:r>
+              <a:rPr lang="en-GB" dirty="0" smtClean="0"/>
+              <a:t> = "steak sandwich!";</a:t>
+            </a:r>
+          </a:p>
+          <a:p>
+            <a:pPr>
+              <a:buNone/>
+            </a:pPr>
+            <a:r>
+              <a:rPr lang="en-GB" dirty="0" smtClean="0"/>
+              <a:t>bucket['booze']</a:t>
+            </a:r>
+            <a:r>
+              <a:rPr lang="en-GB" dirty="0"/>
+              <a:t> </a:t>
+            </a:r>
+            <a:r>
+              <a:rPr lang="en-GB" dirty="0" smtClean="0"/>
+              <a:t>= "gin and tonic";</a:t>
+            </a:r>
+          </a:p>
+          <a:p>
+            <a:pPr>
+              <a:buNone/>
+            </a:pPr>
+            <a:endParaRPr lang="en-GB" dirty="0" smtClean="0"/>
           </a:p>
         </p:txBody>
       </p:sp>
     </p:spTree>
     <p:extLst>
       <p:ext uri="{BB962C8B-B14F-4D97-AF65-F5344CB8AC3E}">
-        <p14:creationId xmlns:p14="http://schemas.microsoft.com/office/powerpoint/2010/main" val="3852315355"/>
+        <p14:creationId xmlns:p14="http://schemas.microsoft.com/office/powerpoint/2010/main" xmlns="" val="3852315355"/>
       </p:ext>
     </p:extLst>
   </p:cSld>
   <p:clrMapOvr>
     <a:masterClrMapping/>
   </p:clrMapOvr>
-  <mc:AlternateContent xmlns:mc="http://schemas.openxmlformats.org/markup-compatibility/2006" xmlns:p14="http://schemas.microsoft.com/office/powerpoint/2010/main">
-    <mc:Choice Requires="p14">
+  <mc:AlternateContent xmlns:mc="http://schemas.openxmlformats.org/markup-compatibility/2006">
+    <mc:Choice xmlns:p14="http://schemas.microsoft.com/office/powerpoint/2010/main" xmlns="" Requires="p14">
       <p:transition spd="slow" p14:dur="2000"/>
     </mc:Choice>
-    <mc:Fallback xmlns="">
+    <mc:Fallback>
       <p:transition spd="slow"/>
     </mc:Fallback>
   </mc:AlternateContent>
@@ -11060,18 +12059,18 @@
     </p:spTree>
     <p:extLst>
       <p:ext uri="{BB962C8B-B14F-4D97-AF65-F5344CB8AC3E}">
-        <p14:creationId xmlns:p14="http://schemas.microsoft.com/office/powerpoint/2010/main" val="2823881731"/>
+        <p14:creationId xmlns:p14="http://schemas.microsoft.com/office/powerpoint/2010/main" xmlns="" val="2823881731"/>
       </p:ext>
     </p:extLst>
   </p:cSld>
   <p:clrMapOvr>
     <a:masterClrMapping/>
   </p:clrMapOvr>
-  <mc:AlternateContent xmlns:mc="http://schemas.openxmlformats.org/markup-compatibility/2006" xmlns:p14="http://schemas.microsoft.com/office/powerpoint/2010/main">
-    <mc:Choice Requires="p14">
+  <mc:AlternateContent xmlns:mc="http://schemas.openxmlformats.org/markup-compatibility/2006">
+    <mc:Choice xmlns:p14="http://schemas.microsoft.com/office/powerpoint/2010/main" xmlns="" Requires="p14">
       <p:transition spd="slow" p14:dur="2000"/>
     </mc:Choice>
-    <mc:Fallback xmlns="">
+    <mc:Fallback>
       <p:transition spd="slow"/>
     </mc:Fallback>
   </mc:AlternateContent>
@@ -11140,18 +12139,18 @@
     </p:spTree>
     <p:extLst>
       <p:ext uri="{BB962C8B-B14F-4D97-AF65-F5344CB8AC3E}">
-        <p14:creationId xmlns:p14="http://schemas.microsoft.com/office/powerpoint/2010/main" val="2746586850"/>
+        <p14:creationId xmlns:p14="http://schemas.microsoft.com/office/powerpoint/2010/main" xmlns="" val="2746586850"/>
       </p:ext>
     </p:extLst>
   </p:cSld>
   <p:clrMapOvr>
     <a:masterClrMapping/>
   </p:clrMapOvr>
-  <mc:AlternateContent xmlns:mc="http://schemas.openxmlformats.org/markup-compatibility/2006" xmlns:p14="http://schemas.microsoft.com/office/powerpoint/2010/main">
-    <mc:Choice Requires="p14">
+  <mc:AlternateContent xmlns:mc="http://schemas.openxmlformats.org/markup-compatibility/2006">
+    <mc:Choice xmlns:p14="http://schemas.microsoft.com/office/powerpoint/2010/main" xmlns="" Requires="p14">
       <p:transition spd="slow" p14:dur="2000"/>
     </mc:Choice>
-    <mc:Fallback xmlns="">
+    <mc:Fallback>
       <p:transition spd="slow"/>
     </mc:Fallback>
   </mc:AlternateContent>
@@ -11224,18 +12223,18 @@
     </p:spTree>
     <p:extLst>
       <p:ext uri="{BB962C8B-B14F-4D97-AF65-F5344CB8AC3E}">
-        <p14:creationId xmlns:p14="http://schemas.microsoft.com/office/powerpoint/2010/main" val="218911309"/>
+        <p14:creationId xmlns:p14="http://schemas.microsoft.com/office/powerpoint/2010/main" xmlns="" val="218911309"/>
       </p:ext>
     </p:extLst>
   </p:cSld>
   <p:clrMapOvr>
     <a:masterClrMapping/>
   </p:clrMapOvr>
-  <mc:AlternateContent xmlns:mc="http://schemas.openxmlformats.org/markup-compatibility/2006" xmlns:p14="http://schemas.microsoft.com/office/powerpoint/2010/main">
-    <mc:Choice Requires="p14">
+  <mc:AlternateContent xmlns:mc="http://schemas.openxmlformats.org/markup-compatibility/2006">
+    <mc:Choice xmlns:p14="http://schemas.microsoft.com/office/powerpoint/2010/main" xmlns="" Requires="p14">
       <p:transition spd="slow" p14:dur="2000"/>
     </mc:Choice>
-    <mc:Fallback xmlns="">
+    <mc:Fallback>
       <p:transition spd="slow"/>
     </mc:Fallback>
   </mc:AlternateContent>
@@ -11308,18 +12307,18 @@
     </p:spTree>
     <p:extLst>
       <p:ext uri="{BB962C8B-B14F-4D97-AF65-F5344CB8AC3E}">
-        <p14:creationId xmlns:p14="http://schemas.microsoft.com/office/powerpoint/2010/main" val="1792698592"/>
+        <p14:creationId xmlns:p14="http://schemas.microsoft.com/office/powerpoint/2010/main" xmlns="" val="1792698592"/>
       </p:ext>
     </p:extLst>
   </p:cSld>
   <p:clrMapOvr>
     <a:masterClrMapping/>
   </p:clrMapOvr>
-  <mc:AlternateContent xmlns:mc="http://schemas.openxmlformats.org/markup-compatibility/2006" xmlns:p14="http://schemas.microsoft.com/office/powerpoint/2010/main">
-    <mc:Choice Requires="p14">
+  <mc:AlternateContent xmlns:mc="http://schemas.openxmlformats.org/markup-compatibility/2006">
+    <mc:Choice xmlns:p14="http://schemas.microsoft.com/office/powerpoint/2010/main" xmlns="" Requires="p14">
       <p:transition spd="slow" p14:dur="2000"/>
     </mc:Choice>
-    <mc:Fallback xmlns="">
+    <mc:Fallback>
       <p:transition spd="slow"/>
     </mc:Fallback>
   </mc:AlternateContent>
@@ -11378,28 +12377,225 @@
         </p:nvSpPr>
         <p:spPr/>
         <p:txBody>
-          <a:bodyPr/>
+          <a:bodyPr>
+            <a:normAutofit fontScale="85000" lnSpcReduction="20000"/>
+          </a:bodyPr>
           <a:lstStyle/>
           <a:p>
-            <a:endParaRPr lang="en-GB" dirty="0"/>
+            <a:pPr>
+              <a:buNone/>
+            </a:pPr>
+            <a:r>
+              <a:rPr lang="en-GB" dirty="0" err="1" smtClean="0"/>
+              <a:t>var</a:t>
+            </a:r>
+            <a:r>
+              <a:rPr lang="en-GB" dirty="0" smtClean="0"/>
+              <a:t> alerts = [];</a:t>
+            </a:r>
+            <a:br>
+              <a:rPr lang="en-GB" dirty="0" smtClean="0"/>
+            </a:br>
+            <a:r>
+              <a:rPr lang="en-GB" dirty="0" smtClean="0"/>
+              <a:t>for(</a:t>
+            </a:r>
+            <a:r>
+              <a:rPr lang="en-GB" dirty="0" err="1" smtClean="0"/>
+              <a:t>var</a:t>
+            </a:r>
+            <a:r>
+              <a:rPr lang="en-GB" dirty="0" smtClean="0"/>
+              <a:t> </a:t>
+            </a:r>
+            <a:r>
+              <a:rPr lang="en-GB" dirty="0" err="1" smtClean="0"/>
+              <a:t>i</a:t>
+            </a:r>
+            <a:r>
+              <a:rPr lang="en-GB" dirty="0" smtClean="0"/>
+              <a:t> = 0; </a:t>
+            </a:r>
+            <a:r>
+              <a:rPr lang="en-GB" dirty="0" err="1" smtClean="0"/>
+              <a:t>i</a:t>
+            </a:r>
+            <a:r>
+              <a:rPr lang="en-GB" dirty="0" smtClean="0"/>
+              <a:t> &lt; 3; </a:t>
+            </a:r>
+            <a:r>
+              <a:rPr lang="en-GB" dirty="0" err="1" smtClean="0"/>
+              <a:t>i</a:t>
+            </a:r>
+            <a:r>
+              <a:rPr lang="en-GB" dirty="0" smtClean="0"/>
+              <a:t>++) {</a:t>
+            </a:r>
+            <a:br>
+              <a:rPr lang="en-GB" dirty="0" smtClean="0"/>
+            </a:br>
+            <a:r>
+              <a:rPr lang="en-GB" dirty="0" smtClean="0"/>
+              <a:t>    </a:t>
+            </a:r>
+            <a:r>
+              <a:rPr lang="en-GB" dirty="0" err="1" smtClean="0"/>
+              <a:t>alerts.push</a:t>
+            </a:r>
+            <a:r>
+              <a:rPr lang="en-GB" dirty="0" smtClean="0"/>
+              <a:t>(function() { </a:t>
+            </a:r>
+            <a:r>
+              <a:rPr lang="en-GB" dirty="0" err="1" smtClean="0"/>
+              <a:t>document.write</a:t>
+            </a:r>
+            <a:r>
+              <a:rPr lang="en-GB" dirty="0" smtClean="0"/>
+              <a:t>(</a:t>
+            </a:r>
+            <a:r>
+              <a:rPr lang="en-GB" dirty="0" err="1" smtClean="0"/>
+              <a:t>i</a:t>
+            </a:r>
+            <a:r>
+              <a:rPr lang="en-GB" dirty="0" smtClean="0"/>
+              <a:t> + ', '); });</a:t>
+            </a:r>
+            <a:br>
+              <a:rPr lang="en-GB" dirty="0" smtClean="0"/>
+            </a:br>
+            <a:r>
+              <a:rPr lang="en-GB" dirty="0" smtClean="0"/>
+              <a:t>}</a:t>
+            </a:r>
+            <a:br>
+              <a:rPr lang="en-GB" dirty="0" smtClean="0"/>
+            </a:br>
+            <a:r>
+              <a:rPr lang="en-GB" dirty="0" smtClean="0"/>
+              <a:t/>
+            </a:r>
+            <a:br>
+              <a:rPr lang="en-GB" dirty="0" smtClean="0"/>
+            </a:br>
+            <a:r>
+              <a:rPr lang="en-GB" dirty="0" smtClean="0"/>
+              <a:t>for (</a:t>
+            </a:r>
+            <a:r>
+              <a:rPr lang="en-GB" dirty="0" err="1" smtClean="0"/>
+              <a:t>var</a:t>
+            </a:r>
+            <a:r>
+              <a:rPr lang="en-GB" dirty="0" smtClean="0"/>
+              <a:t> j = 0; j &lt; 3; j++) {</a:t>
+            </a:r>
+            <a:br>
+              <a:rPr lang="en-GB" dirty="0" smtClean="0"/>
+            </a:br>
+            <a:r>
+              <a:rPr lang="en-GB" dirty="0" smtClean="0"/>
+              <a:t>    (alerts[j])();</a:t>
+            </a:r>
+            <a:br>
+              <a:rPr lang="en-GB" dirty="0" smtClean="0"/>
+            </a:br>
+            <a:r>
+              <a:rPr lang="en-GB" dirty="0" smtClean="0"/>
+              <a:t>}</a:t>
+            </a:r>
+            <a:br>
+              <a:rPr lang="en-GB" dirty="0" smtClean="0"/>
+            </a:br>
+            <a:r>
+              <a:rPr lang="en-GB" dirty="0" smtClean="0"/>
+              <a:t/>
+            </a:r>
+            <a:br>
+              <a:rPr lang="en-GB" dirty="0" smtClean="0"/>
+            </a:br>
+            <a:r>
+              <a:rPr lang="en-GB" dirty="0" smtClean="0"/>
+              <a:t>for (</a:t>
+            </a:r>
+            <a:r>
+              <a:rPr lang="en-GB" dirty="0" err="1" smtClean="0"/>
+              <a:t>var</a:t>
+            </a:r>
+            <a:r>
+              <a:rPr lang="en-GB" dirty="0" smtClean="0"/>
+              <a:t> </a:t>
+            </a:r>
+            <a:r>
+              <a:rPr lang="en-GB" dirty="0" err="1" smtClean="0"/>
+              <a:t>i</a:t>
+            </a:r>
+            <a:r>
+              <a:rPr lang="en-GB" dirty="0" smtClean="0"/>
+              <a:t> = 0; </a:t>
+            </a:r>
+            <a:r>
+              <a:rPr lang="en-GB" dirty="0" err="1" smtClean="0"/>
+              <a:t>i</a:t>
+            </a:r>
+            <a:r>
+              <a:rPr lang="en-GB" dirty="0" smtClean="0"/>
+              <a:t> &lt; 3; </a:t>
+            </a:r>
+            <a:r>
+              <a:rPr lang="en-GB" dirty="0" err="1" smtClean="0"/>
+              <a:t>i</a:t>
+            </a:r>
+            <a:r>
+              <a:rPr lang="en-GB" dirty="0" smtClean="0"/>
+              <a:t>++) {</a:t>
+            </a:r>
+            <a:br>
+              <a:rPr lang="en-GB" dirty="0" smtClean="0"/>
+            </a:br>
+            <a:r>
+              <a:rPr lang="en-GB" dirty="0" smtClean="0"/>
+              <a:t>    (alerts[</a:t>
+            </a:r>
+            <a:r>
+              <a:rPr lang="en-GB" dirty="0" err="1" smtClean="0"/>
+              <a:t>i</a:t>
+            </a:r>
+            <a:r>
+              <a:rPr lang="en-GB" dirty="0" smtClean="0"/>
+              <a:t>])();</a:t>
+            </a:r>
+            <a:br>
+              <a:rPr lang="en-GB" dirty="0" smtClean="0"/>
+            </a:br>
+            <a:r>
+              <a:rPr lang="en-GB" dirty="0" smtClean="0"/>
+              <a:t>}</a:t>
+            </a:r>
+            <a:endParaRPr lang="en-GB" dirty="0">
+              <a:latin typeface="Consolas" pitchFamily="49" charset="0"/>
+              <a:cs typeface="Consolas" pitchFamily="49" charset="0"/>
+            </a:endParaRPr>
           </a:p>
         </p:txBody>
       </p:sp>
     </p:spTree>
     <p:extLst>
       <p:ext uri="{BB962C8B-B14F-4D97-AF65-F5344CB8AC3E}">
-        <p14:creationId xmlns:p14="http://schemas.microsoft.com/office/powerpoint/2010/main" val="2170781727"/>
+        <p14:creationId xmlns:p14="http://schemas.microsoft.com/office/powerpoint/2010/main" xmlns="" val="2170781727"/>
       </p:ext>
     </p:extLst>
   </p:cSld>
   <p:clrMapOvr>
     <a:masterClrMapping/>
   </p:clrMapOvr>
-  <mc:AlternateContent xmlns:mc="http://schemas.openxmlformats.org/markup-compatibility/2006" xmlns:p14="http://schemas.microsoft.com/office/powerpoint/2010/main">
-    <mc:Choice Requires="p14">
+  <mc:AlternateContent xmlns:mc="http://schemas.openxmlformats.org/markup-compatibility/2006">
+    <mc:Choice xmlns:p14="http://schemas.microsoft.com/office/powerpoint/2010/main" xmlns="" Requires="p14">
       <p:transition spd="slow" p14:dur="2000"/>
     </mc:Choice>
-    <mc:Fallback xmlns="">
+    <mc:Fallback>
       <p:transition spd="slow"/>
     </mc:Fallback>
   </mc:AlternateContent>
@@ -11440,7 +12636,7 @@
           <a:p>
             <a:r>
               <a:rPr lang="en-GB" dirty="0" smtClean="0"/>
-              <a:t>truth</a:t>
+              <a:t>Scope and Hoisting</a:t>
             </a:r>
             <a:endParaRPr lang="en-GB" dirty="0"/>
           </a:p>
@@ -11458,28 +12654,251 @@
         </p:nvSpPr>
         <p:spPr/>
         <p:txBody>
-          <a:bodyPr/>
+          <a:bodyPr>
+            <a:normAutofit fontScale="85000" lnSpcReduction="20000"/>
+          </a:bodyPr>
           <a:lstStyle/>
           <a:p>
-            <a:endParaRPr lang="en-GB"/>
+            <a:pPr>
+              <a:buNone/>
+            </a:pPr>
+            <a:r>
+              <a:rPr lang="en-GB" dirty="0" err="1" smtClean="0"/>
+              <a:t>var</a:t>
+            </a:r>
+            <a:r>
+              <a:rPr lang="en-GB" dirty="0" smtClean="0"/>
+              <a:t> alerts = </a:t>
+            </a:r>
+            <a:r>
+              <a:rPr lang="en-GB" dirty="0" smtClean="0"/>
+              <a:t>[];</a:t>
+            </a:r>
+            <a:endParaRPr lang="en-GB" dirty="0" smtClean="0"/>
+          </a:p>
+          <a:p>
+            <a:pPr>
+              <a:buNone/>
+            </a:pPr>
+            <a:r>
+              <a:rPr lang="en-GB" dirty="0" err="1" smtClean="0"/>
+              <a:t>var</a:t>
+            </a:r>
+            <a:r>
+              <a:rPr lang="en-GB" dirty="0" smtClean="0"/>
+              <a:t> </a:t>
+            </a:r>
+            <a:r>
+              <a:rPr lang="en-GB" dirty="0" err="1" smtClean="0"/>
+              <a:t>i</a:t>
+            </a:r>
+            <a:r>
+              <a:rPr lang="en-GB" dirty="0" smtClean="0"/>
+              <a:t>, j;</a:t>
+            </a:r>
+          </a:p>
+          <a:p>
+            <a:pPr>
+              <a:buNone/>
+            </a:pPr>
+            <a:r>
+              <a:rPr lang="en-GB" dirty="0" smtClean="0"/>
+              <a:t>for(</a:t>
+            </a:r>
+            <a:r>
+              <a:rPr lang="en-GB" dirty="0" err="1" smtClean="0"/>
+              <a:t>i</a:t>
+            </a:r>
+            <a:r>
+              <a:rPr lang="en-GB" dirty="0" smtClean="0"/>
+              <a:t> </a:t>
+            </a:r>
+            <a:r>
+              <a:rPr lang="en-GB" dirty="0" smtClean="0"/>
+              <a:t>= 0; </a:t>
+            </a:r>
+            <a:r>
+              <a:rPr lang="en-GB" dirty="0" err="1" smtClean="0"/>
+              <a:t>i</a:t>
+            </a:r>
+            <a:r>
+              <a:rPr lang="en-GB" dirty="0" smtClean="0"/>
+              <a:t> &lt; 3; </a:t>
+            </a:r>
+            <a:r>
+              <a:rPr lang="en-GB" dirty="0" err="1" smtClean="0"/>
+              <a:t>i</a:t>
+            </a:r>
+            <a:r>
+              <a:rPr lang="en-GB" dirty="0" smtClean="0"/>
+              <a:t>++) {</a:t>
+            </a:r>
+            <a:br>
+              <a:rPr lang="en-GB" dirty="0" smtClean="0"/>
+            </a:br>
+            <a:r>
+              <a:rPr lang="en-GB" dirty="0" err="1" smtClean="0"/>
+              <a:t>alerts.push</a:t>
+            </a:r>
+            <a:r>
+              <a:rPr lang="en-GB" dirty="0" smtClean="0"/>
+              <a:t>(function</a:t>
+            </a:r>
+            <a:r>
+              <a:rPr lang="en-GB" dirty="0" smtClean="0"/>
+              <a:t>() { </a:t>
+            </a:r>
+            <a:r>
+              <a:rPr lang="en-GB" dirty="0" err="1" smtClean="0"/>
+              <a:t>document.write</a:t>
+            </a:r>
+            <a:r>
+              <a:rPr lang="en-GB" dirty="0" smtClean="0"/>
+              <a:t>(</a:t>
+            </a:r>
+            <a:r>
+              <a:rPr lang="en-GB" dirty="0" err="1" smtClean="0"/>
+              <a:t>i</a:t>
+            </a:r>
+            <a:r>
+              <a:rPr lang="en-GB" dirty="0" smtClean="0"/>
+              <a:t> + ', '); </a:t>
+            </a:r>
+            <a:r>
+              <a:rPr lang="en-GB" dirty="0" smtClean="0"/>
+              <a:t>});</a:t>
+            </a:r>
+          </a:p>
+          <a:p>
+            <a:pPr>
+              <a:buNone/>
+            </a:pPr>
+            <a:r>
+              <a:rPr lang="en-GB" dirty="0" smtClean="0"/>
+              <a:t>}</a:t>
+            </a:r>
+          </a:p>
+          <a:p>
+            <a:pPr>
+              <a:buNone/>
+            </a:pPr>
+            <a:r>
+              <a:rPr lang="en-GB" dirty="0" smtClean="0"/>
+              <a:t>for (j </a:t>
+            </a:r>
+            <a:r>
+              <a:rPr lang="en-GB" dirty="0" smtClean="0"/>
+              <a:t>= 0; j &lt; 3; j++) {</a:t>
+            </a:r>
+            <a:br>
+              <a:rPr lang="en-GB" dirty="0" smtClean="0"/>
+            </a:br>
+            <a:r>
+              <a:rPr lang="en-GB" dirty="0" smtClean="0"/>
+              <a:t>alerts[j]();</a:t>
+            </a:r>
+          </a:p>
+          <a:p>
+            <a:pPr>
+              <a:buNone/>
+            </a:pPr>
+            <a:r>
+              <a:rPr lang="en-GB" dirty="0" smtClean="0"/>
+              <a:t>}</a:t>
+            </a:r>
+          </a:p>
+          <a:p>
+            <a:pPr>
+              <a:buNone/>
+            </a:pPr>
+            <a:r>
+              <a:rPr lang="en-GB" dirty="0" smtClean="0"/>
+              <a:t>for (</a:t>
+            </a:r>
+            <a:r>
+              <a:rPr lang="en-GB" dirty="0" err="1" smtClean="0"/>
+              <a:t>i</a:t>
+            </a:r>
+            <a:r>
+              <a:rPr lang="en-GB" dirty="0" smtClean="0"/>
+              <a:t> </a:t>
+            </a:r>
+            <a:r>
+              <a:rPr lang="en-GB" dirty="0" smtClean="0"/>
+              <a:t>= 0; </a:t>
+            </a:r>
+            <a:r>
+              <a:rPr lang="en-GB" dirty="0" err="1" smtClean="0"/>
+              <a:t>i</a:t>
+            </a:r>
+            <a:r>
+              <a:rPr lang="en-GB" dirty="0" smtClean="0"/>
+              <a:t> &lt; 3; </a:t>
+            </a:r>
+            <a:r>
+              <a:rPr lang="en-GB" dirty="0" err="1" smtClean="0"/>
+              <a:t>i</a:t>
+            </a:r>
+            <a:r>
+              <a:rPr lang="en-GB" dirty="0" smtClean="0"/>
+              <a:t>++) </a:t>
+            </a:r>
+            <a:r>
+              <a:rPr lang="en-GB" dirty="0" smtClean="0"/>
+              <a:t>{</a:t>
+            </a:r>
+          </a:p>
+          <a:p>
+            <a:pPr>
+              <a:buNone/>
+            </a:pPr>
+            <a:r>
+              <a:rPr lang="en-GB" dirty="0" smtClean="0"/>
+              <a:t>	</a:t>
+            </a:r>
+            <a:r>
+              <a:rPr lang="en-GB" dirty="0" smtClean="0"/>
+              <a:t>alerts[</a:t>
+            </a:r>
+            <a:r>
+              <a:rPr lang="en-GB" dirty="0" err="1" smtClean="0"/>
+              <a:t>i</a:t>
+            </a:r>
+            <a:r>
+              <a:rPr lang="en-GB" dirty="0" smtClean="0"/>
+              <a:t>]();</a:t>
+            </a:r>
+          </a:p>
+          <a:p>
+            <a:pPr>
+              <a:buNone/>
+            </a:pPr>
+            <a:r>
+              <a:rPr lang="en-GB" dirty="0" smtClean="0"/>
+              <a:t>}</a:t>
+            </a:r>
+            <a:endParaRPr lang="en-GB" dirty="0">
+              <a:latin typeface="Consolas" pitchFamily="49" charset="0"/>
+              <a:cs typeface="Consolas" pitchFamily="49" charset="0"/>
+            </a:endParaRPr>
           </a:p>
         </p:txBody>
       </p:sp>
     </p:spTree>
     <p:extLst>
       <p:ext uri="{BB962C8B-B14F-4D97-AF65-F5344CB8AC3E}">
-        <p14:creationId xmlns:p14="http://schemas.microsoft.com/office/powerpoint/2010/main" val="3191141142"/>
+        <p14:creationId xmlns:p14="http://schemas.microsoft.com/office/powerpoint/2010/main" xmlns="" val="2170781727"/>
       </p:ext>
     </p:extLst>
   </p:cSld>
   <p:clrMapOvr>
     <a:masterClrMapping/>
   </p:clrMapOvr>
-  <mc:AlternateContent xmlns:mc="http://schemas.openxmlformats.org/markup-compatibility/2006" xmlns:p14="http://schemas.microsoft.com/office/powerpoint/2010/main">
-    <mc:Choice Requires="p14">
+  <mc:AlternateContent xmlns:mc="http://schemas.openxmlformats.org/markup-compatibility/2006">
+    <mc:Choice xmlns:p14="http://schemas.microsoft.com/office/powerpoint/2010/main" xmlns="" Requires="p14">
       <p:transition spd="slow" p14:dur="2000"/>
     </mc:Choice>
-    <mc:Fallback xmlns="">
+    <mc:Fallback>
       <p:transition spd="slow"/>
     </mc:Fallback>
   </mc:AlternateContent>
@@ -11695,11 +13114,11 @@
   <p:clrMapOvr>
     <a:masterClrMapping/>
   </p:clrMapOvr>
-  <mc:AlternateContent xmlns:mc="http://schemas.openxmlformats.org/markup-compatibility/2006" xmlns:p14="http://schemas.microsoft.com/office/powerpoint/2010/main">
-    <mc:Choice Requires="p14">
+  <mc:AlternateContent xmlns:mc="http://schemas.openxmlformats.org/markup-compatibility/2006">
+    <mc:Choice xmlns:p14="http://schemas.microsoft.com/office/powerpoint/2010/main" xmlns="" Requires="p14">
       <p:transition spd="slow" p14:dur="2000"/>
     </mc:Choice>
-    <mc:Fallback xmlns="">
+    <mc:Fallback>
       <p:transition spd="slow"/>
     </mc:Fallback>
   </mc:AlternateContent>
@@ -11740,7 +13159,23 @@
           <a:p>
             <a:r>
               <a:rPr lang="en-GB" dirty="0" smtClean="0"/>
-              <a:t>semicolons</a:t>
+              <a:t>"</a:t>
+            </a:r>
+            <a:r>
+              <a:rPr lang="en-GB" dirty="0" err="1" smtClean="0"/>
+              <a:t>truthy</a:t>
+            </a:r>
+            <a:r>
+              <a:rPr lang="en-GB" dirty="0" smtClean="0"/>
+              <a:t>" and "</a:t>
+            </a:r>
+            <a:r>
+              <a:rPr lang="en-GB" dirty="0" err="1" smtClean="0"/>
+              <a:t>falsy</a:t>
+            </a:r>
+            <a:r>
+              <a:rPr lang="en-GB" dirty="0" smtClean="0"/>
+              <a:t>"</a:t>
             </a:r>
             <a:endParaRPr lang="en-GB" dirty="0"/>
           </a:p>
@@ -11748,38 +13183,184 @@
       </p:sp>
       <p:sp>
         <p:nvSpPr>
-          <p:cNvPr id="3" name="Content Placeholder 2"/>
+          <p:cNvPr id="4" name="Content Placeholder 3"/>
           <p:cNvSpPr>
             <a:spLocks noGrp="1"/>
           </p:cNvSpPr>
           <p:nvPr>
-            <p:ph idx="1"/>
+            <p:ph sz="half" idx="1"/>
           </p:nvPr>
         </p:nvSpPr>
         <p:spPr/>
         <p:txBody>
-          <a:bodyPr/>
+          <a:bodyPr>
+            <a:normAutofit/>
+          </a:bodyPr>
           <a:lstStyle/>
           <a:p>
-            <a:endParaRPr lang="en-GB"/>
+            <a:pPr algn="ctr">
+              <a:buNone/>
+            </a:pPr>
+            <a:r>
+              <a:rPr lang="en-GB" dirty="0" smtClean="0"/>
+              <a:t>False Things:</a:t>
+            </a:r>
+          </a:p>
+          <a:p>
+            <a:pPr algn="ctr">
+              <a:buNone/>
+            </a:pPr>
+            <a:endParaRPr lang="en-GB" dirty="0" smtClean="0"/>
+          </a:p>
+          <a:p>
+            <a:pPr algn="ctr">
+              <a:buNone/>
+            </a:pPr>
+            <a:r>
+              <a:rPr lang="en-GB" dirty="0" smtClean="0"/>
+              <a:t>The empty string</a:t>
+            </a:r>
+          </a:p>
+          <a:p>
+            <a:pPr algn="ctr">
+              <a:buNone/>
+            </a:pPr>
+            <a:r>
+              <a:rPr lang="en-GB" dirty="0" smtClean="0"/>
+              <a:t>Zero</a:t>
+            </a:r>
+          </a:p>
+          <a:p>
+            <a:pPr algn="ctr">
+              <a:buNone/>
+            </a:pPr>
+            <a:r>
+              <a:rPr lang="en-GB" dirty="0" err="1" smtClean="0"/>
+              <a:t>NaN</a:t>
+            </a:r>
+            <a:endParaRPr lang="en-GB" dirty="0" smtClean="0"/>
+          </a:p>
+          <a:p>
+            <a:pPr algn="ctr">
+              <a:buNone/>
+            </a:pPr>
+            <a:r>
+              <a:rPr lang="en-GB" dirty="0" smtClean="0"/>
+              <a:t>null</a:t>
+            </a:r>
+          </a:p>
+          <a:p>
+            <a:pPr algn="ctr">
+              <a:buNone/>
+            </a:pPr>
+            <a:endParaRPr lang="en-GB" dirty="0" smtClean="0"/>
+          </a:p>
+          <a:p>
+            <a:pPr algn="ctr">
+              <a:buNone/>
+            </a:pPr>
+            <a:r>
+              <a:rPr lang="en-GB" dirty="0" smtClean="0"/>
+              <a:t>([] == true)</a:t>
+            </a:r>
+            <a:endParaRPr lang="en-GB" dirty="0"/>
+          </a:p>
+        </p:txBody>
+      </p:sp>
+      <p:sp>
+        <p:nvSpPr>
+          <p:cNvPr id="5" name="Content Placeholder 4"/>
+          <p:cNvSpPr>
+            <a:spLocks noGrp="1"/>
+          </p:cNvSpPr>
+          <p:nvPr>
+            <p:ph sz="half" idx="2"/>
+          </p:nvPr>
+        </p:nvSpPr>
+        <p:spPr/>
+        <p:txBody>
+          <a:bodyPr>
+            <a:normAutofit/>
+          </a:bodyPr>
+          <a:lstStyle/>
+          <a:p>
+            <a:pPr algn="ctr">
+              <a:buNone/>
+            </a:pPr>
+            <a:r>
+              <a:rPr lang="en-GB" dirty="0" smtClean="0"/>
+              <a:t>True Things:</a:t>
+            </a:r>
+          </a:p>
+          <a:p>
+            <a:pPr algn="ctr">
+              <a:buNone/>
+            </a:pPr>
+            <a:endParaRPr lang="en-GB" dirty="0" smtClean="0"/>
+          </a:p>
+          <a:p>
+            <a:pPr algn="ctr">
+              <a:buNone/>
+            </a:pPr>
+            <a:r>
+              <a:rPr lang="en-GB" dirty="0" smtClean="0"/>
+              <a:t>everything else</a:t>
+            </a:r>
+          </a:p>
+          <a:p>
+            <a:pPr algn="ctr">
+              <a:buNone/>
+            </a:pPr>
+            <a:endParaRPr lang="en-GB" dirty="0" smtClean="0"/>
+          </a:p>
+          <a:p>
+            <a:pPr algn="ctr">
+              <a:buNone/>
+            </a:pPr>
+            <a:endParaRPr lang="en-GB" dirty="0" smtClean="0"/>
+          </a:p>
+          <a:p>
+            <a:pPr algn="ctr">
+              <a:buNone/>
+            </a:pPr>
+            <a:r>
+              <a:rPr lang="en-GB" dirty="0" smtClean="0"/>
+              <a:t>([])</a:t>
+            </a:r>
+            <a:endParaRPr lang="en-GB" dirty="0" smtClean="0"/>
+          </a:p>
+          <a:p>
+            <a:pPr algn="ctr">
+              <a:buNone/>
+            </a:pPr>
+            <a:endParaRPr lang="en-GB" dirty="0" smtClean="0"/>
+          </a:p>
+          <a:p>
+            <a:pPr algn="ctr">
+              <a:buNone/>
+            </a:pPr>
+            <a:r>
+              <a:rPr lang="en-GB" dirty="0" smtClean="0"/>
+              <a:t>([] == false)</a:t>
+            </a:r>
           </a:p>
         </p:txBody>
       </p:sp>
     </p:spTree>
     <p:extLst>
       <p:ext uri="{BB962C8B-B14F-4D97-AF65-F5344CB8AC3E}">
-        <p14:creationId xmlns:p14="http://schemas.microsoft.com/office/powerpoint/2010/main" val="2115361213"/>
+        <p14:creationId xmlns:p14="http://schemas.microsoft.com/office/powerpoint/2010/main" xmlns="" val="3191141142"/>
       </p:ext>
     </p:extLst>
   </p:cSld>
   <p:clrMapOvr>
     <a:masterClrMapping/>
   </p:clrMapOvr>
-  <mc:AlternateContent xmlns:mc="http://schemas.openxmlformats.org/markup-compatibility/2006" xmlns:p14="http://schemas.microsoft.com/office/powerpoint/2010/main">
-    <mc:Choice Requires="p14">
+  <mc:AlternateContent xmlns:mc="http://schemas.openxmlformats.org/markup-compatibility/2006">
+    <mc:Choice xmlns:p14="http://schemas.microsoft.com/office/powerpoint/2010/main" xmlns="" Requires="p14">
       <p:transition spd="slow" p14:dur="2000"/>
     </mc:Choice>
-    <mc:Fallback xmlns="">
+    <mc:Fallback>
       <p:transition spd="slow"/>
     </mc:Fallback>
   </mc:AlternateContent>
@@ -11852,18 +13433,18 @@
     </p:spTree>
     <p:extLst>
       <p:ext uri="{BB962C8B-B14F-4D97-AF65-F5344CB8AC3E}">
-        <p14:creationId xmlns:p14="http://schemas.microsoft.com/office/powerpoint/2010/main" val="259883720"/>
+        <p14:creationId xmlns:p14="http://schemas.microsoft.com/office/powerpoint/2010/main" xmlns="" val="259883720"/>
       </p:ext>
     </p:extLst>
   </p:cSld>
   <p:clrMapOvr>
     <a:masterClrMapping/>
   </p:clrMapOvr>
-  <mc:AlternateContent xmlns:mc="http://schemas.openxmlformats.org/markup-compatibility/2006" xmlns:p14="http://schemas.microsoft.com/office/powerpoint/2010/main">
-    <mc:Choice Requires="p14">
+  <mc:AlternateContent xmlns:mc="http://schemas.openxmlformats.org/markup-compatibility/2006">
+    <mc:Choice xmlns:p14="http://schemas.microsoft.com/office/powerpoint/2010/main" xmlns="" Requires="p14">
       <p:transition spd="slow" p14:dur="2000"/>
     </mc:Choice>
-    <mc:Fallback xmlns="">
+    <mc:Fallback>
       <p:transition spd="slow"/>
     </mc:Fallback>
   </mc:AlternateContent>
@@ -11941,18 +13522,18 @@
     </p:spTree>
     <p:extLst>
       <p:ext uri="{BB962C8B-B14F-4D97-AF65-F5344CB8AC3E}">
-        <p14:creationId xmlns:p14="http://schemas.microsoft.com/office/powerpoint/2010/main" val="3140080712"/>
+        <p14:creationId xmlns:p14="http://schemas.microsoft.com/office/powerpoint/2010/main" xmlns="" val="3140080712"/>
       </p:ext>
     </p:extLst>
   </p:cSld>
   <p:clrMapOvr>
     <a:masterClrMapping/>
   </p:clrMapOvr>
-  <mc:AlternateContent xmlns:mc="http://schemas.openxmlformats.org/markup-compatibility/2006" xmlns:p14="http://schemas.microsoft.com/office/powerpoint/2010/main">
-    <mc:Choice Requires="p14">
+  <mc:AlternateContent xmlns:mc="http://schemas.openxmlformats.org/markup-compatibility/2006">
+    <mc:Choice xmlns:p14="http://schemas.microsoft.com/office/powerpoint/2010/main" xmlns="" Requires="p14">
       <p:transition spd="slow" p14:dur="2000"/>
     </mc:Choice>
-    <mc:Fallback xmlns="">
+    <mc:Fallback>
       <p:transition spd="slow"/>
     </mc:Fallback>
   </mc:AlternateContent>
@@ -12022,18 +13603,18 @@
     </p:spTree>
     <p:extLst>
       <p:ext uri="{BB962C8B-B14F-4D97-AF65-F5344CB8AC3E}">
-        <p14:creationId xmlns:p14="http://schemas.microsoft.com/office/powerpoint/2010/main" val="649950254"/>
+        <p14:creationId xmlns:p14="http://schemas.microsoft.com/office/powerpoint/2010/main" xmlns="" val="649950254"/>
       </p:ext>
     </p:extLst>
   </p:cSld>
   <p:clrMapOvr>
     <a:masterClrMapping/>
   </p:clrMapOvr>
-  <mc:AlternateContent xmlns:mc="http://schemas.openxmlformats.org/markup-compatibility/2006" xmlns:p14="http://schemas.microsoft.com/office/powerpoint/2010/main">
-    <mc:Choice Requires="p14">
+  <mc:AlternateContent xmlns:mc="http://schemas.openxmlformats.org/markup-compatibility/2006">
+    <mc:Choice xmlns:p14="http://schemas.microsoft.com/office/powerpoint/2010/main" xmlns="" Requires="p14">
       <p:transition spd="slow" p14:dur="2000"/>
     </mc:Choice>
-    <mc:Fallback xmlns="">
+    <mc:Fallback>
       <p:transition spd="slow"/>
     </mc:Fallback>
   </mc:AlternateContent>
@@ -12123,18 +13704,18 @@
     </p:spTree>
     <p:extLst>
       <p:ext uri="{BB962C8B-B14F-4D97-AF65-F5344CB8AC3E}">
-        <p14:creationId xmlns:p14="http://schemas.microsoft.com/office/powerpoint/2010/main" val="4251563071"/>
+        <p14:creationId xmlns:p14="http://schemas.microsoft.com/office/powerpoint/2010/main" xmlns="" val="4251563071"/>
       </p:ext>
     </p:extLst>
   </p:cSld>
   <p:clrMapOvr>
     <a:masterClrMapping/>
   </p:clrMapOvr>
-  <mc:AlternateContent xmlns:mc="http://schemas.openxmlformats.org/markup-compatibility/2006" xmlns:p14="http://schemas.microsoft.com/office/powerpoint/2010/main">
-    <mc:Choice Requires="p14">
+  <mc:AlternateContent xmlns:mc="http://schemas.openxmlformats.org/markup-compatibility/2006">
+    <mc:Choice xmlns:p14="http://schemas.microsoft.com/office/powerpoint/2010/main" xmlns="" Requires="p14">
       <p:transition spd="slow" p14:dur="2000"/>
     </mc:Choice>
-    <mc:Fallback xmlns="">
+    <mc:Fallback>
       <p:transition spd="slow"/>
     </mc:Fallback>
   </mc:AlternateContent>
@@ -12158,63 +13739,47 @@
           <a:chExt cx="0" cy="0"/>
         </a:xfrm>
       </p:grpSpPr>
-      <p:sp>
-        <p:nvSpPr>
-          <p:cNvPr id="2" name="Title 1"/>
-          <p:cNvSpPr>
-            <a:spLocks noGrp="1"/>
-          </p:cNvSpPr>
-          <p:nvPr>
-            <p:ph type="title"/>
-          </p:nvPr>
-        </p:nvSpPr>
-        <p:spPr/>
-        <p:txBody>
-          <a:bodyPr/>
-          <a:lstStyle/>
-          <a:p>
-            <a:r>
-              <a:rPr lang="en-GB" dirty="0" smtClean="0"/>
-              <a:t>Cool Stuff</a:t>
-            </a:r>
-            <a:endParaRPr lang="en-GB" dirty="0"/>
-          </a:p>
-        </p:txBody>
-      </p:sp>
-      <p:sp>
-        <p:nvSpPr>
-          <p:cNvPr id="3" name="Content Placeholder 2"/>
-          <p:cNvSpPr>
-            <a:spLocks noGrp="1"/>
-          </p:cNvSpPr>
-          <p:nvPr>
-            <p:ph idx="1"/>
-          </p:nvPr>
-        </p:nvSpPr>
-        <p:spPr/>
-        <p:txBody>
-          <a:bodyPr/>
-          <a:lstStyle/>
-          <a:p>
-            <a:endParaRPr lang="en-GB"/>
-          </a:p>
-        </p:txBody>
-      </p:sp>
+      <p:pic>
+        <p:nvPicPr>
+          <p:cNvPr id="19458" name="Picture 2" descr="http://www.pickinglosers.com/files/u11/fonz.jpg"/>
+          <p:cNvPicPr>
+            <a:picLocks noChangeAspect="1" noChangeArrowheads="1"/>
+          </p:cNvPicPr>
+          <p:nvPr/>
+        </p:nvPicPr>
+        <p:blipFill>
+          <a:blip r:embed="rId2" cstate="print"/>
+          <a:srcRect/>
+          <a:stretch>
+            <a:fillRect/>
+          </a:stretch>
+        </p:blipFill>
+        <p:spPr bwMode="auto">
+          <a:xfrm>
+            <a:off x="2051720" y="129096"/>
+            <a:ext cx="5400600" cy="6728904"/>
+          </a:xfrm>
+          <a:prstGeom prst="rect">
+            <a:avLst/>
+          </a:prstGeom>
+          <a:noFill/>
+        </p:spPr>
+      </p:pic>
     </p:spTree>
     <p:extLst>
       <p:ext uri="{BB962C8B-B14F-4D97-AF65-F5344CB8AC3E}">
-        <p14:creationId xmlns:p14="http://schemas.microsoft.com/office/powerpoint/2010/main" val="2598950759"/>
+        <p14:creationId xmlns:p14="http://schemas.microsoft.com/office/powerpoint/2010/main" xmlns="" val="2598950759"/>
       </p:ext>
     </p:extLst>
   </p:cSld>
   <p:clrMapOvr>
     <a:masterClrMapping/>
   </p:clrMapOvr>
-  <mc:AlternateContent xmlns:mc="http://schemas.openxmlformats.org/markup-compatibility/2006" xmlns:p14="http://schemas.microsoft.com/office/powerpoint/2010/main">
-    <mc:Choice Requires="p14">
+  <mc:AlternateContent xmlns:mc="http://schemas.openxmlformats.org/markup-compatibility/2006">
+    <mc:Choice xmlns:p14="http://schemas.microsoft.com/office/powerpoint/2010/main" xmlns="" Requires="p14">
       <p:transition spd="slow" p14:dur="2000"/>
     </mc:Choice>
-    <mc:Fallback xmlns="">
+    <mc:Fallback>
       <p:transition spd="slow"/>
     </mc:Fallback>
   </mc:AlternateContent>
@@ -12287,18 +13852,18 @@
     </p:spTree>
     <p:extLst>
       <p:ext uri="{BB962C8B-B14F-4D97-AF65-F5344CB8AC3E}">
-        <p14:creationId xmlns:p14="http://schemas.microsoft.com/office/powerpoint/2010/main" val="3398446601"/>
+        <p14:creationId xmlns:p14="http://schemas.microsoft.com/office/powerpoint/2010/main" xmlns="" val="3398446601"/>
       </p:ext>
     </p:extLst>
   </p:cSld>
   <p:clrMapOvr>
     <a:masterClrMapping/>
   </p:clrMapOvr>
-  <mc:AlternateContent xmlns:mc="http://schemas.openxmlformats.org/markup-compatibility/2006" xmlns:p14="http://schemas.microsoft.com/office/powerpoint/2010/main">
-    <mc:Choice Requires="p14">
+  <mc:AlternateContent xmlns:mc="http://schemas.openxmlformats.org/markup-compatibility/2006">
+    <mc:Choice xmlns:p14="http://schemas.microsoft.com/office/powerpoint/2010/main" xmlns="" Requires="p14">
       <p:transition spd="slow" p14:dur="2000"/>
     </mc:Choice>
-    <mc:Fallback xmlns="">
+    <mc:Fallback>
       <p:transition spd="slow"/>
     </mc:Fallback>
   </mc:AlternateContent>
@@ -12616,11 +14181,11 @@
   <p:clrMapOvr>
     <a:masterClrMapping/>
   </p:clrMapOvr>
-  <mc:AlternateContent xmlns:mc="http://schemas.openxmlformats.org/markup-compatibility/2006" xmlns:p14="http://schemas.microsoft.com/office/powerpoint/2010/main">
-    <mc:Choice Requires="p14">
+  <mc:AlternateContent xmlns:mc="http://schemas.openxmlformats.org/markup-compatibility/2006">
+    <mc:Choice xmlns:p14="http://schemas.microsoft.com/office/powerpoint/2010/main" xmlns="" Requires="p14">
       <p:transition spd="slow" p14:dur="2000"/>
     </mc:Choice>
-    <mc:Fallback xmlns="">
+    <mc:Fallback>
       <p:transition spd="slow"/>
     </mc:Fallback>
   </mc:AlternateContent>
@@ -12689,18 +14254,18 @@
     </p:spTree>
     <p:extLst>
       <p:ext uri="{BB962C8B-B14F-4D97-AF65-F5344CB8AC3E}">
-        <p14:creationId xmlns:p14="http://schemas.microsoft.com/office/powerpoint/2010/main" val="177327435"/>
+        <p14:creationId xmlns:p14="http://schemas.microsoft.com/office/powerpoint/2010/main" xmlns="" val="177327435"/>
       </p:ext>
     </p:extLst>
   </p:cSld>
   <p:clrMapOvr>
     <a:masterClrMapping/>
   </p:clrMapOvr>
-  <mc:AlternateContent xmlns:mc="http://schemas.openxmlformats.org/markup-compatibility/2006" xmlns:p14="http://schemas.microsoft.com/office/powerpoint/2010/main">
-    <mc:Choice Requires="p14">
+  <mc:AlternateContent xmlns:mc="http://schemas.openxmlformats.org/markup-compatibility/2006">
+    <mc:Choice xmlns:p14="http://schemas.microsoft.com/office/powerpoint/2010/main" xmlns="" Requires="p14">
       <p:transition spd="slow" p14:dur="2000"/>
     </mc:Choice>
-    <mc:Fallback xmlns="">
+    <mc:Fallback>
       <p:transition spd="slow"/>
     </mc:Fallback>
   </mc:AlternateContent>
@@ -13062,11 +14627,11 @@
   <p:clrMapOvr>
     <a:masterClrMapping/>
   </p:clrMapOvr>
-  <mc:AlternateContent xmlns:mc="http://schemas.openxmlformats.org/markup-compatibility/2006" xmlns:p14="http://schemas.microsoft.com/office/powerpoint/2010/main">
-    <mc:Choice Requires="p14">
+  <mc:AlternateContent xmlns:mc="http://schemas.openxmlformats.org/markup-compatibility/2006">
+    <mc:Choice xmlns:p14="http://schemas.microsoft.com/office/powerpoint/2010/main" xmlns="" Requires="p14">
       <p:transition spd="slow" p14:dur="2000"/>
     </mc:Choice>
-    <mc:Fallback xmlns="">
+    <mc:Fallback>
       <p:transition spd="slow"/>
     </mc:Fallback>
   </mc:AlternateContent>
@@ -13244,11 +14809,11 @@
   <p:clrMapOvr>
     <a:masterClrMapping/>
   </p:clrMapOvr>
-  <mc:AlternateContent xmlns:mc="http://schemas.openxmlformats.org/markup-compatibility/2006" xmlns:p14="http://schemas.microsoft.com/office/powerpoint/2010/main">
-    <mc:Choice Requires="p14">
+  <mc:AlternateContent xmlns:mc="http://schemas.openxmlformats.org/markup-compatibility/2006">
+    <mc:Choice xmlns:p14="http://schemas.microsoft.com/office/powerpoint/2010/main" xmlns="" Requires="p14">
       <p:transition spd="slow" p14:dur="2000"/>
     </mc:Choice>
-    <mc:Fallback xmlns="">
+    <mc:Fallback>
       <p:transition spd="slow"/>
     </mc:Fallback>
   </mc:AlternateContent>
@@ -13287,6 +14852,14 @@
           <a:bodyPr/>
           <a:lstStyle/>
           <a:p>
+            <a:r>
+              <a:rPr lang="en-GB" dirty="0" err="1" smtClean="0"/>
+              <a:t>Javascript</a:t>
+            </a:r>
+            <a:r>
+              <a:rPr lang="en-GB" dirty="0" smtClean="0"/>
+              <a:t> Pop Quiz #3</a:t>
+            </a:r>
             <a:endParaRPr lang="en-GB" dirty="0"/>
           </a:p>
         </p:txBody>
@@ -13306,35 +14879,82 @@
           <a:bodyPr/>
           <a:lstStyle/>
           <a:p>
-            <a:endParaRPr lang="en-GB"/>
+            <a:pPr>
+              <a:buNone/>
+            </a:pPr>
+            <a:r>
+              <a:rPr lang="en-GB" dirty="0" smtClean="0"/>
+              <a:t>try</a:t>
+            </a:r>
+            <a:r>
+              <a:rPr lang="en-GB" dirty="0"/>
+              <a:t> </a:t>
+            </a:r>
+            <a:r>
+              <a:rPr lang="en-GB" dirty="0" smtClean="0"/>
+              <a:t>{</a:t>
+            </a:r>
+            <a:br>
+              <a:rPr lang="en-GB" dirty="0" smtClean="0"/>
+            </a:br>
+            <a:r>
+              <a:rPr lang="en-GB" dirty="0" smtClean="0"/>
+              <a:t>return(true);</a:t>
+            </a:r>
+          </a:p>
+          <a:p>
+            <a:pPr>
+              <a:buNone/>
+            </a:pPr>
+            <a:r>
+              <a:rPr lang="en-GB" dirty="0" smtClean="0"/>
+              <a:t>}</a:t>
+            </a:r>
+            <a:r>
+              <a:rPr lang="en-GB" dirty="0"/>
+              <a:t> finally </a:t>
+            </a:r>
+            <a:r>
+              <a:rPr lang="en-GB" dirty="0" smtClean="0"/>
+              <a:t>{</a:t>
+            </a:r>
+            <a:r>
+              <a:rPr lang="en-GB" dirty="0"/>
+              <a:t/>
+            </a:r>
+            <a:br>
+              <a:rPr lang="en-GB" dirty="0"/>
+            </a:br>
+            <a:r>
+              <a:rPr lang="en-GB" dirty="0" smtClean="0"/>
+              <a:t>return(false);</a:t>
+            </a:r>
+          </a:p>
+          <a:p>
+            <a:pPr>
+              <a:buNone/>
+            </a:pPr>
+            <a:r>
+              <a:rPr lang="en-GB" dirty="0" smtClean="0"/>
+              <a:t>}</a:t>
+            </a:r>
+            <a:endParaRPr lang="en-GB" dirty="0"/>
           </a:p>
         </p:txBody>
       </p:sp>
     </p:spTree>
-    <p:extLst>
-      <p:ext uri="{BB962C8B-B14F-4D97-AF65-F5344CB8AC3E}">
-        <p14:creationId xmlns:p14="http://schemas.microsoft.com/office/powerpoint/2010/main" val="1756515905"/>
-      </p:ext>
-    </p:extLst>
   </p:cSld>
   <p:clrMapOvr>
     <a:masterClrMapping/>
   </p:clrMapOvr>
-  <mc:AlternateContent xmlns:mc="http://schemas.openxmlformats.org/markup-compatibility/2006" xmlns:p14="http://schemas.microsoft.com/office/powerpoint/2010/main">
-    <mc:Choice Requires="p14">
+  <mc:AlternateContent xmlns:mc="http://schemas.openxmlformats.org/markup-compatibility/2006">
+    <mc:Choice xmlns:p14="http://schemas.microsoft.com/office/powerpoint/2010/main" xmlns="" Requires="p14">
       <p:transition spd="slow" p14:dur="2000"/>
     </mc:Choice>
-    <mc:Fallback xmlns="">
+    <mc:Fallback>
       <p:transition spd="slow"/>
     </mc:Fallback>
   </mc:AlternateContent>
-  <p:timing>
-    <p:tnLst>
-      <p:par>
-        <p:cTn id="1" dur="indefinite" restart="never" nodeType="tmRoot"/>
-      </p:par>
-    </p:tnLst>
-  </p:timing>
 </p:sld>
 </file>
 
@@ -13367,81 +14987,65 @@
         </p:nvSpPr>
         <p:spPr/>
         <p:txBody>
+          <a:bodyPr>
+            <a:normAutofit/>
+          </a:bodyPr>
+          <a:lstStyle/>
+          <a:p>
+            <a:r>
+              <a:rPr lang="en-GB" dirty="0" smtClean="0"/>
+              <a:t>Layout Engines </a:t>
+            </a:r>
+            <a:r>
+              <a:rPr lang="en-GB" dirty="0" smtClean="0"/>
+              <a:t>(</a:t>
+            </a:r>
+            <a:r>
+              <a:rPr lang="en-GB" baseline="0" dirty="0" smtClean="0"/>
+              <a:t>Tempo</a:t>
+            </a:r>
+            <a:r>
+              <a:rPr lang="en-GB" baseline="0" dirty="0" smtClean="0"/>
+              <a:t>)</a:t>
+            </a:r>
+            <a:endParaRPr lang="en-GB" dirty="0"/>
+          </a:p>
+        </p:txBody>
+      </p:sp>
+      <p:sp>
+        <p:nvSpPr>
+          <p:cNvPr id="3" name="Content Placeholder 2"/>
+          <p:cNvSpPr>
+            <a:spLocks noGrp="1"/>
+          </p:cNvSpPr>
+          <p:nvPr>
+            <p:ph idx="1"/>
+          </p:nvPr>
+        </p:nvSpPr>
+        <p:spPr/>
+        <p:txBody>
           <a:bodyPr/>
           <a:lstStyle/>
           <a:p>
-            <a:r>
-              <a:rPr lang="en-GB" dirty="0" err="1" smtClean="0"/>
-              <a:t>Javascript</a:t>
-            </a:r>
-            <a:r>
-              <a:rPr lang="en-GB" dirty="0" smtClean="0"/>
-              <a:t> Pop Quiz #3</a:t>
-            </a:r>
-            <a:endParaRPr lang="en-GB" dirty="0"/>
-          </a:p>
-        </p:txBody>
-      </p:sp>
-      <p:sp>
-        <p:nvSpPr>
-          <p:cNvPr id="3" name="Content Placeholder 2"/>
-          <p:cNvSpPr>
-            <a:spLocks noGrp="1"/>
-          </p:cNvSpPr>
-          <p:nvPr>
-            <p:ph idx="1"/>
-          </p:nvPr>
-        </p:nvSpPr>
-        <p:spPr/>
-        <p:txBody>
-          <a:bodyPr/>
-          <a:lstStyle/>
-          <a:p>
-            <a:r>
-              <a:rPr lang="en-GB" dirty="0"/>
-              <a:t>    try {</a:t>
-            </a:r>
-            <a:br>
-              <a:rPr lang="en-GB" dirty="0"/>
-            </a:br>
-            <a:r>
-              <a:rPr lang="en-GB" dirty="0"/>
-              <a:t>        return(true);</a:t>
-            </a:r>
-            <a:br>
-              <a:rPr lang="en-GB" dirty="0"/>
-            </a:br>
-            <a:r>
-              <a:rPr lang="en-GB" dirty="0"/>
-              <a:t>    } finally {</a:t>
-            </a:r>
-            <a:br>
-              <a:rPr lang="en-GB" dirty="0"/>
-            </a:br>
-            <a:r>
-              <a:rPr lang="en-GB" dirty="0"/>
-              <a:t>        return(false);</a:t>
-            </a:r>
-            <a:br>
-              <a:rPr lang="en-GB" dirty="0"/>
-            </a:br>
-            <a:r>
-              <a:rPr lang="en-GB" dirty="0"/>
-              <a:t>    }</a:t>
-            </a:r>
+            <a:endParaRPr lang="en-GB"/>
           </a:p>
         </p:txBody>
       </p:sp>
     </p:spTree>
+    <p:extLst>
+      <p:ext uri="{BB962C8B-B14F-4D97-AF65-F5344CB8AC3E}">
+        <p14:creationId xmlns:p14="http://schemas.microsoft.com/office/powerpoint/2010/main" xmlns="" val="2936035119"/>
+      </p:ext>
+    </p:extLst>
   </p:cSld>
   <p:clrMapOvr>
     <a:masterClrMapping/>
   </p:clrMapOvr>
-  <mc:AlternateContent xmlns:mc="http://schemas.openxmlformats.org/markup-compatibility/2006" xmlns:p14="http://schemas.microsoft.com/office/powerpoint/2010/main">
-    <mc:Choice Requires="p14">
+  <mc:AlternateContent xmlns:mc="http://schemas.openxmlformats.org/markup-compatibility/2006">
+    <mc:Choice xmlns:p14="http://schemas.microsoft.com/office/powerpoint/2010/main" xmlns="" Requires="p14">
       <p:transition spd="slow" p14:dur="2000"/>
     </mc:Choice>
-    <mc:Fallback xmlns="">
+    <mc:Fallback>
       <p:transition spd="slow"/>
     </mc:Fallback>
   </mc:AlternateContent>
@@ -13477,61 +15081,64 @@
         </p:nvSpPr>
         <p:spPr/>
         <p:txBody>
-          <a:bodyPr>
-            <a:normAutofit fontScale="90000"/>
-          </a:bodyPr>
-          <a:lstStyle/>
-          <a:p>
-            <a:r>
-              <a:rPr lang="en-GB" dirty="0" smtClean="0"/>
-              <a:t>Layout Engines (</a:t>
-            </a:r>
-            <a:r>
-              <a:rPr lang="en-GB" dirty="0" err="1" smtClean="0"/>
-              <a:t>Mustache</a:t>
-            </a:r>
-            <a:r>
-              <a:rPr lang="en-GB" baseline="0" dirty="0" smtClean="0"/>
-              <a:t> / Tempo)</a:t>
-            </a:r>
-            <a:endParaRPr lang="en-GB" dirty="0"/>
-          </a:p>
-        </p:txBody>
-      </p:sp>
-      <p:sp>
-        <p:nvSpPr>
-          <p:cNvPr id="3" name="Content Placeholder 2"/>
-          <p:cNvSpPr>
-            <a:spLocks noGrp="1"/>
-          </p:cNvSpPr>
-          <p:nvPr>
-            <p:ph idx="1"/>
-          </p:nvPr>
-        </p:nvSpPr>
-        <p:spPr/>
-        <p:txBody>
           <a:bodyPr/>
           <a:lstStyle/>
           <a:p>
-            <a:endParaRPr lang="en-GB"/>
+            <a:r>
+              <a:rPr lang="en-GB" dirty="0" smtClean="0"/>
+              <a:t>A Simple Server in </a:t>
+            </a:r>
+            <a:r>
+              <a:rPr lang="en-GB" dirty="0" err="1" smtClean="0"/>
+              <a:t>NodeJS</a:t>
+            </a:r>
+            <a:endParaRPr lang="en-GB" dirty="0"/>
+          </a:p>
+        </p:txBody>
+      </p:sp>
+      <p:sp>
+        <p:nvSpPr>
+          <p:cNvPr id="3" name="Content Placeholder 2"/>
+          <p:cNvSpPr>
+            <a:spLocks noGrp="1"/>
+          </p:cNvSpPr>
+          <p:nvPr>
+            <p:ph idx="1"/>
+          </p:nvPr>
+        </p:nvSpPr>
+        <p:spPr/>
+        <p:txBody>
+          <a:bodyPr/>
+          <a:lstStyle/>
+          <a:p>
+            <a:endParaRPr lang="en-GB" baseline="0" smtClean="0"/>
+          </a:p>
+          <a:p>
+            <a:endParaRPr lang="en-GB" baseline="0" smtClean="0"/>
+          </a:p>
+          <a:p>
+            <a:endParaRPr lang="en-GB" baseline="0" smtClean="0"/>
+          </a:p>
+          <a:p>
+            <a:endParaRPr lang="en-GB" baseline="0" smtClean="0"/>
           </a:p>
         </p:txBody>
       </p:sp>
     </p:spTree>
     <p:extLst>
       <p:ext uri="{BB962C8B-B14F-4D97-AF65-F5344CB8AC3E}">
-        <p14:creationId xmlns:p14="http://schemas.microsoft.com/office/powerpoint/2010/main" val="2936035119"/>
+        <p14:creationId xmlns:p14="http://schemas.microsoft.com/office/powerpoint/2010/main" xmlns="" val="2582581476"/>
       </p:ext>
     </p:extLst>
   </p:cSld>
   <p:clrMapOvr>
     <a:masterClrMapping/>
   </p:clrMapOvr>
-  <mc:AlternateContent xmlns:mc="http://schemas.openxmlformats.org/markup-compatibility/2006" xmlns:p14="http://schemas.microsoft.com/office/powerpoint/2010/main">
-    <mc:Choice Requires="p14">
+  <mc:AlternateContent xmlns:mc="http://schemas.openxmlformats.org/markup-compatibility/2006">
+    <mc:Choice xmlns:p14="http://schemas.microsoft.com/office/powerpoint/2010/main" xmlns="" Requires="p14">
       <p:transition spd="slow" p14:dur="2000"/>
     </mc:Choice>
-    <mc:Fallback xmlns="">
+    <mc:Fallback>
       <p:transition spd="slow"/>
     </mc:Fallback>
   </mc:AlternateContent>
@@ -13572,7 +15179,7 @@
           <a:p>
             <a:r>
               <a:rPr lang="en-GB" dirty="0" smtClean="0"/>
-              <a:t>HTML5 manifests</a:t>
+              <a:t>Manifests</a:t>
             </a:r>
             <a:endParaRPr lang="en-GB" dirty="0"/>
           </a:p>
@@ -13600,18 +15207,18 @@
     </p:spTree>
     <p:extLst>
       <p:ext uri="{BB962C8B-B14F-4D97-AF65-F5344CB8AC3E}">
-        <p14:creationId xmlns:p14="http://schemas.microsoft.com/office/powerpoint/2010/main" val="1630902965"/>
+        <p14:creationId xmlns:p14="http://schemas.microsoft.com/office/powerpoint/2010/main" xmlns="" val="1630902965"/>
       </p:ext>
     </p:extLst>
   </p:cSld>
   <p:clrMapOvr>
     <a:masterClrMapping/>
   </p:clrMapOvr>
-  <mc:AlternateContent xmlns:mc="http://schemas.openxmlformats.org/markup-compatibility/2006" xmlns:p14="http://schemas.microsoft.com/office/powerpoint/2010/main">
-    <mc:Choice Requires="p14">
+  <mc:AlternateContent xmlns:mc="http://schemas.openxmlformats.org/markup-compatibility/2006">
+    <mc:Choice xmlns:p14="http://schemas.microsoft.com/office/powerpoint/2010/main" xmlns="" Requires="p14">
       <p:transition spd="slow" p14:dur="2000"/>
     </mc:Choice>
-    <mc:Fallback xmlns="">
+    <mc:Fallback>
       <p:transition spd="slow"/>
     </mc:Fallback>
   </mc:AlternateContent>
@@ -13651,8 +15258,8 @@
           <a:lstStyle/>
           <a:p>
             <a:r>
-              <a:rPr lang="en-GB" dirty="0" err="1" smtClean="0"/>
-              <a:t>NodeJS</a:t>
+              <a:rPr lang="en-GB" dirty="0" smtClean="0"/>
+              <a:t>Web Sockets</a:t>
             </a:r>
             <a:endParaRPr lang="en-GB" dirty="0"/>
           </a:p>
@@ -13673,34 +15280,25 @@
           <a:bodyPr/>
           <a:lstStyle/>
           <a:p>
-            <a:endParaRPr lang="en-GB" baseline="0" smtClean="0"/>
-          </a:p>
-          <a:p>
-            <a:endParaRPr lang="en-GB" baseline="0" smtClean="0"/>
-          </a:p>
-          <a:p>
-            <a:endParaRPr lang="en-GB" baseline="0" smtClean="0"/>
-          </a:p>
-          <a:p>
-            <a:endParaRPr lang="en-GB" baseline="0" smtClean="0"/>
+            <a:endParaRPr lang="en-GB"/>
           </a:p>
         </p:txBody>
       </p:sp>
     </p:spTree>
     <p:extLst>
       <p:ext uri="{BB962C8B-B14F-4D97-AF65-F5344CB8AC3E}">
-        <p14:creationId xmlns:p14="http://schemas.microsoft.com/office/powerpoint/2010/main" val="2582581476"/>
+        <p14:creationId xmlns:p14="http://schemas.microsoft.com/office/powerpoint/2010/main" xmlns="" val="1630902965"/>
       </p:ext>
     </p:extLst>
   </p:cSld>
   <p:clrMapOvr>
     <a:masterClrMapping/>
   </p:clrMapOvr>
-  <mc:AlternateContent xmlns:mc="http://schemas.openxmlformats.org/markup-compatibility/2006" xmlns:p14="http://schemas.microsoft.com/office/powerpoint/2010/main">
-    <mc:Choice Requires="p14">
+  <mc:AlternateContent xmlns:mc="http://schemas.openxmlformats.org/markup-compatibility/2006">
+    <mc:Choice xmlns:p14="http://schemas.microsoft.com/office/powerpoint/2010/main" xmlns="" Requires="p14">
       <p:transition spd="slow" p14:dur="2000"/>
     </mc:Choice>
-    <mc:Fallback xmlns="">
+    <mc:Fallback>
       <p:transition spd="slow"/>
     </mc:Fallback>
   </mc:AlternateContent>
@@ -13708,157 +15306,6 @@
 </file>
 
 <file path=ppt/slides/slide45.xml><?xml version="1.0" encoding="utf-8"?>
-<p:sld xmlns:a="http://schemas.openxmlformats.org/drawingml/2006/main" xmlns:r="http://schemas.openxmlformats.org/officeDocument/2006/relationships" xmlns:p="http://schemas.openxmlformats.org/presentationml/2006/main">
-  <p:cSld>
-    <p:spTree>
-      <p:nvGrpSpPr>
-        <p:cNvPr id="1" name=""/>
-        <p:cNvGrpSpPr/>
-        <p:nvPr/>
-      </p:nvGrpSpPr>
-      <p:grpSpPr>
-        <a:xfrm>
-          <a:off x="0" y="0"/>
-          <a:ext cx="0" cy="0"/>
-          <a:chOff x="0" y="0"/>
-          <a:chExt cx="0" cy="0"/>
-        </a:xfrm>
-      </p:grpSpPr>
-      <p:sp>
-        <p:nvSpPr>
-          <p:cNvPr id="2" name="Title 1"/>
-          <p:cNvSpPr>
-            <a:spLocks noGrp="1"/>
-          </p:cNvSpPr>
-          <p:nvPr>
-            <p:ph type="title"/>
-          </p:nvPr>
-        </p:nvSpPr>
-        <p:spPr/>
-        <p:txBody>
-          <a:bodyPr/>
-          <a:lstStyle/>
-          <a:p>
-            <a:r>
-              <a:rPr lang="en-GB" dirty="0" smtClean="0"/>
-              <a:t>…and the</a:t>
-            </a:r>
-            <a:r>
-              <a:rPr lang="en-GB" baseline="0" dirty="0" smtClean="0"/>
-              <a:t> server?</a:t>
-            </a:r>
-            <a:endParaRPr lang="en-GB" dirty="0"/>
-          </a:p>
-        </p:txBody>
-      </p:sp>
-      <p:sp>
-        <p:nvSpPr>
-          <p:cNvPr id="3" name="Content Placeholder 2"/>
-          <p:cNvSpPr>
-            <a:spLocks noGrp="1"/>
-          </p:cNvSpPr>
-          <p:nvPr>
-            <p:ph idx="1"/>
-          </p:nvPr>
-        </p:nvSpPr>
-        <p:spPr/>
-        <p:txBody>
-          <a:bodyPr>
-            <a:normAutofit fontScale="85000" lnSpcReduction="10000"/>
-          </a:bodyPr>
-          <a:lstStyle/>
-          <a:p>
-            <a:r>
-              <a:rPr lang="en-GB" dirty="0" smtClean="0"/>
-              <a:t>1996 – </a:t>
-            </a:r>
-            <a:r>
-              <a:rPr lang="en-GB" dirty="0" err="1" smtClean="0"/>
-              <a:t>LiveWire</a:t>
-            </a:r>
-            <a:r>
-              <a:rPr lang="en-GB" dirty="0" smtClean="0"/>
-              <a:t> is part of Netscape</a:t>
-            </a:r>
-            <a:r>
-              <a:rPr lang="en-GB" baseline="0" dirty="0" smtClean="0"/>
-              <a:t> Enterprise Server 2.0</a:t>
-            </a:r>
-          </a:p>
-          <a:p>
-            <a:r>
-              <a:rPr lang="en-GB" baseline="0" dirty="0" smtClean="0"/>
-              <a:t>1997 – IIS 3.0 introduces ASP and </a:t>
-            </a:r>
-            <a:r>
-              <a:rPr lang="en-GB" baseline="0" dirty="0" err="1" smtClean="0"/>
-              <a:t>JScript</a:t>
-            </a:r>
-            <a:r>
-              <a:rPr lang="en-GB" baseline="0" dirty="0" smtClean="0"/>
-              <a:t> to Windows NT 4.0</a:t>
-            </a:r>
-          </a:p>
-          <a:p>
-            <a:r>
-              <a:rPr lang="en-GB" baseline="0" dirty="0" smtClean="0"/>
-              <a:t>2002 – Microsoft .NET 1.0 includes JScript.NET 1.0</a:t>
-            </a:r>
-          </a:p>
-          <a:p>
-            <a:r>
-              <a:rPr lang="en-GB" baseline="0" dirty="0" smtClean="0"/>
-              <a:t>2003 - .NET 1.1. Last supported release of JScript.NET</a:t>
-            </a:r>
-          </a:p>
-          <a:p>
-            <a:endParaRPr lang="en-GB" baseline="0" dirty="0" smtClean="0"/>
-          </a:p>
-          <a:p>
-            <a:endParaRPr lang="en-GB" baseline="0" dirty="0" smtClean="0"/>
-          </a:p>
-          <a:p>
-            <a:r>
-              <a:rPr lang="en-GB" baseline="0" dirty="0" smtClean="0"/>
-              <a:t>big</a:t>
-            </a:r>
-          </a:p>
-          <a:p>
-            <a:r>
-              <a:rPr lang="en-GB" baseline="0" dirty="0" smtClean="0"/>
-              <a:t>gap</a:t>
-            </a:r>
-          </a:p>
-          <a:p>
-            <a:endParaRPr lang="en-GB" baseline="0" dirty="0" smtClean="0"/>
-          </a:p>
-          <a:p>
-            <a:endParaRPr lang="en-GB" baseline="0" dirty="0" smtClean="0"/>
-          </a:p>
-        </p:txBody>
-      </p:sp>
-    </p:spTree>
-    <p:extLst>
-      <p:ext uri="{BB962C8B-B14F-4D97-AF65-F5344CB8AC3E}">
-        <p14:creationId xmlns:p14="http://schemas.microsoft.com/office/powerpoint/2010/main" val="1216906223"/>
-      </p:ext>
-    </p:extLst>
-  </p:cSld>
-  <p:clrMapOvr>
-    <a:masterClrMapping/>
-  </p:clrMapOvr>
-  <mc:AlternateContent xmlns:mc="http://schemas.openxmlformats.org/markup-compatibility/2006" xmlns:p14="http://schemas.microsoft.com/office/powerpoint/2010/main">
-    <mc:Choice Requires="p14">
-      <p:transition spd="slow" p14:dur="2000"/>
-    </mc:Choice>
-    <mc:Fallback xmlns="">
-      <p:transition spd="slow"/>
-    </mc:Fallback>
-  </mc:AlternateContent>
-</p:sld>
-</file>
-
-<file path=ppt/slides/slide46.xml><?xml version="1.0" encoding="utf-8"?>
 <p:sld xmlns:a="http://schemas.openxmlformats.org/drawingml/2006/main" xmlns:r="http://schemas.openxmlformats.org/officeDocument/2006/relationships" xmlns:p="http://schemas.openxmlformats.org/presentationml/2006/main">
   <p:cSld>
     <p:bg>
@@ -14334,7 +15781,7 @@
     </p:spTree>
     <p:extLst>
       <p:ext uri="{BB962C8B-B14F-4D97-AF65-F5344CB8AC3E}">
-        <p14:creationId xmlns:p14="http://schemas.microsoft.com/office/powerpoint/2010/main" val="318162081"/>
+        <p14:creationId xmlns:p14="http://schemas.microsoft.com/office/powerpoint/2010/main" xmlns="" val="318162081"/>
       </p:ext>
     </p:extLst>
   </p:cSld>
@@ -14560,11 +16007,11 @@
   <p:clrMapOvr>
     <a:masterClrMapping/>
   </p:clrMapOvr>
-  <mc:AlternateContent xmlns:mc="http://schemas.openxmlformats.org/markup-compatibility/2006" xmlns:p14="http://schemas.microsoft.com/office/powerpoint/2010/main">
-    <mc:Choice Requires="p14">
+  <mc:AlternateContent xmlns:mc="http://schemas.openxmlformats.org/markup-compatibility/2006">
+    <mc:Choice xmlns:p14="http://schemas.microsoft.com/office/powerpoint/2010/main" xmlns="" Requires="p14">
       <p:transition spd="slow" p14:dur="2000"/>
     </mc:Choice>
-    <mc:Fallback xmlns="">
+    <mc:Fallback>
       <p:transition spd="slow"/>
     </mc:Fallback>
   </mc:AlternateContent>
@@ -15160,11 +16607,11 @@
   <p:clrMapOvr>
     <a:masterClrMapping/>
   </p:clrMapOvr>
-  <mc:AlternateContent xmlns:mc="http://schemas.openxmlformats.org/markup-compatibility/2006" xmlns:p14="http://schemas.microsoft.com/office/powerpoint/2010/main">
-    <mc:Choice Requires="p14">
+  <mc:AlternateContent xmlns:mc="http://schemas.openxmlformats.org/markup-compatibility/2006">
+    <mc:Choice xmlns:p14="http://schemas.microsoft.com/office/powerpoint/2010/main" xmlns="" Requires="p14">
       <p:transition spd="slow" p14:dur="2000"/>
     </mc:Choice>
-    <mc:Fallback xmlns="">
+    <mc:Fallback>
       <p:transition spd="slow"/>
     </mc:Fallback>
   </mc:AlternateContent>
@@ -15380,11 +16827,11 @@
   <p:clrMapOvr>
     <a:masterClrMapping/>
   </p:clrMapOvr>
-  <mc:AlternateContent xmlns:mc="http://schemas.openxmlformats.org/markup-compatibility/2006" xmlns:p14="http://schemas.microsoft.com/office/powerpoint/2010/main">
-    <mc:Choice Requires="p14">
+  <mc:AlternateContent xmlns:mc="http://schemas.openxmlformats.org/markup-compatibility/2006">
+    <mc:Choice xmlns:p14="http://schemas.microsoft.com/office/powerpoint/2010/main" xmlns="" Requires="p14">
       <p:transition spd="slow" p14:dur="2000"/>
     </mc:Choice>
-    <mc:Fallback xmlns="">
+    <mc:Fallback>
       <p:transition spd="slow"/>
     </mc:Fallback>
   </mc:AlternateContent>
@@ -15567,11 +17014,11 @@
   <p:clrMapOvr>
     <a:masterClrMapping/>
   </p:clrMapOvr>
-  <mc:AlternateContent xmlns:mc="http://schemas.openxmlformats.org/markup-compatibility/2006" xmlns:p14="http://schemas.microsoft.com/office/powerpoint/2010/main">
-    <mc:Choice Requires="p14">
+  <mc:AlternateContent xmlns:mc="http://schemas.openxmlformats.org/markup-compatibility/2006">
+    <mc:Choice xmlns:p14="http://schemas.microsoft.com/office/powerpoint/2010/main" xmlns="" Requires="p14">
       <p:transition spd="slow" p14:dur="2000"/>
     </mc:Choice>
-    <mc:Fallback xmlns="">
+    <mc:Fallback>
       <p:transition spd="slow"/>
     </mc:Fallback>
   </mc:AlternateContent>
@@ -16600,11 +18047,11 @@
   <p:clrMapOvr>
     <a:masterClrMapping/>
   </p:clrMapOvr>
-  <mc:AlternateContent xmlns:mc="http://schemas.openxmlformats.org/markup-compatibility/2006" xmlns:p14="http://schemas.microsoft.com/office/powerpoint/2010/main">
-    <mc:Choice Requires="p14">
+  <mc:AlternateContent xmlns:mc="http://schemas.openxmlformats.org/markup-compatibility/2006">
+    <mc:Choice xmlns:p14="http://schemas.microsoft.com/office/powerpoint/2010/main" xmlns="" Requires="p14">
       <p:transition spd="slow" p14:dur="2000"/>
     </mc:Choice>
-    <mc:Fallback xmlns="">
+    <mc:Fallback>
       <p:transition spd="slow"/>
     </mc:Fallback>
   </mc:AlternateContent>

</xml_diff>